<commit_message>
VAE and CVAE figures
- Added a simple VAE figure illustration.
- Added a simple CVAE figure illustration.
</commit_message>
<xml_diff>
--- a/figures/Neural_network_diagrams.pptx
+++ b/figures/Neural_network_diagrams.pptx
@@ -9,6 +9,7 @@
     <p:sldId id="257" r:id="rId3"/>
     <p:sldId id="258" r:id="rId4"/>
     <p:sldId id="259" r:id="rId5"/>
+    <p:sldId id="260" r:id="rId6"/>
   </p:sldIdLst>
   <p:sldSz cx="12192000" cy="6858000"/>
   <p:notesSz cx="6858000" cy="9144000"/>
@@ -262,7 +263,7 @@
           <a:p>
             <a:fld id="{EA8E6676-3294-4EB9-9610-18275A1F2370}" type="datetimeFigureOut">
               <a:rPr lang="en-US" smtClean="0"/>
-              <a:t>2/12/2021</a:t>
+              <a:t>2/15/2021</a:t>
             </a:fld>
             <a:endParaRPr lang="en-US"/>
           </a:p>
@@ -460,7 +461,7 @@
           <a:p>
             <a:fld id="{EA8E6676-3294-4EB9-9610-18275A1F2370}" type="datetimeFigureOut">
               <a:rPr lang="en-US" smtClean="0"/>
-              <a:t>2/12/2021</a:t>
+              <a:t>2/15/2021</a:t>
             </a:fld>
             <a:endParaRPr lang="en-US"/>
           </a:p>
@@ -668,7 +669,7 @@
           <a:p>
             <a:fld id="{EA8E6676-3294-4EB9-9610-18275A1F2370}" type="datetimeFigureOut">
               <a:rPr lang="en-US" smtClean="0"/>
-              <a:t>2/12/2021</a:t>
+              <a:t>2/15/2021</a:t>
             </a:fld>
             <a:endParaRPr lang="en-US"/>
           </a:p>
@@ -866,7 +867,7 @@
           <a:p>
             <a:fld id="{EA8E6676-3294-4EB9-9610-18275A1F2370}" type="datetimeFigureOut">
               <a:rPr lang="en-US" smtClean="0"/>
-              <a:t>2/12/2021</a:t>
+              <a:t>2/15/2021</a:t>
             </a:fld>
             <a:endParaRPr lang="en-US"/>
           </a:p>
@@ -1141,7 +1142,7 @@
           <a:p>
             <a:fld id="{EA8E6676-3294-4EB9-9610-18275A1F2370}" type="datetimeFigureOut">
               <a:rPr lang="en-US" smtClean="0"/>
-              <a:t>2/12/2021</a:t>
+              <a:t>2/15/2021</a:t>
             </a:fld>
             <a:endParaRPr lang="en-US"/>
           </a:p>
@@ -1406,7 +1407,7 @@
           <a:p>
             <a:fld id="{EA8E6676-3294-4EB9-9610-18275A1F2370}" type="datetimeFigureOut">
               <a:rPr lang="en-US" smtClean="0"/>
-              <a:t>2/12/2021</a:t>
+              <a:t>2/15/2021</a:t>
             </a:fld>
             <a:endParaRPr lang="en-US"/>
           </a:p>
@@ -1818,7 +1819,7 @@
           <a:p>
             <a:fld id="{EA8E6676-3294-4EB9-9610-18275A1F2370}" type="datetimeFigureOut">
               <a:rPr lang="en-US" smtClean="0"/>
-              <a:t>2/12/2021</a:t>
+              <a:t>2/15/2021</a:t>
             </a:fld>
             <a:endParaRPr lang="en-US"/>
           </a:p>
@@ -1959,7 +1960,7 @@
           <a:p>
             <a:fld id="{EA8E6676-3294-4EB9-9610-18275A1F2370}" type="datetimeFigureOut">
               <a:rPr lang="en-US" smtClean="0"/>
-              <a:t>2/12/2021</a:t>
+              <a:t>2/15/2021</a:t>
             </a:fld>
             <a:endParaRPr lang="en-US"/>
           </a:p>
@@ -2072,7 +2073,7 @@
           <a:p>
             <a:fld id="{EA8E6676-3294-4EB9-9610-18275A1F2370}" type="datetimeFigureOut">
               <a:rPr lang="en-US" smtClean="0"/>
-              <a:t>2/12/2021</a:t>
+              <a:t>2/15/2021</a:t>
             </a:fld>
             <a:endParaRPr lang="en-US"/>
           </a:p>
@@ -2383,7 +2384,7 @@
           <a:p>
             <a:fld id="{EA8E6676-3294-4EB9-9610-18275A1F2370}" type="datetimeFigureOut">
               <a:rPr lang="en-US" smtClean="0"/>
-              <a:t>2/12/2021</a:t>
+              <a:t>2/15/2021</a:t>
             </a:fld>
             <a:endParaRPr lang="en-US"/>
           </a:p>
@@ -2671,7 +2672,7 @@
           <a:p>
             <a:fld id="{EA8E6676-3294-4EB9-9610-18275A1F2370}" type="datetimeFigureOut">
               <a:rPr lang="en-US" smtClean="0"/>
-              <a:t>2/12/2021</a:t>
+              <a:t>2/15/2021</a:t>
             </a:fld>
             <a:endParaRPr lang="en-US"/>
           </a:p>
@@ -2912,7 +2913,7 @@
           <a:p>
             <a:fld id="{EA8E6676-3294-4EB9-9610-18275A1F2370}" type="datetimeFigureOut">
               <a:rPr lang="en-US" smtClean="0"/>
-              <a:t>2/12/2021</a:t>
+              <a:t>2/15/2021</a:t>
             </a:fld>
             <a:endParaRPr lang="en-US"/>
           </a:p>
@@ -4997,8 +4998,8 @@
           </a:p>
         </p:txBody>
       </p:sp>
-      <mc:AlternateContent xmlns:mc="http://schemas.openxmlformats.org/markup-compatibility/2006">
-        <mc:Choice xmlns:a14="http://schemas.microsoft.com/office/drawing/2010/main" Requires="a14">
+      <mc:AlternateContent xmlns:mc="http://schemas.openxmlformats.org/markup-compatibility/2006" xmlns:a14="http://schemas.microsoft.com/office/drawing/2010/main">
+        <mc:Choice Requires="a14">
           <p:sp>
             <p:nvSpPr>
               <p:cNvPr id="9" name="TextBox 8">
@@ -5070,7 +5071,7 @@
             </p:txBody>
           </p:sp>
         </mc:Choice>
-        <mc:Fallback>
+        <mc:Fallback xmlns="">
           <p:sp>
             <p:nvSpPr>
               <p:cNvPr id="9" name="TextBox 8">
@@ -5115,8 +5116,8 @@
           </p:sp>
         </mc:Fallback>
       </mc:AlternateContent>
-      <mc:AlternateContent xmlns:mc="http://schemas.openxmlformats.org/markup-compatibility/2006">
-        <mc:Choice xmlns:a14="http://schemas.microsoft.com/office/drawing/2010/main" Requires="a14">
+      <mc:AlternateContent xmlns:mc="http://schemas.openxmlformats.org/markup-compatibility/2006" xmlns:a14="http://schemas.microsoft.com/office/drawing/2010/main">
+        <mc:Choice Requires="a14">
           <p:sp>
             <p:nvSpPr>
               <p:cNvPr id="10" name="TextBox 9">
@@ -5188,7 +5189,7 @@
             </p:txBody>
           </p:sp>
         </mc:Choice>
-        <mc:Fallback>
+        <mc:Fallback xmlns="">
           <p:sp>
             <p:nvSpPr>
               <p:cNvPr id="10" name="TextBox 9">
@@ -5233,8 +5234,8 @@
           </p:sp>
         </mc:Fallback>
       </mc:AlternateContent>
-      <mc:AlternateContent xmlns:mc="http://schemas.openxmlformats.org/markup-compatibility/2006">
-        <mc:Choice xmlns:a14="http://schemas.microsoft.com/office/drawing/2010/main" Requires="a14">
+      <mc:AlternateContent xmlns:mc="http://schemas.openxmlformats.org/markup-compatibility/2006" xmlns:a14="http://schemas.microsoft.com/office/drawing/2010/main">
+        <mc:Choice Requires="a14">
           <p:sp>
             <p:nvSpPr>
               <p:cNvPr id="11" name="TextBox 10">
@@ -5306,7 +5307,7 @@
             </p:txBody>
           </p:sp>
         </mc:Choice>
-        <mc:Fallback>
+        <mc:Fallback xmlns="">
           <p:sp>
             <p:nvSpPr>
               <p:cNvPr id="11" name="TextBox 10">
@@ -5351,8 +5352,8 @@
           </p:sp>
         </mc:Fallback>
       </mc:AlternateContent>
-      <mc:AlternateContent xmlns:mc="http://schemas.openxmlformats.org/markup-compatibility/2006">
-        <mc:Choice xmlns:a14="http://schemas.microsoft.com/office/drawing/2010/main" Requires="a14">
+      <mc:AlternateContent xmlns:mc="http://schemas.openxmlformats.org/markup-compatibility/2006" xmlns:a14="http://schemas.microsoft.com/office/drawing/2010/main">
+        <mc:Choice Requires="a14">
           <p:sp>
             <p:nvSpPr>
               <p:cNvPr id="12" name="TextBox 11">
@@ -5402,7 +5403,7 @@
             </p:txBody>
           </p:sp>
         </mc:Choice>
-        <mc:Fallback>
+        <mc:Fallback xmlns="">
           <p:sp>
             <p:nvSpPr>
               <p:cNvPr id="12" name="TextBox 11">
@@ -5447,8 +5448,8 @@
           </p:sp>
         </mc:Fallback>
       </mc:AlternateContent>
-      <mc:AlternateContent xmlns:mc="http://schemas.openxmlformats.org/markup-compatibility/2006">
-        <mc:Choice xmlns:a14="http://schemas.microsoft.com/office/drawing/2010/main" Requires="a14">
+      <mc:AlternateContent xmlns:mc="http://schemas.openxmlformats.org/markup-compatibility/2006" xmlns:a14="http://schemas.microsoft.com/office/drawing/2010/main">
+        <mc:Choice Requires="a14">
           <p:sp>
             <p:nvSpPr>
               <p:cNvPr id="13" name="TextBox 12">
@@ -5520,7 +5521,7 @@
             </p:txBody>
           </p:sp>
         </mc:Choice>
-        <mc:Fallback>
+        <mc:Fallback xmlns="">
           <p:sp>
             <p:nvSpPr>
               <p:cNvPr id="13" name="TextBox 12">
@@ -6489,8 +6490,8 @@
           </a:p>
         </p:txBody>
       </p:sp>
-      <mc:AlternateContent xmlns:mc="http://schemas.openxmlformats.org/markup-compatibility/2006">
-        <mc:Choice xmlns:a14="http://schemas.microsoft.com/office/drawing/2010/main" Requires="a14">
+      <mc:AlternateContent xmlns:mc="http://schemas.openxmlformats.org/markup-compatibility/2006" xmlns:a14="http://schemas.microsoft.com/office/drawing/2010/main">
+        <mc:Choice Requires="a14">
           <p:sp>
             <p:nvSpPr>
               <p:cNvPr id="55" name="TextBox 54">
@@ -6562,7 +6563,7 @@
             </p:txBody>
           </p:sp>
         </mc:Choice>
-        <mc:Fallback>
+        <mc:Fallback xmlns="">
           <p:sp>
             <p:nvSpPr>
               <p:cNvPr id="55" name="TextBox 54">
@@ -11066,8 +11067,8 @@
           </a:p>
         </p:txBody>
       </p:sp>
-      <mc:AlternateContent xmlns:mc="http://schemas.openxmlformats.org/markup-compatibility/2006">
-        <mc:Choice xmlns:a14="http://schemas.microsoft.com/office/drawing/2010/main" Requires="a14">
+      <mc:AlternateContent xmlns:mc="http://schemas.openxmlformats.org/markup-compatibility/2006" xmlns:a14="http://schemas.microsoft.com/office/drawing/2010/main">
+        <mc:Choice Requires="a14">
           <p:sp>
             <p:nvSpPr>
               <p:cNvPr id="9" name="TextBox 8">
@@ -11139,7 +11140,7 @@
             </p:txBody>
           </p:sp>
         </mc:Choice>
-        <mc:Fallback>
+        <mc:Fallback xmlns="">
           <p:sp>
             <p:nvSpPr>
               <p:cNvPr id="9" name="TextBox 8">
@@ -11184,8 +11185,8 @@
           </p:sp>
         </mc:Fallback>
       </mc:AlternateContent>
-      <mc:AlternateContent xmlns:mc="http://schemas.openxmlformats.org/markup-compatibility/2006">
-        <mc:Choice xmlns:a14="http://schemas.microsoft.com/office/drawing/2010/main" Requires="a14">
+      <mc:AlternateContent xmlns:mc="http://schemas.openxmlformats.org/markup-compatibility/2006" xmlns:a14="http://schemas.microsoft.com/office/drawing/2010/main">
+        <mc:Choice Requires="a14">
           <p:sp>
             <p:nvSpPr>
               <p:cNvPr id="10" name="TextBox 9">
@@ -11257,7 +11258,7 @@
             </p:txBody>
           </p:sp>
         </mc:Choice>
-        <mc:Fallback>
+        <mc:Fallback xmlns="">
           <p:sp>
             <p:nvSpPr>
               <p:cNvPr id="10" name="TextBox 9">
@@ -11302,8 +11303,8 @@
           </p:sp>
         </mc:Fallback>
       </mc:AlternateContent>
-      <mc:AlternateContent xmlns:mc="http://schemas.openxmlformats.org/markup-compatibility/2006">
-        <mc:Choice xmlns:a14="http://schemas.microsoft.com/office/drawing/2010/main" Requires="a14">
+      <mc:AlternateContent xmlns:mc="http://schemas.openxmlformats.org/markup-compatibility/2006" xmlns:a14="http://schemas.microsoft.com/office/drawing/2010/main">
+        <mc:Choice Requires="a14">
           <p:sp>
             <p:nvSpPr>
               <p:cNvPr id="11" name="TextBox 10">
@@ -11375,7 +11376,7 @@
             </p:txBody>
           </p:sp>
         </mc:Choice>
-        <mc:Fallback>
+        <mc:Fallback xmlns="">
           <p:sp>
             <p:nvSpPr>
               <p:cNvPr id="11" name="TextBox 10">
@@ -11420,8 +11421,8 @@
           </p:sp>
         </mc:Fallback>
       </mc:AlternateContent>
-      <mc:AlternateContent xmlns:mc="http://schemas.openxmlformats.org/markup-compatibility/2006">
-        <mc:Choice xmlns:a14="http://schemas.microsoft.com/office/drawing/2010/main" Requires="a14">
+      <mc:AlternateContent xmlns:mc="http://schemas.openxmlformats.org/markup-compatibility/2006" xmlns:a14="http://schemas.microsoft.com/office/drawing/2010/main">
+        <mc:Choice Requires="a14">
           <p:sp>
             <p:nvSpPr>
               <p:cNvPr id="12" name="TextBox 11">
@@ -11471,7 +11472,7 @@
             </p:txBody>
           </p:sp>
         </mc:Choice>
-        <mc:Fallback>
+        <mc:Fallback xmlns="">
           <p:sp>
             <p:nvSpPr>
               <p:cNvPr id="12" name="TextBox 11">
@@ -11516,8 +11517,8 @@
           </p:sp>
         </mc:Fallback>
       </mc:AlternateContent>
-      <mc:AlternateContent xmlns:mc="http://schemas.openxmlformats.org/markup-compatibility/2006">
-        <mc:Choice xmlns:a14="http://schemas.microsoft.com/office/drawing/2010/main" Requires="a14">
+      <mc:AlternateContent xmlns:mc="http://schemas.openxmlformats.org/markup-compatibility/2006" xmlns:a14="http://schemas.microsoft.com/office/drawing/2010/main">
+        <mc:Choice Requires="a14">
           <p:sp>
             <p:nvSpPr>
               <p:cNvPr id="13" name="TextBox 12">
@@ -11589,7 +11590,7 @@
             </p:txBody>
           </p:sp>
         </mc:Choice>
-        <mc:Fallback>
+        <mc:Fallback xmlns="">
           <p:sp>
             <p:nvSpPr>
               <p:cNvPr id="13" name="TextBox 12">
@@ -12465,8 +12466,8 @@
           </a:p>
         </p:txBody>
       </p:sp>
-      <mc:AlternateContent xmlns:mc="http://schemas.openxmlformats.org/markup-compatibility/2006">
-        <mc:Choice xmlns:a14="http://schemas.microsoft.com/office/drawing/2010/main" Requires="a14">
+      <mc:AlternateContent xmlns:mc="http://schemas.openxmlformats.org/markup-compatibility/2006" xmlns:a14="http://schemas.microsoft.com/office/drawing/2010/main">
+        <mc:Choice Requires="a14">
           <p:sp>
             <p:nvSpPr>
               <p:cNvPr id="35" name="TextBox 34">
@@ -12538,7 +12539,7 @@
             </p:txBody>
           </p:sp>
         </mc:Choice>
-        <mc:Fallback>
+        <mc:Fallback xmlns="">
           <p:sp>
             <p:nvSpPr>
               <p:cNvPr id="35" name="TextBox 34">
@@ -15885,8 +15886,8 @@
           </a:p>
         </p:txBody>
       </p:sp>
-      <mc:AlternateContent xmlns:mc="http://schemas.openxmlformats.org/markup-compatibility/2006">
-        <mc:Choice xmlns:a14="http://schemas.microsoft.com/office/drawing/2010/main" Requires="a14">
+      <mc:AlternateContent xmlns:mc="http://schemas.openxmlformats.org/markup-compatibility/2006" xmlns:a14="http://schemas.microsoft.com/office/drawing/2010/main">
+        <mc:Choice Requires="a14">
           <p:sp>
             <p:nvSpPr>
               <p:cNvPr id="146" name="TextBox 145">
@@ -15958,7 +15959,7 @@
             </p:txBody>
           </p:sp>
         </mc:Choice>
-        <mc:Fallback>
+        <mc:Fallback xmlns="">
           <p:sp>
             <p:nvSpPr>
               <p:cNvPr id="146" name="TextBox 145">
@@ -16003,8 +16004,8 @@
           </p:sp>
         </mc:Fallback>
       </mc:AlternateContent>
-      <mc:AlternateContent xmlns:mc="http://schemas.openxmlformats.org/markup-compatibility/2006">
-        <mc:Choice xmlns:a14="http://schemas.microsoft.com/office/drawing/2010/main" Requires="a14">
+      <mc:AlternateContent xmlns:mc="http://schemas.openxmlformats.org/markup-compatibility/2006" xmlns:a14="http://schemas.microsoft.com/office/drawing/2010/main">
+        <mc:Choice Requires="a14">
           <p:sp>
             <p:nvSpPr>
               <p:cNvPr id="147" name="TextBox 146">
@@ -16076,7 +16077,7 @@
             </p:txBody>
           </p:sp>
         </mc:Choice>
-        <mc:Fallback>
+        <mc:Fallback xmlns="">
           <p:sp>
             <p:nvSpPr>
               <p:cNvPr id="147" name="TextBox 146">
@@ -16121,8 +16122,8 @@
           </p:sp>
         </mc:Fallback>
       </mc:AlternateContent>
-      <mc:AlternateContent xmlns:mc="http://schemas.openxmlformats.org/markup-compatibility/2006">
-        <mc:Choice xmlns:a14="http://schemas.microsoft.com/office/drawing/2010/main" Requires="a14">
+      <mc:AlternateContent xmlns:mc="http://schemas.openxmlformats.org/markup-compatibility/2006" xmlns:a14="http://schemas.microsoft.com/office/drawing/2010/main">
+        <mc:Choice Requires="a14">
           <p:sp>
             <p:nvSpPr>
               <p:cNvPr id="148" name="TextBox 147">
@@ -16194,7 +16195,7 @@
             </p:txBody>
           </p:sp>
         </mc:Choice>
-        <mc:Fallback>
+        <mc:Fallback xmlns="">
           <p:sp>
             <p:nvSpPr>
               <p:cNvPr id="148" name="TextBox 147">
@@ -16239,8 +16240,8 @@
           </p:sp>
         </mc:Fallback>
       </mc:AlternateContent>
-      <mc:AlternateContent xmlns:mc="http://schemas.openxmlformats.org/markup-compatibility/2006">
-        <mc:Choice xmlns:a14="http://schemas.microsoft.com/office/drawing/2010/main" Requires="a14">
+      <mc:AlternateContent xmlns:mc="http://schemas.openxmlformats.org/markup-compatibility/2006" xmlns:a14="http://schemas.microsoft.com/office/drawing/2010/main">
+        <mc:Choice Requires="a14">
           <p:sp>
             <p:nvSpPr>
               <p:cNvPr id="149" name="TextBox 148">
@@ -16312,7 +16313,7 @@
             </p:txBody>
           </p:sp>
         </mc:Choice>
-        <mc:Fallback>
+        <mc:Fallback xmlns="">
           <p:sp>
             <p:nvSpPr>
               <p:cNvPr id="149" name="TextBox 148">
@@ -16387,10 +16388,3018 @@
           <a:chExt cx="0" cy="0"/>
         </a:xfrm>
       </p:grpSpPr>
+      <p:sp>
+        <p:nvSpPr>
+          <p:cNvPr id="2" name="Rectangle 1">
+            <a:extLst>
+              <a:ext uri="{FF2B5EF4-FFF2-40B4-BE49-F238E27FC236}">
+                <a16:creationId xmlns:a16="http://schemas.microsoft.com/office/drawing/2014/main" id="{2B429804-472F-4016-9C0B-47CAAF472E8B}"/>
+              </a:ext>
+            </a:extLst>
+          </p:cNvPr>
+          <p:cNvSpPr/>
+          <p:nvPr/>
+        </p:nvSpPr>
+        <p:spPr>
+          <a:xfrm rot="5400000">
+            <a:off x="826313" y="3137480"/>
+            <a:ext cx="4496500" cy="738231"/>
+          </a:xfrm>
+          <a:prstGeom prst="rect">
+            <a:avLst/>
+          </a:prstGeom>
+          <a:solidFill>
+            <a:schemeClr val="accent6">
+              <a:lumMod val="40000"/>
+              <a:lumOff val="60000"/>
+            </a:schemeClr>
+          </a:solidFill>
+        </p:spPr>
+        <p:style>
+          <a:lnRef idx="2">
+            <a:schemeClr val="accent1">
+              <a:shade val="50000"/>
+            </a:schemeClr>
+          </a:lnRef>
+          <a:fillRef idx="1">
+            <a:schemeClr val="accent1"/>
+          </a:fillRef>
+          <a:effectRef idx="0">
+            <a:schemeClr val="accent1"/>
+          </a:effectRef>
+          <a:fontRef idx="minor">
+            <a:schemeClr val="lt1"/>
+          </a:fontRef>
+        </p:style>
+        <p:txBody>
+          <a:bodyPr rtlCol="0" anchor="ctr"/>
+          <a:lstStyle/>
+          <a:p>
+            <a:pPr algn="ctr"/>
+            <a:endParaRPr lang="en-US"/>
+          </a:p>
+        </p:txBody>
+      </p:sp>
+      <p:sp>
+        <p:nvSpPr>
+          <p:cNvPr id="3" name="Rectangle 2">
+            <a:extLst>
+              <a:ext uri="{FF2B5EF4-FFF2-40B4-BE49-F238E27FC236}">
+                <a16:creationId xmlns:a16="http://schemas.microsoft.com/office/drawing/2014/main" id="{B12C0825-76E6-4DC6-BBCD-B2AB1683B61D}"/>
+              </a:ext>
+            </a:extLst>
+          </p:cNvPr>
+          <p:cNvSpPr/>
+          <p:nvPr/>
+        </p:nvSpPr>
+        <p:spPr>
+          <a:xfrm rot="5400000">
+            <a:off x="7119455" y="3137480"/>
+            <a:ext cx="4496499" cy="738231"/>
+          </a:xfrm>
+          <a:prstGeom prst="rect">
+            <a:avLst/>
+          </a:prstGeom>
+          <a:solidFill>
+            <a:schemeClr val="accent6">
+              <a:lumMod val="40000"/>
+              <a:lumOff val="60000"/>
+            </a:schemeClr>
+          </a:solidFill>
+        </p:spPr>
+        <p:style>
+          <a:lnRef idx="2">
+            <a:schemeClr val="accent1">
+              <a:shade val="50000"/>
+            </a:schemeClr>
+          </a:lnRef>
+          <a:fillRef idx="1">
+            <a:schemeClr val="accent1"/>
+          </a:fillRef>
+          <a:effectRef idx="0">
+            <a:schemeClr val="accent1"/>
+          </a:effectRef>
+          <a:fontRef idx="minor">
+            <a:schemeClr val="lt1"/>
+          </a:fontRef>
+        </p:style>
+        <p:txBody>
+          <a:bodyPr rtlCol="0" anchor="ctr"/>
+          <a:lstStyle/>
+          <a:p>
+            <a:pPr algn="ctr"/>
+            <a:endParaRPr lang="en-US"/>
+          </a:p>
+        </p:txBody>
+      </p:sp>
+      <p:sp>
+        <p:nvSpPr>
+          <p:cNvPr id="4" name="Rectangle 3">
+            <a:extLst>
+              <a:ext uri="{FF2B5EF4-FFF2-40B4-BE49-F238E27FC236}">
+                <a16:creationId xmlns:a16="http://schemas.microsoft.com/office/drawing/2014/main" id="{2AB06978-F158-441A-9870-CD7CC01F6B7E}"/>
+              </a:ext>
+            </a:extLst>
+          </p:cNvPr>
+          <p:cNvSpPr/>
+          <p:nvPr/>
+        </p:nvSpPr>
+        <p:spPr>
+          <a:xfrm rot="5400000">
+            <a:off x="4566057" y="2259786"/>
+            <a:ext cx="1600197" cy="738231"/>
+          </a:xfrm>
+          <a:prstGeom prst="rect">
+            <a:avLst/>
+          </a:prstGeom>
+          <a:solidFill>
+            <a:schemeClr val="accent4">
+              <a:lumMod val="40000"/>
+              <a:lumOff val="60000"/>
+            </a:schemeClr>
+          </a:solidFill>
+        </p:spPr>
+        <p:style>
+          <a:lnRef idx="2">
+            <a:schemeClr val="accent1">
+              <a:shade val="50000"/>
+            </a:schemeClr>
+          </a:lnRef>
+          <a:fillRef idx="1">
+            <a:schemeClr val="accent1"/>
+          </a:fillRef>
+          <a:effectRef idx="0">
+            <a:schemeClr val="accent1"/>
+          </a:effectRef>
+          <a:fontRef idx="minor">
+            <a:schemeClr val="lt1"/>
+          </a:fontRef>
+        </p:style>
+        <p:txBody>
+          <a:bodyPr rtlCol="0" anchor="ctr"/>
+          <a:lstStyle/>
+          <a:p>
+            <a:pPr algn="ctr"/>
+            <a:endParaRPr lang="en-US"/>
+          </a:p>
+        </p:txBody>
+      </p:sp>
+      <p:sp>
+        <p:nvSpPr>
+          <p:cNvPr id="5" name="Rectangle 4">
+            <a:extLst>
+              <a:ext uri="{FF2B5EF4-FFF2-40B4-BE49-F238E27FC236}">
+                <a16:creationId xmlns:a16="http://schemas.microsoft.com/office/drawing/2014/main" id="{76CE8A68-10F4-4068-8917-47BC239D98FF}"/>
+              </a:ext>
+            </a:extLst>
+          </p:cNvPr>
+          <p:cNvSpPr/>
+          <p:nvPr/>
+        </p:nvSpPr>
+        <p:spPr>
+          <a:xfrm rot="5400000">
+            <a:off x="4566057" y="4131929"/>
+            <a:ext cx="1600197" cy="738231"/>
+          </a:xfrm>
+          <a:prstGeom prst="rect">
+            <a:avLst/>
+          </a:prstGeom>
+          <a:solidFill>
+            <a:schemeClr val="accent4">
+              <a:lumMod val="40000"/>
+              <a:lumOff val="60000"/>
+            </a:schemeClr>
+          </a:solidFill>
+        </p:spPr>
+        <p:style>
+          <a:lnRef idx="2">
+            <a:schemeClr val="accent1">
+              <a:shade val="50000"/>
+            </a:schemeClr>
+          </a:lnRef>
+          <a:fillRef idx="1">
+            <a:schemeClr val="accent1"/>
+          </a:fillRef>
+          <a:effectRef idx="0">
+            <a:schemeClr val="accent1"/>
+          </a:effectRef>
+          <a:fontRef idx="minor">
+            <a:schemeClr val="lt1"/>
+          </a:fontRef>
+        </p:style>
+        <p:txBody>
+          <a:bodyPr rtlCol="0" anchor="ctr"/>
+          <a:lstStyle/>
+          <a:p>
+            <a:pPr algn="ctr"/>
+            <a:endParaRPr lang="en-US"/>
+          </a:p>
+        </p:txBody>
+      </p:sp>
+      <p:sp>
+        <p:nvSpPr>
+          <p:cNvPr id="6" name="Rectangle 5">
+            <a:extLst>
+              <a:ext uri="{FF2B5EF4-FFF2-40B4-BE49-F238E27FC236}">
+                <a16:creationId xmlns:a16="http://schemas.microsoft.com/office/drawing/2014/main" id="{800F0D60-3E07-45AE-BC33-22FDD7AE3F59}"/>
+              </a:ext>
+            </a:extLst>
+          </p:cNvPr>
+          <p:cNvSpPr/>
+          <p:nvPr/>
+        </p:nvSpPr>
+        <p:spPr>
+          <a:xfrm rot="5400000">
+            <a:off x="6012459" y="3137481"/>
+            <a:ext cx="1600197" cy="738231"/>
+          </a:xfrm>
+          <a:prstGeom prst="rect">
+            <a:avLst/>
+          </a:prstGeom>
+          <a:solidFill>
+            <a:schemeClr val="accent4">
+              <a:lumMod val="40000"/>
+              <a:lumOff val="60000"/>
+            </a:schemeClr>
+          </a:solidFill>
+        </p:spPr>
+        <p:style>
+          <a:lnRef idx="2">
+            <a:schemeClr val="accent1">
+              <a:shade val="50000"/>
+            </a:schemeClr>
+          </a:lnRef>
+          <a:fillRef idx="1">
+            <a:schemeClr val="accent1"/>
+          </a:fillRef>
+          <a:effectRef idx="0">
+            <a:schemeClr val="accent1"/>
+          </a:effectRef>
+          <a:fontRef idx="minor">
+            <a:schemeClr val="lt1"/>
+          </a:fontRef>
+        </p:style>
+        <p:txBody>
+          <a:bodyPr rtlCol="0" anchor="ctr"/>
+          <a:lstStyle/>
+          <a:p>
+            <a:pPr algn="ctr"/>
+            <a:endParaRPr lang="en-US"/>
+          </a:p>
+        </p:txBody>
+      </p:sp>
+      <p:sp>
+        <p:nvSpPr>
+          <p:cNvPr id="7" name="Flowchart: Connector 6">
+            <a:extLst>
+              <a:ext uri="{FF2B5EF4-FFF2-40B4-BE49-F238E27FC236}">
+                <a16:creationId xmlns:a16="http://schemas.microsoft.com/office/drawing/2014/main" id="{641FA206-1004-4A5B-8D65-B2A9EBF51919}"/>
+              </a:ext>
+            </a:extLst>
+          </p:cNvPr>
+          <p:cNvSpPr/>
+          <p:nvPr/>
+        </p:nvSpPr>
+        <p:spPr>
+          <a:xfrm>
+            <a:off x="612396" y="2919369"/>
+            <a:ext cx="671120" cy="679508"/>
+          </a:xfrm>
+          <a:prstGeom prst="flowChartConnector">
+            <a:avLst/>
+          </a:prstGeom>
+          <a:solidFill>
+            <a:schemeClr val="accent1">
+              <a:lumMod val="60000"/>
+              <a:lumOff val="40000"/>
+            </a:schemeClr>
+          </a:solidFill>
+        </p:spPr>
+        <p:style>
+          <a:lnRef idx="2">
+            <a:schemeClr val="accent1">
+              <a:shade val="50000"/>
+            </a:schemeClr>
+          </a:lnRef>
+          <a:fillRef idx="1">
+            <a:schemeClr val="accent1"/>
+          </a:fillRef>
+          <a:effectRef idx="0">
+            <a:schemeClr val="accent1"/>
+          </a:effectRef>
+          <a:fontRef idx="minor">
+            <a:schemeClr val="lt1"/>
+          </a:fontRef>
+        </p:style>
+        <p:txBody>
+          <a:bodyPr rtlCol="0" anchor="ctr"/>
+          <a:lstStyle/>
+          <a:p>
+            <a:pPr algn="ctr"/>
+            <a:endParaRPr lang="en-US"/>
+          </a:p>
+        </p:txBody>
+      </p:sp>
+      <p:sp>
+        <p:nvSpPr>
+          <p:cNvPr id="8" name="Flowchart: Connector 7">
+            <a:extLst>
+              <a:ext uri="{FF2B5EF4-FFF2-40B4-BE49-F238E27FC236}">
+                <a16:creationId xmlns:a16="http://schemas.microsoft.com/office/drawing/2014/main" id="{C00AF2C8-6F3A-41F5-AFF2-C4158916894E}"/>
+              </a:ext>
+            </a:extLst>
+          </p:cNvPr>
+          <p:cNvSpPr/>
+          <p:nvPr/>
+        </p:nvSpPr>
+        <p:spPr>
+          <a:xfrm>
+            <a:off x="10619061" y="2919369"/>
+            <a:ext cx="671120" cy="679508"/>
+          </a:xfrm>
+          <a:prstGeom prst="flowChartConnector">
+            <a:avLst/>
+          </a:prstGeom>
+          <a:solidFill>
+            <a:schemeClr val="accent1">
+              <a:lumMod val="60000"/>
+              <a:lumOff val="40000"/>
+            </a:schemeClr>
+          </a:solidFill>
+        </p:spPr>
+        <p:style>
+          <a:lnRef idx="2">
+            <a:schemeClr val="accent1">
+              <a:shade val="50000"/>
+            </a:schemeClr>
+          </a:lnRef>
+          <a:fillRef idx="1">
+            <a:schemeClr val="accent1"/>
+          </a:fillRef>
+          <a:effectRef idx="0">
+            <a:schemeClr val="accent1"/>
+          </a:effectRef>
+          <a:fontRef idx="minor">
+            <a:schemeClr val="lt1"/>
+          </a:fontRef>
+        </p:style>
+        <p:txBody>
+          <a:bodyPr rtlCol="0" anchor="ctr"/>
+          <a:lstStyle/>
+          <a:p>
+            <a:pPr algn="ctr"/>
+            <a:endParaRPr lang="en-US" dirty="0"/>
+          </a:p>
+        </p:txBody>
+      </p:sp>
+      <mc:AlternateContent xmlns:mc="http://schemas.openxmlformats.org/markup-compatibility/2006">
+        <mc:Choice xmlns:a14="http://schemas.microsoft.com/office/drawing/2010/main" Requires="a14">
+          <p:sp>
+            <p:nvSpPr>
+              <p:cNvPr id="9" name="TextBox 8">
+                <a:extLst>
+                  <a:ext uri="{FF2B5EF4-FFF2-40B4-BE49-F238E27FC236}">
+                    <a16:creationId xmlns:a16="http://schemas.microsoft.com/office/drawing/2014/main" id="{6B638EC6-84A6-464E-9501-0320E2FFEF30}"/>
+                  </a:ext>
+                </a:extLst>
+              </p:cNvPr>
+              <p:cNvSpPr txBox="1"/>
+              <p:nvPr/>
+            </p:nvSpPr>
+            <p:spPr>
+              <a:xfrm>
+                <a:off x="856296" y="3120623"/>
+                <a:ext cx="183320" cy="276999"/>
+              </a:xfrm>
+              <a:prstGeom prst="rect">
+                <a:avLst/>
+              </a:prstGeom>
+              <a:noFill/>
+            </p:spPr>
+            <p:txBody>
+              <a:bodyPr wrap="none" lIns="0" tIns="0" rIns="0" bIns="0" rtlCol="0">
+                <a:spAutoFit/>
+              </a:bodyPr>
+              <a:lstStyle/>
+              <a:p>
+                <a14:m>
+                  <m:oMathPara xmlns:m="http://schemas.openxmlformats.org/officeDocument/2006/math">
+                    <m:oMathParaPr>
+                      <m:jc m:val="centerGroup"/>
+                    </m:oMathParaPr>
+                    <m:oMath xmlns:m="http://schemas.openxmlformats.org/officeDocument/2006/math">
+                      <m:r>
+                        <a:rPr lang="en-US" i="1" smtClean="0">
+                          <a:latin typeface="Cambria Math" panose="02040503050406030204" pitchFamily="18" charset="0"/>
+                        </a:rPr>
+                        <m:t>𝑥</m:t>
+                      </m:r>
+                    </m:oMath>
+                  </m:oMathPara>
+                </a14:m>
+                <a:endParaRPr lang="en-US" dirty="0"/>
+              </a:p>
+            </p:txBody>
+          </p:sp>
+        </mc:Choice>
+        <mc:Fallback>
+          <p:sp>
+            <p:nvSpPr>
+              <p:cNvPr id="9" name="TextBox 8">
+                <a:extLst>
+                  <a:ext uri="{FF2B5EF4-FFF2-40B4-BE49-F238E27FC236}">
+                    <a16:creationId xmlns:a16="http://schemas.microsoft.com/office/drawing/2014/main" id="{6B638EC6-84A6-464E-9501-0320E2FFEF30}"/>
+                  </a:ext>
+                </a:extLst>
+              </p:cNvPr>
+              <p:cNvSpPr txBox="1">
+                <a:spLocks noRot="1" noChangeAspect="1" noMove="1" noResize="1" noEditPoints="1" noAdjustHandles="1" noChangeArrowheads="1" noChangeShapeType="1" noTextEdit="1"/>
+              </p:cNvSpPr>
+              <p:nvPr/>
+            </p:nvSpPr>
+            <p:spPr>
+              <a:xfrm>
+                <a:off x="856296" y="3120623"/>
+                <a:ext cx="183320" cy="276999"/>
+              </a:xfrm>
+              <a:prstGeom prst="rect">
+                <a:avLst/>
+              </a:prstGeom>
+              <a:blipFill>
+                <a:blip r:embed="rId2"/>
+                <a:stretch>
+                  <a:fillRect l="-19355" r="-9677"/>
+                </a:stretch>
+              </a:blipFill>
+            </p:spPr>
+            <p:txBody>
+              <a:bodyPr/>
+              <a:lstStyle/>
+              <a:p>
+                <a:r>
+                  <a:rPr lang="en-US">
+                    <a:noFill/>
+                  </a:rPr>
+                  <a:t> </a:t>
+                </a:r>
+              </a:p>
+            </p:txBody>
+          </p:sp>
+        </mc:Fallback>
+      </mc:AlternateContent>
+      <mc:AlternateContent xmlns:mc="http://schemas.openxmlformats.org/markup-compatibility/2006">
+        <mc:Choice xmlns:a14="http://schemas.microsoft.com/office/drawing/2010/main" Requires="a14">
+          <p:sp>
+            <p:nvSpPr>
+              <p:cNvPr id="10" name="TextBox 9">
+                <a:extLst>
+                  <a:ext uri="{FF2B5EF4-FFF2-40B4-BE49-F238E27FC236}">
+                    <a16:creationId xmlns:a16="http://schemas.microsoft.com/office/drawing/2014/main" id="{1B8B916A-36F0-43DF-BA3F-FDB18CE361DD}"/>
+                  </a:ext>
+                </a:extLst>
+              </p:cNvPr>
+              <p:cNvSpPr txBox="1"/>
+              <p:nvPr/>
+            </p:nvSpPr>
+            <p:spPr>
+              <a:xfrm>
+                <a:off x="10861262" y="3120622"/>
+                <a:ext cx="186718" cy="276999"/>
+              </a:xfrm>
+              <a:prstGeom prst="rect">
+                <a:avLst/>
+              </a:prstGeom>
+              <a:noFill/>
+            </p:spPr>
+            <p:txBody>
+              <a:bodyPr wrap="none" lIns="0" tIns="0" rIns="0" bIns="0" rtlCol="0">
+                <a:spAutoFit/>
+              </a:bodyPr>
+              <a:lstStyle/>
+              <a:p>
+                <a14:m>
+                  <m:oMathPara xmlns:m="http://schemas.openxmlformats.org/officeDocument/2006/math">
+                    <m:oMathParaPr>
+                      <m:jc m:val="centerGroup"/>
+                    </m:oMathParaPr>
+                    <m:oMath xmlns:m="http://schemas.openxmlformats.org/officeDocument/2006/math">
+                      <m:r>
+                        <a:rPr lang="en-US" i="1" smtClean="0">
+                          <a:latin typeface="Cambria Math" panose="02040503050406030204" pitchFamily="18" charset="0"/>
+                        </a:rPr>
+                        <m:t>𝑦</m:t>
+                      </m:r>
+                    </m:oMath>
+                  </m:oMathPara>
+                </a14:m>
+                <a:endParaRPr lang="en-US" dirty="0"/>
+              </a:p>
+            </p:txBody>
+          </p:sp>
+        </mc:Choice>
+        <mc:Fallback>
+          <p:sp>
+            <p:nvSpPr>
+              <p:cNvPr id="10" name="TextBox 9">
+                <a:extLst>
+                  <a:ext uri="{FF2B5EF4-FFF2-40B4-BE49-F238E27FC236}">
+                    <a16:creationId xmlns:a16="http://schemas.microsoft.com/office/drawing/2014/main" id="{1B8B916A-36F0-43DF-BA3F-FDB18CE361DD}"/>
+                  </a:ext>
+                </a:extLst>
+              </p:cNvPr>
+              <p:cNvSpPr txBox="1">
+                <a:spLocks noRot="1" noChangeAspect="1" noMove="1" noResize="1" noEditPoints="1" noAdjustHandles="1" noChangeArrowheads="1" noChangeShapeType="1" noTextEdit="1"/>
+              </p:cNvSpPr>
+              <p:nvPr/>
+            </p:nvSpPr>
+            <p:spPr>
+              <a:xfrm>
+                <a:off x="10861262" y="3120622"/>
+                <a:ext cx="186718" cy="276999"/>
+              </a:xfrm>
+              <a:prstGeom prst="rect">
+                <a:avLst/>
+              </a:prstGeom>
+              <a:blipFill>
+                <a:blip r:embed="rId3"/>
+                <a:stretch>
+                  <a:fillRect l="-33333" r="-30000" b="-26667"/>
+                </a:stretch>
+              </a:blipFill>
+            </p:spPr>
+            <p:txBody>
+              <a:bodyPr/>
+              <a:lstStyle/>
+              <a:p>
+                <a:r>
+                  <a:rPr lang="en-US">
+                    <a:noFill/>
+                  </a:rPr>
+                  <a:t> </a:t>
+                </a:r>
+              </a:p>
+            </p:txBody>
+          </p:sp>
+        </mc:Fallback>
+      </mc:AlternateContent>
+      <mc:AlternateContent xmlns:mc="http://schemas.openxmlformats.org/markup-compatibility/2006">
+        <mc:Choice xmlns:a14="http://schemas.microsoft.com/office/drawing/2010/main" Requires="a14">
+          <p:sp>
+            <p:nvSpPr>
+              <p:cNvPr id="11" name="TextBox 10">
+                <a:extLst>
+                  <a:ext uri="{FF2B5EF4-FFF2-40B4-BE49-F238E27FC236}">
+                    <a16:creationId xmlns:a16="http://schemas.microsoft.com/office/drawing/2014/main" id="{49B65DA0-ABA4-43EB-8FFF-192E0827CCFD}"/>
+                  </a:ext>
+                </a:extLst>
+              </p:cNvPr>
+              <p:cNvSpPr txBox="1"/>
+              <p:nvPr/>
+            </p:nvSpPr>
+            <p:spPr>
+              <a:xfrm>
+                <a:off x="5273277" y="2567998"/>
+                <a:ext cx="185756" cy="276999"/>
+              </a:xfrm>
+              <a:prstGeom prst="rect">
+                <a:avLst/>
+              </a:prstGeom>
+              <a:noFill/>
+            </p:spPr>
+            <p:txBody>
+              <a:bodyPr wrap="none" lIns="0" tIns="0" rIns="0" bIns="0" rtlCol="0">
+                <a:spAutoFit/>
+              </a:bodyPr>
+              <a:lstStyle/>
+              <a:p>
+                <a14:m>
+                  <m:oMathPara xmlns:m="http://schemas.openxmlformats.org/officeDocument/2006/math">
+                    <m:oMathParaPr>
+                      <m:jc m:val="centerGroup"/>
+                    </m:oMathParaPr>
+                    <m:oMath xmlns:m="http://schemas.openxmlformats.org/officeDocument/2006/math">
+                      <m:r>
+                        <a:rPr lang="en-US" i="1" smtClean="0">
+                          <a:latin typeface="Cambria Math" panose="02040503050406030204" pitchFamily="18" charset="0"/>
+                        </a:rPr>
+                        <m:t>𝜇</m:t>
+                      </m:r>
+                    </m:oMath>
+                  </m:oMathPara>
+                </a14:m>
+                <a:endParaRPr lang="en-US" dirty="0"/>
+              </a:p>
+            </p:txBody>
+          </p:sp>
+        </mc:Choice>
+        <mc:Fallback>
+          <p:sp>
+            <p:nvSpPr>
+              <p:cNvPr id="11" name="TextBox 10">
+                <a:extLst>
+                  <a:ext uri="{FF2B5EF4-FFF2-40B4-BE49-F238E27FC236}">
+                    <a16:creationId xmlns:a16="http://schemas.microsoft.com/office/drawing/2014/main" id="{49B65DA0-ABA4-43EB-8FFF-192E0827CCFD}"/>
+                  </a:ext>
+                </a:extLst>
+              </p:cNvPr>
+              <p:cNvSpPr txBox="1">
+                <a:spLocks noRot="1" noChangeAspect="1" noMove="1" noResize="1" noEditPoints="1" noAdjustHandles="1" noChangeArrowheads="1" noChangeShapeType="1" noTextEdit="1"/>
+              </p:cNvSpPr>
+              <p:nvPr/>
+            </p:nvSpPr>
+            <p:spPr>
+              <a:xfrm>
+                <a:off x="5273277" y="2567998"/>
+                <a:ext cx="185756" cy="276999"/>
+              </a:xfrm>
+              <a:prstGeom prst="rect">
+                <a:avLst/>
+              </a:prstGeom>
+              <a:blipFill>
+                <a:blip r:embed="rId4"/>
+                <a:stretch>
+                  <a:fillRect l="-29032" r="-25806" b="-21739"/>
+                </a:stretch>
+              </a:blipFill>
+            </p:spPr>
+            <p:txBody>
+              <a:bodyPr/>
+              <a:lstStyle/>
+              <a:p>
+                <a:r>
+                  <a:rPr lang="en-US">
+                    <a:noFill/>
+                  </a:rPr>
+                  <a:t> </a:t>
+                </a:r>
+              </a:p>
+            </p:txBody>
+          </p:sp>
+        </mc:Fallback>
+      </mc:AlternateContent>
+      <mc:AlternateContent xmlns:mc="http://schemas.openxmlformats.org/markup-compatibility/2006">
+        <mc:Choice xmlns:a14="http://schemas.microsoft.com/office/drawing/2010/main" Requires="a14">
+          <p:sp>
+            <p:nvSpPr>
+              <p:cNvPr id="12" name="TextBox 11">
+                <a:extLst>
+                  <a:ext uri="{FF2B5EF4-FFF2-40B4-BE49-F238E27FC236}">
+                    <a16:creationId xmlns:a16="http://schemas.microsoft.com/office/drawing/2014/main" id="{0E1EFFE0-97E6-495A-A085-BADDCE40C871}"/>
+                  </a:ext>
+                </a:extLst>
+              </p:cNvPr>
+              <p:cNvSpPr txBox="1"/>
+              <p:nvPr/>
+            </p:nvSpPr>
+            <p:spPr>
+              <a:xfrm>
+                <a:off x="5278867" y="4306695"/>
+                <a:ext cx="193194" cy="276999"/>
+              </a:xfrm>
+              <a:prstGeom prst="rect">
+                <a:avLst/>
+              </a:prstGeom>
+              <a:noFill/>
+            </p:spPr>
+            <p:txBody>
+              <a:bodyPr wrap="none" lIns="0" tIns="0" rIns="0" bIns="0" rtlCol="0">
+                <a:spAutoFit/>
+              </a:bodyPr>
+              <a:lstStyle/>
+              <a:p>
+                <a14:m>
+                  <m:oMathPara xmlns:m="http://schemas.openxmlformats.org/officeDocument/2006/math">
+                    <m:oMathParaPr>
+                      <m:jc m:val="centerGroup"/>
+                    </m:oMathParaPr>
+                    <m:oMath xmlns:m="http://schemas.openxmlformats.org/officeDocument/2006/math">
+                      <m:r>
+                        <a:rPr lang="en-US" i="1" smtClean="0">
+                          <a:latin typeface="Cambria Math" panose="02040503050406030204" pitchFamily="18" charset="0"/>
+                        </a:rPr>
+                        <m:t>𝜎</m:t>
+                      </m:r>
+                    </m:oMath>
+                  </m:oMathPara>
+                </a14:m>
+                <a:endParaRPr lang="en-US" dirty="0"/>
+              </a:p>
+            </p:txBody>
+          </p:sp>
+        </mc:Choice>
+        <mc:Fallback>
+          <p:sp>
+            <p:nvSpPr>
+              <p:cNvPr id="12" name="TextBox 11">
+                <a:extLst>
+                  <a:ext uri="{FF2B5EF4-FFF2-40B4-BE49-F238E27FC236}">
+                    <a16:creationId xmlns:a16="http://schemas.microsoft.com/office/drawing/2014/main" id="{0E1EFFE0-97E6-495A-A085-BADDCE40C871}"/>
+                  </a:ext>
+                </a:extLst>
+              </p:cNvPr>
+              <p:cNvSpPr txBox="1">
+                <a:spLocks noRot="1" noChangeAspect="1" noMove="1" noResize="1" noEditPoints="1" noAdjustHandles="1" noChangeArrowheads="1" noChangeShapeType="1" noTextEdit="1"/>
+              </p:cNvSpPr>
+              <p:nvPr/>
+            </p:nvSpPr>
+            <p:spPr>
+              <a:xfrm>
+                <a:off x="5278867" y="4306695"/>
+                <a:ext cx="193194" cy="276999"/>
+              </a:xfrm>
+              <a:prstGeom prst="rect">
+                <a:avLst/>
+              </a:prstGeom>
+              <a:blipFill>
+                <a:blip r:embed="rId5"/>
+                <a:stretch>
+                  <a:fillRect l="-18750" r="-12500"/>
+                </a:stretch>
+              </a:blipFill>
+            </p:spPr>
+            <p:txBody>
+              <a:bodyPr/>
+              <a:lstStyle/>
+              <a:p>
+                <a:r>
+                  <a:rPr lang="en-US">
+                    <a:noFill/>
+                  </a:rPr>
+                  <a:t> </a:t>
+                </a:r>
+              </a:p>
+            </p:txBody>
+          </p:sp>
+        </mc:Fallback>
+      </mc:AlternateContent>
+      <mc:AlternateContent xmlns:mc="http://schemas.openxmlformats.org/markup-compatibility/2006">
+        <mc:Choice xmlns:a14="http://schemas.microsoft.com/office/drawing/2010/main" Requires="a14">
+          <p:sp>
+            <p:nvSpPr>
+              <p:cNvPr id="13" name="TextBox 12">
+                <a:extLst>
+                  <a:ext uri="{FF2B5EF4-FFF2-40B4-BE49-F238E27FC236}">
+                    <a16:creationId xmlns:a16="http://schemas.microsoft.com/office/drawing/2014/main" id="{6C4675BE-9B25-468A-BDE8-E9A7834AEC4C}"/>
+                  </a:ext>
+                </a:extLst>
+              </p:cNvPr>
+              <p:cNvSpPr txBox="1"/>
+              <p:nvPr/>
+            </p:nvSpPr>
+            <p:spPr>
+              <a:xfrm>
+                <a:off x="6728014" y="3368095"/>
+                <a:ext cx="169085" cy="276999"/>
+              </a:xfrm>
+              <a:prstGeom prst="rect">
+                <a:avLst/>
+              </a:prstGeom>
+              <a:noFill/>
+            </p:spPr>
+            <p:txBody>
+              <a:bodyPr wrap="none" lIns="0" tIns="0" rIns="0" bIns="0" rtlCol="0">
+                <a:spAutoFit/>
+              </a:bodyPr>
+              <a:lstStyle/>
+              <a:p>
+                <a14:m>
+                  <m:oMathPara xmlns:m="http://schemas.openxmlformats.org/officeDocument/2006/math">
+                    <m:oMathParaPr>
+                      <m:jc m:val="centerGroup"/>
+                    </m:oMathParaPr>
+                    <m:oMath xmlns:m="http://schemas.openxmlformats.org/officeDocument/2006/math">
+                      <m:r>
+                        <a:rPr lang="en-US" i="1" smtClean="0">
+                          <a:latin typeface="Cambria Math" panose="02040503050406030204" pitchFamily="18" charset="0"/>
+                        </a:rPr>
+                        <m:t>𝑧</m:t>
+                      </m:r>
+                    </m:oMath>
+                  </m:oMathPara>
+                </a14:m>
+                <a:endParaRPr lang="en-US" dirty="0"/>
+              </a:p>
+            </p:txBody>
+          </p:sp>
+        </mc:Choice>
+        <mc:Fallback>
+          <p:sp>
+            <p:nvSpPr>
+              <p:cNvPr id="13" name="TextBox 12">
+                <a:extLst>
+                  <a:ext uri="{FF2B5EF4-FFF2-40B4-BE49-F238E27FC236}">
+                    <a16:creationId xmlns:a16="http://schemas.microsoft.com/office/drawing/2014/main" id="{6C4675BE-9B25-468A-BDE8-E9A7834AEC4C}"/>
+                  </a:ext>
+                </a:extLst>
+              </p:cNvPr>
+              <p:cNvSpPr txBox="1">
+                <a:spLocks noRot="1" noChangeAspect="1" noMove="1" noResize="1" noEditPoints="1" noAdjustHandles="1" noChangeArrowheads="1" noChangeShapeType="1" noTextEdit="1"/>
+              </p:cNvSpPr>
+              <p:nvPr/>
+            </p:nvSpPr>
+            <p:spPr>
+              <a:xfrm>
+                <a:off x="6728014" y="3368095"/>
+                <a:ext cx="169085" cy="276999"/>
+              </a:xfrm>
+              <a:prstGeom prst="rect">
+                <a:avLst/>
+              </a:prstGeom>
+              <a:blipFill>
+                <a:blip r:embed="rId6"/>
+                <a:stretch>
+                  <a:fillRect l="-22222" r="-18519"/>
+                </a:stretch>
+              </a:blipFill>
+            </p:spPr>
+            <p:txBody>
+              <a:bodyPr/>
+              <a:lstStyle/>
+              <a:p>
+                <a:r>
+                  <a:rPr lang="en-US">
+                    <a:noFill/>
+                  </a:rPr>
+                  <a:t> </a:t>
+                </a:r>
+              </a:p>
+            </p:txBody>
+          </p:sp>
+        </mc:Fallback>
+      </mc:AlternateContent>
+      <p:cxnSp>
+        <p:nvCxnSpPr>
+          <p:cNvPr id="15" name="Straight Arrow Connector 14">
+            <a:extLst>
+              <a:ext uri="{FF2B5EF4-FFF2-40B4-BE49-F238E27FC236}">
+                <a16:creationId xmlns:a16="http://schemas.microsoft.com/office/drawing/2014/main" id="{BF793218-FAE7-45A6-85FF-1686E06E8AE6}"/>
+              </a:ext>
+            </a:extLst>
+          </p:cNvPr>
+          <p:cNvCxnSpPr/>
+          <p:nvPr/>
+        </p:nvCxnSpPr>
+        <p:spPr>
+          <a:xfrm>
+            <a:off x="3443679" y="2628901"/>
+            <a:ext cx="1405158" cy="0"/>
+          </a:xfrm>
+          <a:prstGeom prst="straightConnector1">
+            <a:avLst/>
+          </a:prstGeom>
+          <a:ln>
+            <a:tailEnd type="triangle"/>
+          </a:ln>
+        </p:spPr>
+        <p:style>
+          <a:lnRef idx="1">
+            <a:schemeClr val="accent1"/>
+          </a:lnRef>
+          <a:fillRef idx="0">
+            <a:schemeClr val="accent1"/>
+          </a:fillRef>
+          <a:effectRef idx="0">
+            <a:schemeClr val="accent1"/>
+          </a:effectRef>
+          <a:fontRef idx="minor">
+            <a:schemeClr val="tx1"/>
+          </a:fontRef>
+        </p:style>
+      </p:cxnSp>
+      <p:cxnSp>
+        <p:nvCxnSpPr>
+          <p:cNvPr id="16" name="Straight Arrow Connector 15">
+            <a:extLst>
+              <a:ext uri="{FF2B5EF4-FFF2-40B4-BE49-F238E27FC236}">
+                <a16:creationId xmlns:a16="http://schemas.microsoft.com/office/drawing/2014/main" id="{9D320E32-983B-41D3-9933-975E7365114D}"/>
+              </a:ext>
+            </a:extLst>
+          </p:cNvPr>
+          <p:cNvCxnSpPr/>
+          <p:nvPr/>
+        </p:nvCxnSpPr>
+        <p:spPr>
+          <a:xfrm>
+            <a:off x="3443679" y="4501044"/>
+            <a:ext cx="1405158" cy="0"/>
+          </a:xfrm>
+          <a:prstGeom prst="straightConnector1">
+            <a:avLst/>
+          </a:prstGeom>
+          <a:ln>
+            <a:tailEnd type="triangle"/>
+          </a:ln>
+        </p:spPr>
+        <p:style>
+          <a:lnRef idx="1">
+            <a:schemeClr val="accent1"/>
+          </a:lnRef>
+          <a:fillRef idx="0">
+            <a:schemeClr val="accent1"/>
+          </a:fillRef>
+          <a:effectRef idx="0">
+            <a:schemeClr val="accent1"/>
+          </a:effectRef>
+          <a:fontRef idx="minor">
+            <a:schemeClr val="tx1"/>
+          </a:fontRef>
+        </p:style>
+      </p:cxnSp>
+      <p:cxnSp>
+        <p:nvCxnSpPr>
+          <p:cNvPr id="19" name="Connector: Elbow 18">
+            <a:extLst>
+              <a:ext uri="{FF2B5EF4-FFF2-40B4-BE49-F238E27FC236}">
+                <a16:creationId xmlns:a16="http://schemas.microsoft.com/office/drawing/2014/main" id="{EAB6A96B-777F-4FCD-9163-E178388C74DB}"/>
+              </a:ext>
+            </a:extLst>
+          </p:cNvPr>
+          <p:cNvCxnSpPr>
+            <a:stCxn id="4" idx="0"/>
+          </p:cNvCxnSpPr>
+          <p:nvPr/>
+        </p:nvCxnSpPr>
+        <p:spPr>
+          <a:xfrm>
+            <a:off x="5735271" y="2628902"/>
+            <a:ext cx="708171" cy="491720"/>
+          </a:xfrm>
+          <a:prstGeom prst="bentConnector3">
+            <a:avLst/>
+          </a:prstGeom>
+          <a:ln>
+            <a:tailEnd type="triangle"/>
+          </a:ln>
+        </p:spPr>
+        <p:style>
+          <a:lnRef idx="1">
+            <a:schemeClr val="accent1"/>
+          </a:lnRef>
+          <a:fillRef idx="0">
+            <a:schemeClr val="accent1"/>
+          </a:fillRef>
+          <a:effectRef idx="0">
+            <a:schemeClr val="accent1"/>
+          </a:effectRef>
+          <a:fontRef idx="minor">
+            <a:schemeClr val="tx1"/>
+          </a:fontRef>
+        </p:style>
+      </p:cxnSp>
+      <p:cxnSp>
+        <p:nvCxnSpPr>
+          <p:cNvPr id="21" name="Connector: Elbow 20">
+            <a:extLst>
+              <a:ext uri="{FF2B5EF4-FFF2-40B4-BE49-F238E27FC236}">
+                <a16:creationId xmlns:a16="http://schemas.microsoft.com/office/drawing/2014/main" id="{8E586E7C-3BFF-4857-B400-A095DD5582E6}"/>
+              </a:ext>
+            </a:extLst>
+          </p:cNvPr>
+          <p:cNvCxnSpPr>
+            <a:stCxn id="5" idx="0"/>
+            <a:endCxn id="6" idx="2"/>
+          </p:cNvCxnSpPr>
+          <p:nvPr/>
+        </p:nvCxnSpPr>
+        <p:spPr>
+          <a:xfrm flipV="1">
+            <a:off x="5735271" y="3506597"/>
+            <a:ext cx="708171" cy="994448"/>
+          </a:xfrm>
+          <a:prstGeom prst="bentConnector5">
+            <a:avLst>
+              <a:gd name="adj1" fmla="val 32280"/>
+              <a:gd name="adj2" fmla="val 50000"/>
+              <a:gd name="adj3" fmla="val 67720"/>
+            </a:avLst>
+          </a:prstGeom>
+          <a:ln>
+            <a:tailEnd type="triangle"/>
+          </a:ln>
+        </p:spPr>
+        <p:style>
+          <a:lnRef idx="1">
+            <a:schemeClr val="accent1"/>
+          </a:lnRef>
+          <a:fillRef idx="0">
+            <a:schemeClr val="accent1"/>
+          </a:fillRef>
+          <a:effectRef idx="0">
+            <a:schemeClr val="accent1"/>
+          </a:effectRef>
+          <a:fontRef idx="minor">
+            <a:schemeClr val="tx1"/>
+          </a:fontRef>
+        </p:style>
+      </p:cxnSp>
+      <p:cxnSp>
+        <p:nvCxnSpPr>
+          <p:cNvPr id="23" name="Straight Arrow Connector 22">
+            <a:extLst>
+              <a:ext uri="{FF2B5EF4-FFF2-40B4-BE49-F238E27FC236}">
+                <a16:creationId xmlns:a16="http://schemas.microsoft.com/office/drawing/2014/main" id="{4CA8D7B3-8F08-475F-BFAC-755BF9C83899}"/>
+              </a:ext>
+            </a:extLst>
+          </p:cNvPr>
+          <p:cNvCxnSpPr>
+            <a:stCxn id="6" idx="0"/>
+          </p:cNvCxnSpPr>
+          <p:nvPr/>
+        </p:nvCxnSpPr>
+        <p:spPr>
+          <a:xfrm flipV="1">
+            <a:off x="7181673" y="3506594"/>
+            <a:ext cx="1643545" cy="3"/>
+          </a:xfrm>
+          <a:prstGeom prst="straightConnector1">
+            <a:avLst/>
+          </a:prstGeom>
+          <a:ln>
+            <a:tailEnd type="triangle"/>
+          </a:ln>
+        </p:spPr>
+        <p:style>
+          <a:lnRef idx="1">
+            <a:schemeClr val="accent1"/>
+          </a:lnRef>
+          <a:fillRef idx="0">
+            <a:schemeClr val="accent1"/>
+          </a:fillRef>
+          <a:effectRef idx="0">
+            <a:schemeClr val="accent1"/>
+          </a:effectRef>
+          <a:fontRef idx="minor">
+            <a:schemeClr val="tx1"/>
+          </a:fontRef>
+        </p:style>
+      </p:cxnSp>
+      <p:sp>
+        <p:nvSpPr>
+          <p:cNvPr id="24" name="TextBox 23">
+            <a:extLst>
+              <a:ext uri="{FF2B5EF4-FFF2-40B4-BE49-F238E27FC236}">
+                <a16:creationId xmlns:a16="http://schemas.microsoft.com/office/drawing/2014/main" id="{35F67EAC-7D2D-4C51-9F67-EA23DDA346D2}"/>
+              </a:ext>
+            </a:extLst>
+          </p:cNvPr>
+          <p:cNvSpPr txBox="1"/>
+          <p:nvPr/>
+        </p:nvSpPr>
+        <p:spPr>
+          <a:xfrm>
+            <a:off x="420776" y="704458"/>
+            <a:ext cx="1219443" cy="369332"/>
+          </a:xfrm>
+          <a:prstGeom prst="rect">
+            <a:avLst/>
+          </a:prstGeom>
+          <a:noFill/>
+        </p:spPr>
+        <p:txBody>
+          <a:bodyPr wrap="square" rtlCol="0">
+            <a:spAutoFit/>
+          </a:bodyPr>
+          <a:lstStyle/>
+          <a:p>
+            <a:r>
+              <a:rPr lang="en-US" dirty="0"/>
+              <a:t>Input Data</a:t>
+            </a:r>
+          </a:p>
+        </p:txBody>
+      </p:sp>
+      <p:sp>
+        <p:nvSpPr>
+          <p:cNvPr id="25" name="TextBox 24">
+            <a:extLst>
+              <a:ext uri="{FF2B5EF4-FFF2-40B4-BE49-F238E27FC236}">
+                <a16:creationId xmlns:a16="http://schemas.microsoft.com/office/drawing/2014/main" id="{264622B7-EB31-42E8-9471-04DC55645B71}"/>
+              </a:ext>
+            </a:extLst>
+          </p:cNvPr>
+          <p:cNvSpPr txBox="1"/>
+          <p:nvPr/>
+        </p:nvSpPr>
+        <p:spPr>
+          <a:xfrm>
+            <a:off x="2620984" y="733822"/>
+            <a:ext cx="1025201" cy="369332"/>
+          </a:xfrm>
+          <a:prstGeom prst="rect">
+            <a:avLst/>
+          </a:prstGeom>
+          <a:noFill/>
+        </p:spPr>
+        <p:txBody>
+          <a:bodyPr wrap="square" rtlCol="0">
+            <a:spAutoFit/>
+          </a:bodyPr>
+          <a:lstStyle/>
+          <a:p>
+            <a:r>
+              <a:rPr lang="en-US" dirty="0"/>
+              <a:t>Encoder</a:t>
+            </a:r>
+          </a:p>
+        </p:txBody>
+      </p:sp>
+      <p:sp>
+        <p:nvSpPr>
+          <p:cNvPr id="26" name="TextBox 25">
+            <a:extLst>
+              <a:ext uri="{FF2B5EF4-FFF2-40B4-BE49-F238E27FC236}">
+                <a16:creationId xmlns:a16="http://schemas.microsoft.com/office/drawing/2014/main" id="{3DAF10FB-1063-4D7E-8BCD-48F0FEA540CC}"/>
+              </a:ext>
+            </a:extLst>
+          </p:cNvPr>
+          <p:cNvSpPr txBox="1"/>
+          <p:nvPr/>
+        </p:nvSpPr>
+        <p:spPr>
+          <a:xfrm>
+            <a:off x="10535379" y="762747"/>
+            <a:ext cx="1025201" cy="369332"/>
+          </a:xfrm>
+          <a:prstGeom prst="rect">
+            <a:avLst/>
+          </a:prstGeom>
+          <a:noFill/>
+        </p:spPr>
+        <p:txBody>
+          <a:bodyPr wrap="square" rtlCol="0">
+            <a:spAutoFit/>
+          </a:bodyPr>
+          <a:lstStyle/>
+          <a:p>
+            <a:r>
+              <a:rPr lang="en-US" dirty="0"/>
+              <a:t>Output</a:t>
+            </a:r>
+          </a:p>
+        </p:txBody>
+      </p:sp>
+      <p:sp>
+        <p:nvSpPr>
+          <p:cNvPr id="27" name="TextBox 26">
+            <a:extLst>
+              <a:ext uri="{FF2B5EF4-FFF2-40B4-BE49-F238E27FC236}">
+                <a16:creationId xmlns:a16="http://schemas.microsoft.com/office/drawing/2014/main" id="{B8111BD2-4DE1-4585-8E56-67773108B399}"/>
+              </a:ext>
+            </a:extLst>
+          </p:cNvPr>
+          <p:cNvSpPr txBox="1"/>
+          <p:nvPr/>
+        </p:nvSpPr>
+        <p:spPr>
+          <a:xfrm>
+            <a:off x="8998589" y="762747"/>
+            <a:ext cx="1025201" cy="369332"/>
+          </a:xfrm>
+          <a:prstGeom prst="rect">
+            <a:avLst/>
+          </a:prstGeom>
+          <a:noFill/>
+        </p:spPr>
+        <p:txBody>
+          <a:bodyPr wrap="square" rtlCol="0">
+            <a:spAutoFit/>
+          </a:bodyPr>
+          <a:lstStyle/>
+          <a:p>
+            <a:r>
+              <a:rPr lang="en-US" dirty="0"/>
+              <a:t>Decoder</a:t>
+            </a:r>
+          </a:p>
+        </p:txBody>
+      </p:sp>
+      <p:sp>
+        <p:nvSpPr>
+          <p:cNvPr id="28" name="TextBox 27">
+            <a:extLst>
+              <a:ext uri="{FF2B5EF4-FFF2-40B4-BE49-F238E27FC236}">
+                <a16:creationId xmlns:a16="http://schemas.microsoft.com/office/drawing/2014/main" id="{19384CA9-2DDF-4D22-AE6B-EEAE45898B8D}"/>
+              </a:ext>
+            </a:extLst>
+          </p:cNvPr>
+          <p:cNvSpPr txBox="1"/>
+          <p:nvPr/>
+        </p:nvSpPr>
+        <p:spPr>
+          <a:xfrm>
+            <a:off x="4861655" y="762747"/>
+            <a:ext cx="1368846" cy="369332"/>
+          </a:xfrm>
+          <a:prstGeom prst="rect">
+            <a:avLst/>
+          </a:prstGeom>
+          <a:noFill/>
+        </p:spPr>
+        <p:txBody>
+          <a:bodyPr wrap="square" rtlCol="0">
+            <a:spAutoFit/>
+          </a:bodyPr>
+          <a:lstStyle/>
+          <a:p>
+            <a:r>
+              <a:rPr lang="en-US" dirty="0"/>
+              <a:t>Latent Space</a:t>
+            </a:r>
+          </a:p>
+        </p:txBody>
+      </p:sp>
+      <p:cxnSp>
+        <p:nvCxnSpPr>
+          <p:cNvPr id="32" name="Straight Arrow Connector 31">
+            <a:extLst>
+              <a:ext uri="{FF2B5EF4-FFF2-40B4-BE49-F238E27FC236}">
+                <a16:creationId xmlns:a16="http://schemas.microsoft.com/office/drawing/2014/main" id="{5AFBEF62-1E9C-4916-9048-82CF48DFD3C3}"/>
+              </a:ext>
+            </a:extLst>
+          </p:cNvPr>
+          <p:cNvCxnSpPr>
+            <a:stCxn id="7" idx="6"/>
+          </p:cNvCxnSpPr>
+          <p:nvPr/>
+        </p:nvCxnSpPr>
+        <p:spPr>
+          <a:xfrm>
+            <a:off x="1283516" y="3259123"/>
+            <a:ext cx="1337468" cy="12583"/>
+          </a:xfrm>
+          <a:prstGeom prst="straightConnector1">
+            <a:avLst/>
+          </a:prstGeom>
+          <a:ln>
+            <a:tailEnd type="triangle"/>
+          </a:ln>
+        </p:spPr>
+        <p:style>
+          <a:lnRef idx="1">
+            <a:schemeClr val="accent1"/>
+          </a:lnRef>
+          <a:fillRef idx="0">
+            <a:schemeClr val="accent1"/>
+          </a:fillRef>
+          <a:effectRef idx="0">
+            <a:schemeClr val="accent1"/>
+          </a:effectRef>
+          <a:fontRef idx="minor">
+            <a:schemeClr val="tx1"/>
+          </a:fontRef>
+        </p:style>
+      </p:cxnSp>
+      <p:cxnSp>
+        <p:nvCxnSpPr>
+          <p:cNvPr id="33" name="Straight Arrow Connector 32">
+            <a:extLst>
+              <a:ext uri="{FF2B5EF4-FFF2-40B4-BE49-F238E27FC236}">
+                <a16:creationId xmlns:a16="http://schemas.microsoft.com/office/drawing/2014/main" id="{7ECD73B7-0157-4EB0-B608-C3F2C0B1F9C9}"/>
+              </a:ext>
+            </a:extLst>
+          </p:cNvPr>
+          <p:cNvCxnSpPr>
+            <a:cxnSpLocks/>
+          </p:cNvCxnSpPr>
+          <p:nvPr/>
+        </p:nvCxnSpPr>
+        <p:spPr>
+          <a:xfrm>
+            <a:off x="9736820" y="3252829"/>
+            <a:ext cx="798559" cy="0"/>
+          </a:xfrm>
+          <a:prstGeom prst="straightConnector1">
+            <a:avLst/>
+          </a:prstGeom>
+          <a:ln>
+            <a:tailEnd type="triangle"/>
+          </a:ln>
+        </p:spPr>
+        <p:style>
+          <a:lnRef idx="1">
+            <a:schemeClr val="accent1"/>
+          </a:lnRef>
+          <a:fillRef idx="0">
+            <a:schemeClr val="accent1"/>
+          </a:fillRef>
+          <a:effectRef idx="0">
+            <a:schemeClr val="accent1"/>
+          </a:effectRef>
+          <a:fontRef idx="minor">
+            <a:schemeClr val="tx1"/>
+          </a:fontRef>
+        </p:style>
+      </p:cxnSp>
     </p:spTree>
     <p:extLst>
       <p:ext uri="{BB962C8B-B14F-4D97-AF65-F5344CB8AC3E}">
         <p14:creationId xmlns:p14="http://schemas.microsoft.com/office/powerpoint/2010/main" val="1595636161"/>
+      </p:ext>
+    </p:extLst>
+  </p:cSld>
+  <p:clrMapOvr>
+    <a:masterClrMapping/>
+  </p:clrMapOvr>
+</p:sld>
+</file>
+
+<file path=ppt/slides/slide5.xml><?xml version="1.0" encoding="utf-8"?>
+<p:sld xmlns:a="http://schemas.openxmlformats.org/drawingml/2006/main" xmlns:r="http://schemas.openxmlformats.org/officeDocument/2006/relationships" xmlns:p="http://schemas.openxmlformats.org/presentationml/2006/main">
+  <p:cSld>
+    <p:spTree>
+      <p:nvGrpSpPr>
+        <p:cNvPr id="1" name=""/>
+        <p:cNvGrpSpPr/>
+        <p:nvPr/>
+      </p:nvGrpSpPr>
+      <p:grpSpPr>
+        <a:xfrm>
+          <a:off x="0" y="0"/>
+          <a:ext cx="0" cy="0"/>
+          <a:chOff x="0" y="0"/>
+          <a:chExt cx="0" cy="0"/>
+        </a:xfrm>
+      </p:grpSpPr>
+      <p:sp>
+        <p:nvSpPr>
+          <p:cNvPr id="4" name="Rectangle 3">
+            <a:extLst>
+              <a:ext uri="{FF2B5EF4-FFF2-40B4-BE49-F238E27FC236}">
+                <a16:creationId xmlns:a16="http://schemas.microsoft.com/office/drawing/2014/main" id="{B2A15A39-FEAA-471C-96DF-CCADF7D15DA4}"/>
+              </a:ext>
+            </a:extLst>
+          </p:cNvPr>
+          <p:cNvSpPr/>
+          <p:nvPr/>
+        </p:nvSpPr>
+        <p:spPr>
+          <a:xfrm rot="5400000">
+            <a:off x="826313" y="3137480"/>
+            <a:ext cx="4496500" cy="738231"/>
+          </a:xfrm>
+          <a:prstGeom prst="rect">
+            <a:avLst/>
+          </a:prstGeom>
+          <a:solidFill>
+            <a:schemeClr val="accent6">
+              <a:lumMod val="40000"/>
+              <a:lumOff val="60000"/>
+            </a:schemeClr>
+          </a:solidFill>
+        </p:spPr>
+        <p:style>
+          <a:lnRef idx="2">
+            <a:schemeClr val="accent1">
+              <a:shade val="50000"/>
+            </a:schemeClr>
+          </a:lnRef>
+          <a:fillRef idx="1">
+            <a:schemeClr val="accent1"/>
+          </a:fillRef>
+          <a:effectRef idx="0">
+            <a:schemeClr val="accent1"/>
+          </a:effectRef>
+          <a:fontRef idx="minor">
+            <a:schemeClr val="lt1"/>
+          </a:fontRef>
+        </p:style>
+        <p:txBody>
+          <a:bodyPr rtlCol="0" anchor="ctr"/>
+          <a:lstStyle/>
+          <a:p>
+            <a:pPr algn="ctr"/>
+            <a:endParaRPr lang="en-US"/>
+          </a:p>
+        </p:txBody>
+      </p:sp>
+      <p:sp>
+        <p:nvSpPr>
+          <p:cNvPr id="5" name="Rectangle 4">
+            <a:extLst>
+              <a:ext uri="{FF2B5EF4-FFF2-40B4-BE49-F238E27FC236}">
+                <a16:creationId xmlns:a16="http://schemas.microsoft.com/office/drawing/2014/main" id="{6C4825D8-518B-4061-9AC3-CFDC57CDD85A}"/>
+              </a:ext>
+            </a:extLst>
+          </p:cNvPr>
+          <p:cNvSpPr/>
+          <p:nvPr/>
+        </p:nvSpPr>
+        <p:spPr>
+          <a:xfrm rot="5400000">
+            <a:off x="7119455" y="3137480"/>
+            <a:ext cx="4496499" cy="738231"/>
+          </a:xfrm>
+          <a:prstGeom prst="rect">
+            <a:avLst/>
+          </a:prstGeom>
+          <a:solidFill>
+            <a:schemeClr val="accent6">
+              <a:lumMod val="40000"/>
+              <a:lumOff val="60000"/>
+            </a:schemeClr>
+          </a:solidFill>
+        </p:spPr>
+        <p:style>
+          <a:lnRef idx="2">
+            <a:schemeClr val="accent1">
+              <a:shade val="50000"/>
+            </a:schemeClr>
+          </a:lnRef>
+          <a:fillRef idx="1">
+            <a:schemeClr val="accent1"/>
+          </a:fillRef>
+          <a:effectRef idx="0">
+            <a:schemeClr val="accent1"/>
+          </a:effectRef>
+          <a:fontRef idx="minor">
+            <a:schemeClr val="lt1"/>
+          </a:fontRef>
+        </p:style>
+        <p:txBody>
+          <a:bodyPr rtlCol="0" anchor="ctr"/>
+          <a:lstStyle/>
+          <a:p>
+            <a:pPr algn="ctr"/>
+            <a:endParaRPr lang="en-US"/>
+          </a:p>
+        </p:txBody>
+      </p:sp>
+      <p:sp>
+        <p:nvSpPr>
+          <p:cNvPr id="6" name="Rectangle 5">
+            <a:extLst>
+              <a:ext uri="{FF2B5EF4-FFF2-40B4-BE49-F238E27FC236}">
+                <a16:creationId xmlns:a16="http://schemas.microsoft.com/office/drawing/2014/main" id="{669FA98C-5313-435C-B311-12FBB09660AD}"/>
+              </a:ext>
+            </a:extLst>
+          </p:cNvPr>
+          <p:cNvSpPr/>
+          <p:nvPr/>
+        </p:nvSpPr>
+        <p:spPr>
+          <a:xfrm rot="5400000">
+            <a:off x="4566057" y="2259786"/>
+            <a:ext cx="1600197" cy="738231"/>
+          </a:xfrm>
+          <a:prstGeom prst="rect">
+            <a:avLst/>
+          </a:prstGeom>
+          <a:solidFill>
+            <a:schemeClr val="accent4">
+              <a:lumMod val="40000"/>
+              <a:lumOff val="60000"/>
+            </a:schemeClr>
+          </a:solidFill>
+        </p:spPr>
+        <p:style>
+          <a:lnRef idx="2">
+            <a:schemeClr val="accent1">
+              <a:shade val="50000"/>
+            </a:schemeClr>
+          </a:lnRef>
+          <a:fillRef idx="1">
+            <a:schemeClr val="accent1"/>
+          </a:fillRef>
+          <a:effectRef idx="0">
+            <a:schemeClr val="accent1"/>
+          </a:effectRef>
+          <a:fontRef idx="minor">
+            <a:schemeClr val="lt1"/>
+          </a:fontRef>
+        </p:style>
+        <p:txBody>
+          <a:bodyPr rtlCol="0" anchor="ctr"/>
+          <a:lstStyle/>
+          <a:p>
+            <a:pPr algn="ctr"/>
+            <a:endParaRPr lang="en-US"/>
+          </a:p>
+        </p:txBody>
+      </p:sp>
+      <p:sp>
+        <p:nvSpPr>
+          <p:cNvPr id="7" name="Rectangle 6">
+            <a:extLst>
+              <a:ext uri="{FF2B5EF4-FFF2-40B4-BE49-F238E27FC236}">
+                <a16:creationId xmlns:a16="http://schemas.microsoft.com/office/drawing/2014/main" id="{AC4356E4-872A-433F-8620-39ED3B1516EF}"/>
+              </a:ext>
+            </a:extLst>
+          </p:cNvPr>
+          <p:cNvSpPr/>
+          <p:nvPr/>
+        </p:nvSpPr>
+        <p:spPr>
+          <a:xfrm rot="5400000">
+            <a:off x="4566057" y="4131929"/>
+            <a:ext cx="1600197" cy="738231"/>
+          </a:xfrm>
+          <a:prstGeom prst="rect">
+            <a:avLst/>
+          </a:prstGeom>
+          <a:solidFill>
+            <a:schemeClr val="accent4">
+              <a:lumMod val="40000"/>
+              <a:lumOff val="60000"/>
+            </a:schemeClr>
+          </a:solidFill>
+        </p:spPr>
+        <p:style>
+          <a:lnRef idx="2">
+            <a:schemeClr val="accent1">
+              <a:shade val="50000"/>
+            </a:schemeClr>
+          </a:lnRef>
+          <a:fillRef idx="1">
+            <a:schemeClr val="accent1"/>
+          </a:fillRef>
+          <a:effectRef idx="0">
+            <a:schemeClr val="accent1"/>
+          </a:effectRef>
+          <a:fontRef idx="minor">
+            <a:schemeClr val="lt1"/>
+          </a:fontRef>
+        </p:style>
+        <p:txBody>
+          <a:bodyPr rtlCol="0" anchor="ctr"/>
+          <a:lstStyle/>
+          <a:p>
+            <a:pPr algn="ctr"/>
+            <a:endParaRPr lang="en-US"/>
+          </a:p>
+        </p:txBody>
+      </p:sp>
+      <p:sp>
+        <p:nvSpPr>
+          <p:cNvPr id="8" name="Rectangle 7">
+            <a:extLst>
+              <a:ext uri="{FF2B5EF4-FFF2-40B4-BE49-F238E27FC236}">
+                <a16:creationId xmlns:a16="http://schemas.microsoft.com/office/drawing/2014/main" id="{FA9A3A05-96C2-4F05-BD4A-19137F6534CB}"/>
+              </a:ext>
+            </a:extLst>
+          </p:cNvPr>
+          <p:cNvSpPr/>
+          <p:nvPr/>
+        </p:nvSpPr>
+        <p:spPr>
+          <a:xfrm rot="5400000">
+            <a:off x="6012459" y="3137481"/>
+            <a:ext cx="1600197" cy="738231"/>
+          </a:xfrm>
+          <a:prstGeom prst="rect">
+            <a:avLst/>
+          </a:prstGeom>
+          <a:solidFill>
+            <a:schemeClr val="accent4">
+              <a:lumMod val="40000"/>
+              <a:lumOff val="60000"/>
+            </a:schemeClr>
+          </a:solidFill>
+        </p:spPr>
+        <p:style>
+          <a:lnRef idx="2">
+            <a:schemeClr val="accent1">
+              <a:shade val="50000"/>
+            </a:schemeClr>
+          </a:lnRef>
+          <a:fillRef idx="1">
+            <a:schemeClr val="accent1"/>
+          </a:fillRef>
+          <a:effectRef idx="0">
+            <a:schemeClr val="accent1"/>
+          </a:effectRef>
+          <a:fontRef idx="minor">
+            <a:schemeClr val="lt1"/>
+          </a:fontRef>
+        </p:style>
+        <p:txBody>
+          <a:bodyPr rtlCol="0" anchor="ctr"/>
+          <a:lstStyle/>
+          <a:p>
+            <a:pPr algn="ctr"/>
+            <a:endParaRPr lang="en-US"/>
+          </a:p>
+        </p:txBody>
+      </p:sp>
+      <p:sp>
+        <p:nvSpPr>
+          <p:cNvPr id="9" name="Flowchart: Connector 8">
+            <a:extLst>
+              <a:ext uri="{FF2B5EF4-FFF2-40B4-BE49-F238E27FC236}">
+                <a16:creationId xmlns:a16="http://schemas.microsoft.com/office/drawing/2014/main" id="{44020362-6BE2-4D59-80E9-EEB77D0F73A8}"/>
+              </a:ext>
+            </a:extLst>
+          </p:cNvPr>
+          <p:cNvSpPr/>
+          <p:nvPr/>
+        </p:nvSpPr>
+        <p:spPr>
+          <a:xfrm>
+            <a:off x="756754" y="1949393"/>
+            <a:ext cx="671120" cy="679508"/>
+          </a:xfrm>
+          <a:prstGeom prst="flowChartConnector">
+            <a:avLst/>
+          </a:prstGeom>
+          <a:solidFill>
+            <a:schemeClr val="accent1">
+              <a:lumMod val="60000"/>
+              <a:lumOff val="40000"/>
+            </a:schemeClr>
+          </a:solidFill>
+        </p:spPr>
+        <p:style>
+          <a:lnRef idx="2">
+            <a:schemeClr val="accent1">
+              <a:shade val="50000"/>
+            </a:schemeClr>
+          </a:lnRef>
+          <a:fillRef idx="1">
+            <a:schemeClr val="accent1"/>
+          </a:fillRef>
+          <a:effectRef idx="0">
+            <a:schemeClr val="accent1"/>
+          </a:effectRef>
+          <a:fontRef idx="minor">
+            <a:schemeClr val="lt1"/>
+          </a:fontRef>
+        </p:style>
+        <p:txBody>
+          <a:bodyPr rtlCol="0" anchor="ctr"/>
+          <a:lstStyle/>
+          <a:p>
+            <a:pPr algn="ctr"/>
+            <a:endParaRPr lang="en-US"/>
+          </a:p>
+        </p:txBody>
+      </p:sp>
+      <p:sp>
+        <p:nvSpPr>
+          <p:cNvPr id="10" name="Flowchart: Connector 9">
+            <a:extLst>
+              <a:ext uri="{FF2B5EF4-FFF2-40B4-BE49-F238E27FC236}">
+                <a16:creationId xmlns:a16="http://schemas.microsoft.com/office/drawing/2014/main" id="{D4539139-0CA1-457B-9A19-12D01101E576}"/>
+              </a:ext>
+            </a:extLst>
+          </p:cNvPr>
+          <p:cNvSpPr/>
+          <p:nvPr/>
+        </p:nvSpPr>
+        <p:spPr>
+          <a:xfrm>
+            <a:off x="10619061" y="2919369"/>
+            <a:ext cx="671120" cy="679508"/>
+          </a:xfrm>
+          <a:prstGeom prst="flowChartConnector">
+            <a:avLst/>
+          </a:prstGeom>
+          <a:solidFill>
+            <a:schemeClr val="accent1">
+              <a:lumMod val="60000"/>
+              <a:lumOff val="40000"/>
+            </a:schemeClr>
+          </a:solidFill>
+        </p:spPr>
+        <p:style>
+          <a:lnRef idx="2">
+            <a:schemeClr val="accent1">
+              <a:shade val="50000"/>
+            </a:schemeClr>
+          </a:lnRef>
+          <a:fillRef idx="1">
+            <a:schemeClr val="accent1"/>
+          </a:fillRef>
+          <a:effectRef idx="0">
+            <a:schemeClr val="accent1"/>
+          </a:effectRef>
+          <a:fontRef idx="minor">
+            <a:schemeClr val="lt1"/>
+          </a:fontRef>
+        </p:style>
+        <p:txBody>
+          <a:bodyPr rtlCol="0" anchor="ctr"/>
+          <a:lstStyle/>
+          <a:p>
+            <a:pPr algn="ctr"/>
+            <a:endParaRPr lang="en-US" dirty="0"/>
+          </a:p>
+        </p:txBody>
+      </p:sp>
+      <mc:AlternateContent xmlns:mc="http://schemas.openxmlformats.org/markup-compatibility/2006">
+        <mc:Choice xmlns:a14="http://schemas.microsoft.com/office/drawing/2010/main" Requires="a14">
+          <p:sp>
+            <p:nvSpPr>
+              <p:cNvPr id="11" name="TextBox 10">
+                <a:extLst>
+                  <a:ext uri="{FF2B5EF4-FFF2-40B4-BE49-F238E27FC236}">
+                    <a16:creationId xmlns:a16="http://schemas.microsoft.com/office/drawing/2014/main" id="{BC794F8A-5978-4163-A84A-D6E29BC725A6}"/>
+                  </a:ext>
+                </a:extLst>
+              </p:cNvPr>
+              <p:cNvSpPr txBox="1"/>
+              <p:nvPr/>
+            </p:nvSpPr>
+            <p:spPr>
+              <a:xfrm>
+                <a:off x="1000654" y="2150647"/>
+                <a:ext cx="183320" cy="276999"/>
+              </a:xfrm>
+              <a:prstGeom prst="rect">
+                <a:avLst/>
+              </a:prstGeom>
+              <a:noFill/>
+            </p:spPr>
+            <p:txBody>
+              <a:bodyPr wrap="none" lIns="0" tIns="0" rIns="0" bIns="0" rtlCol="0">
+                <a:spAutoFit/>
+              </a:bodyPr>
+              <a:lstStyle/>
+              <a:p>
+                <a14:m>
+                  <m:oMathPara xmlns:m="http://schemas.openxmlformats.org/officeDocument/2006/math">
+                    <m:oMathParaPr>
+                      <m:jc m:val="centerGroup"/>
+                    </m:oMathParaPr>
+                    <m:oMath xmlns:m="http://schemas.openxmlformats.org/officeDocument/2006/math">
+                      <m:r>
+                        <a:rPr lang="en-US" i="1" smtClean="0">
+                          <a:latin typeface="Cambria Math" panose="02040503050406030204" pitchFamily="18" charset="0"/>
+                        </a:rPr>
+                        <m:t>𝑥</m:t>
+                      </m:r>
+                    </m:oMath>
+                  </m:oMathPara>
+                </a14:m>
+                <a:endParaRPr lang="en-US" dirty="0"/>
+              </a:p>
+            </p:txBody>
+          </p:sp>
+        </mc:Choice>
+        <mc:Fallback>
+          <p:sp>
+            <p:nvSpPr>
+              <p:cNvPr id="11" name="TextBox 10">
+                <a:extLst>
+                  <a:ext uri="{FF2B5EF4-FFF2-40B4-BE49-F238E27FC236}">
+                    <a16:creationId xmlns:a16="http://schemas.microsoft.com/office/drawing/2014/main" id="{BC794F8A-5978-4163-A84A-D6E29BC725A6}"/>
+                  </a:ext>
+                </a:extLst>
+              </p:cNvPr>
+              <p:cNvSpPr txBox="1">
+                <a:spLocks noRot="1" noChangeAspect="1" noMove="1" noResize="1" noEditPoints="1" noAdjustHandles="1" noChangeArrowheads="1" noChangeShapeType="1" noTextEdit="1"/>
+              </p:cNvSpPr>
+              <p:nvPr/>
+            </p:nvSpPr>
+            <p:spPr>
+              <a:xfrm>
+                <a:off x="1000654" y="2150647"/>
+                <a:ext cx="183320" cy="276999"/>
+              </a:xfrm>
+              <a:prstGeom prst="rect">
+                <a:avLst/>
+              </a:prstGeom>
+              <a:blipFill>
+                <a:blip r:embed="rId2"/>
+                <a:stretch>
+                  <a:fillRect l="-20000" r="-13333"/>
+                </a:stretch>
+              </a:blipFill>
+            </p:spPr>
+            <p:txBody>
+              <a:bodyPr/>
+              <a:lstStyle/>
+              <a:p>
+                <a:r>
+                  <a:rPr lang="en-US">
+                    <a:noFill/>
+                  </a:rPr>
+                  <a:t> </a:t>
+                </a:r>
+              </a:p>
+            </p:txBody>
+          </p:sp>
+        </mc:Fallback>
+      </mc:AlternateContent>
+      <mc:AlternateContent xmlns:mc="http://schemas.openxmlformats.org/markup-compatibility/2006">
+        <mc:Choice xmlns:a14="http://schemas.microsoft.com/office/drawing/2010/main" Requires="a14">
+          <p:sp>
+            <p:nvSpPr>
+              <p:cNvPr id="12" name="TextBox 11">
+                <a:extLst>
+                  <a:ext uri="{FF2B5EF4-FFF2-40B4-BE49-F238E27FC236}">
+                    <a16:creationId xmlns:a16="http://schemas.microsoft.com/office/drawing/2014/main" id="{30E21E00-0D00-4B87-85A7-8CC666A8D8CD}"/>
+                  </a:ext>
+                </a:extLst>
+              </p:cNvPr>
+              <p:cNvSpPr txBox="1"/>
+              <p:nvPr/>
+            </p:nvSpPr>
+            <p:spPr>
+              <a:xfrm>
+                <a:off x="10861262" y="3120622"/>
+                <a:ext cx="186718" cy="276999"/>
+              </a:xfrm>
+              <a:prstGeom prst="rect">
+                <a:avLst/>
+              </a:prstGeom>
+              <a:noFill/>
+            </p:spPr>
+            <p:txBody>
+              <a:bodyPr wrap="none" lIns="0" tIns="0" rIns="0" bIns="0" rtlCol="0">
+                <a:spAutoFit/>
+              </a:bodyPr>
+              <a:lstStyle/>
+              <a:p>
+                <a14:m>
+                  <m:oMathPara xmlns:m="http://schemas.openxmlformats.org/officeDocument/2006/math">
+                    <m:oMathParaPr>
+                      <m:jc m:val="centerGroup"/>
+                    </m:oMathParaPr>
+                    <m:oMath xmlns:m="http://schemas.openxmlformats.org/officeDocument/2006/math">
+                      <m:r>
+                        <a:rPr lang="en-US" i="1" smtClean="0">
+                          <a:latin typeface="Cambria Math" panose="02040503050406030204" pitchFamily="18" charset="0"/>
+                        </a:rPr>
+                        <m:t>𝑦</m:t>
+                      </m:r>
+                    </m:oMath>
+                  </m:oMathPara>
+                </a14:m>
+                <a:endParaRPr lang="en-US" dirty="0"/>
+              </a:p>
+            </p:txBody>
+          </p:sp>
+        </mc:Choice>
+        <mc:Fallback>
+          <p:sp>
+            <p:nvSpPr>
+              <p:cNvPr id="12" name="TextBox 11">
+                <a:extLst>
+                  <a:ext uri="{FF2B5EF4-FFF2-40B4-BE49-F238E27FC236}">
+                    <a16:creationId xmlns:a16="http://schemas.microsoft.com/office/drawing/2014/main" id="{30E21E00-0D00-4B87-85A7-8CC666A8D8CD}"/>
+                  </a:ext>
+                </a:extLst>
+              </p:cNvPr>
+              <p:cNvSpPr txBox="1">
+                <a:spLocks noRot="1" noChangeAspect="1" noMove="1" noResize="1" noEditPoints="1" noAdjustHandles="1" noChangeArrowheads="1" noChangeShapeType="1" noTextEdit="1"/>
+              </p:cNvSpPr>
+              <p:nvPr/>
+            </p:nvSpPr>
+            <p:spPr>
+              <a:xfrm>
+                <a:off x="10861262" y="3120622"/>
+                <a:ext cx="186718" cy="276999"/>
+              </a:xfrm>
+              <a:prstGeom prst="rect">
+                <a:avLst/>
+              </a:prstGeom>
+              <a:blipFill>
+                <a:blip r:embed="rId3"/>
+                <a:stretch>
+                  <a:fillRect l="-33333" r="-30000" b="-26667"/>
+                </a:stretch>
+              </a:blipFill>
+            </p:spPr>
+            <p:txBody>
+              <a:bodyPr/>
+              <a:lstStyle/>
+              <a:p>
+                <a:r>
+                  <a:rPr lang="en-US">
+                    <a:noFill/>
+                  </a:rPr>
+                  <a:t> </a:t>
+                </a:r>
+              </a:p>
+            </p:txBody>
+          </p:sp>
+        </mc:Fallback>
+      </mc:AlternateContent>
+      <mc:AlternateContent xmlns:mc="http://schemas.openxmlformats.org/markup-compatibility/2006">
+        <mc:Choice xmlns:a14="http://schemas.microsoft.com/office/drawing/2010/main" Requires="a14">
+          <p:sp>
+            <p:nvSpPr>
+              <p:cNvPr id="13" name="TextBox 12">
+                <a:extLst>
+                  <a:ext uri="{FF2B5EF4-FFF2-40B4-BE49-F238E27FC236}">
+                    <a16:creationId xmlns:a16="http://schemas.microsoft.com/office/drawing/2014/main" id="{9AB5B923-EFAA-4230-9212-1D5F37411DA1}"/>
+                  </a:ext>
+                </a:extLst>
+              </p:cNvPr>
+              <p:cNvSpPr txBox="1"/>
+              <p:nvPr/>
+            </p:nvSpPr>
+            <p:spPr>
+              <a:xfrm>
+                <a:off x="5273277" y="2567998"/>
+                <a:ext cx="185756" cy="276999"/>
+              </a:xfrm>
+              <a:prstGeom prst="rect">
+                <a:avLst/>
+              </a:prstGeom>
+              <a:noFill/>
+            </p:spPr>
+            <p:txBody>
+              <a:bodyPr wrap="none" lIns="0" tIns="0" rIns="0" bIns="0" rtlCol="0">
+                <a:spAutoFit/>
+              </a:bodyPr>
+              <a:lstStyle/>
+              <a:p>
+                <a14:m>
+                  <m:oMathPara xmlns:m="http://schemas.openxmlformats.org/officeDocument/2006/math">
+                    <m:oMathParaPr>
+                      <m:jc m:val="centerGroup"/>
+                    </m:oMathParaPr>
+                    <m:oMath xmlns:m="http://schemas.openxmlformats.org/officeDocument/2006/math">
+                      <m:r>
+                        <a:rPr lang="en-US" i="1" smtClean="0">
+                          <a:latin typeface="Cambria Math" panose="02040503050406030204" pitchFamily="18" charset="0"/>
+                        </a:rPr>
+                        <m:t>𝜇</m:t>
+                      </m:r>
+                    </m:oMath>
+                  </m:oMathPara>
+                </a14:m>
+                <a:endParaRPr lang="en-US" dirty="0"/>
+              </a:p>
+            </p:txBody>
+          </p:sp>
+        </mc:Choice>
+        <mc:Fallback>
+          <p:sp>
+            <p:nvSpPr>
+              <p:cNvPr id="13" name="TextBox 12">
+                <a:extLst>
+                  <a:ext uri="{FF2B5EF4-FFF2-40B4-BE49-F238E27FC236}">
+                    <a16:creationId xmlns:a16="http://schemas.microsoft.com/office/drawing/2014/main" id="{9AB5B923-EFAA-4230-9212-1D5F37411DA1}"/>
+                  </a:ext>
+                </a:extLst>
+              </p:cNvPr>
+              <p:cNvSpPr txBox="1">
+                <a:spLocks noRot="1" noChangeAspect="1" noMove="1" noResize="1" noEditPoints="1" noAdjustHandles="1" noChangeArrowheads="1" noChangeShapeType="1" noTextEdit="1"/>
+              </p:cNvSpPr>
+              <p:nvPr/>
+            </p:nvSpPr>
+            <p:spPr>
+              <a:xfrm>
+                <a:off x="5273277" y="2567998"/>
+                <a:ext cx="185756" cy="276999"/>
+              </a:xfrm>
+              <a:prstGeom prst="rect">
+                <a:avLst/>
+              </a:prstGeom>
+              <a:blipFill>
+                <a:blip r:embed="rId4"/>
+                <a:stretch>
+                  <a:fillRect l="-29032" r="-25806" b="-21739"/>
+                </a:stretch>
+              </a:blipFill>
+            </p:spPr>
+            <p:txBody>
+              <a:bodyPr/>
+              <a:lstStyle/>
+              <a:p>
+                <a:r>
+                  <a:rPr lang="en-US">
+                    <a:noFill/>
+                  </a:rPr>
+                  <a:t> </a:t>
+                </a:r>
+              </a:p>
+            </p:txBody>
+          </p:sp>
+        </mc:Fallback>
+      </mc:AlternateContent>
+      <mc:AlternateContent xmlns:mc="http://schemas.openxmlformats.org/markup-compatibility/2006">
+        <mc:Choice xmlns:a14="http://schemas.microsoft.com/office/drawing/2010/main" Requires="a14">
+          <p:sp>
+            <p:nvSpPr>
+              <p:cNvPr id="14" name="TextBox 13">
+                <a:extLst>
+                  <a:ext uri="{FF2B5EF4-FFF2-40B4-BE49-F238E27FC236}">
+                    <a16:creationId xmlns:a16="http://schemas.microsoft.com/office/drawing/2014/main" id="{ECB054C1-D9CF-4033-8625-61ADC1C3B462}"/>
+                  </a:ext>
+                </a:extLst>
+              </p:cNvPr>
+              <p:cNvSpPr txBox="1"/>
+              <p:nvPr/>
+            </p:nvSpPr>
+            <p:spPr>
+              <a:xfrm>
+                <a:off x="5278867" y="4306695"/>
+                <a:ext cx="193194" cy="276999"/>
+              </a:xfrm>
+              <a:prstGeom prst="rect">
+                <a:avLst/>
+              </a:prstGeom>
+              <a:noFill/>
+            </p:spPr>
+            <p:txBody>
+              <a:bodyPr wrap="none" lIns="0" tIns="0" rIns="0" bIns="0" rtlCol="0">
+                <a:spAutoFit/>
+              </a:bodyPr>
+              <a:lstStyle/>
+              <a:p>
+                <a14:m>
+                  <m:oMathPara xmlns:m="http://schemas.openxmlformats.org/officeDocument/2006/math">
+                    <m:oMathParaPr>
+                      <m:jc m:val="centerGroup"/>
+                    </m:oMathParaPr>
+                    <m:oMath xmlns:m="http://schemas.openxmlformats.org/officeDocument/2006/math">
+                      <m:r>
+                        <a:rPr lang="en-US" i="1" smtClean="0">
+                          <a:latin typeface="Cambria Math" panose="02040503050406030204" pitchFamily="18" charset="0"/>
+                        </a:rPr>
+                        <m:t>𝜎</m:t>
+                      </m:r>
+                    </m:oMath>
+                  </m:oMathPara>
+                </a14:m>
+                <a:endParaRPr lang="en-US" dirty="0"/>
+              </a:p>
+            </p:txBody>
+          </p:sp>
+        </mc:Choice>
+        <mc:Fallback>
+          <p:sp>
+            <p:nvSpPr>
+              <p:cNvPr id="14" name="TextBox 13">
+                <a:extLst>
+                  <a:ext uri="{FF2B5EF4-FFF2-40B4-BE49-F238E27FC236}">
+                    <a16:creationId xmlns:a16="http://schemas.microsoft.com/office/drawing/2014/main" id="{ECB054C1-D9CF-4033-8625-61ADC1C3B462}"/>
+                  </a:ext>
+                </a:extLst>
+              </p:cNvPr>
+              <p:cNvSpPr txBox="1">
+                <a:spLocks noRot="1" noChangeAspect="1" noMove="1" noResize="1" noEditPoints="1" noAdjustHandles="1" noChangeArrowheads="1" noChangeShapeType="1" noTextEdit="1"/>
+              </p:cNvSpPr>
+              <p:nvPr/>
+            </p:nvSpPr>
+            <p:spPr>
+              <a:xfrm>
+                <a:off x="5278867" y="4306695"/>
+                <a:ext cx="193194" cy="276999"/>
+              </a:xfrm>
+              <a:prstGeom prst="rect">
+                <a:avLst/>
+              </a:prstGeom>
+              <a:blipFill>
+                <a:blip r:embed="rId5"/>
+                <a:stretch>
+                  <a:fillRect l="-18750" r="-12500"/>
+                </a:stretch>
+              </a:blipFill>
+            </p:spPr>
+            <p:txBody>
+              <a:bodyPr/>
+              <a:lstStyle/>
+              <a:p>
+                <a:r>
+                  <a:rPr lang="en-US">
+                    <a:noFill/>
+                  </a:rPr>
+                  <a:t> </a:t>
+                </a:r>
+              </a:p>
+            </p:txBody>
+          </p:sp>
+        </mc:Fallback>
+      </mc:AlternateContent>
+      <mc:AlternateContent xmlns:mc="http://schemas.openxmlformats.org/markup-compatibility/2006">
+        <mc:Choice xmlns:a14="http://schemas.microsoft.com/office/drawing/2010/main" Requires="a14">
+          <p:sp>
+            <p:nvSpPr>
+              <p:cNvPr id="15" name="TextBox 14">
+                <a:extLst>
+                  <a:ext uri="{FF2B5EF4-FFF2-40B4-BE49-F238E27FC236}">
+                    <a16:creationId xmlns:a16="http://schemas.microsoft.com/office/drawing/2014/main" id="{26012231-2344-44AC-9F4C-70FE4355D71A}"/>
+                  </a:ext>
+                </a:extLst>
+              </p:cNvPr>
+              <p:cNvSpPr txBox="1"/>
+              <p:nvPr/>
+            </p:nvSpPr>
+            <p:spPr>
+              <a:xfrm>
+                <a:off x="6728014" y="3368095"/>
+                <a:ext cx="169085" cy="276999"/>
+              </a:xfrm>
+              <a:prstGeom prst="rect">
+                <a:avLst/>
+              </a:prstGeom>
+              <a:noFill/>
+            </p:spPr>
+            <p:txBody>
+              <a:bodyPr wrap="none" lIns="0" tIns="0" rIns="0" bIns="0" rtlCol="0">
+                <a:spAutoFit/>
+              </a:bodyPr>
+              <a:lstStyle/>
+              <a:p>
+                <a14:m>
+                  <m:oMathPara xmlns:m="http://schemas.openxmlformats.org/officeDocument/2006/math">
+                    <m:oMathParaPr>
+                      <m:jc m:val="centerGroup"/>
+                    </m:oMathParaPr>
+                    <m:oMath xmlns:m="http://schemas.openxmlformats.org/officeDocument/2006/math">
+                      <m:r>
+                        <a:rPr lang="en-US" i="1" smtClean="0">
+                          <a:latin typeface="Cambria Math" panose="02040503050406030204" pitchFamily="18" charset="0"/>
+                        </a:rPr>
+                        <m:t>𝑧</m:t>
+                      </m:r>
+                    </m:oMath>
+                  </m:oMathPara>
+                </a14:m>
+                <a:endParaRPr lang="en-US" dirty="0"/>
+              </a:p>
+            </p:txBody>
+          </p:sp>
+        </mc:Choice>
+        <mc:Fallback>
+          <p:sp>
+            <p:nvSpPr>
+              <p:cNvPr id="15" name="TextBox 14">
+                <a:extLst>
+                  <a:ext uri="{FF2B5EF4-FFF2-40B4-BE49-F238E27FC236}">
+                    <a16:creationId xmlns:a16="http://schemas.microsoft.com/office/drawing/2014/main" id="{26012231-2344-44AC-9F4C-70FE4355D71A}"/>
+                  </a:ext>
+                </a:extLst>
+              </p:cNvPr>
+              <p:cNvSpPr txBox="1">
+                <a:spLocks noRot="1" noChangeAspect="1" noMove="1" noResize="1" noEditPoints="1" noAdjustHandles="1" noChangeArrowheads="1" noChangeShapeType="1" noTextEdit="1"/>
+              </p:cNvSpPr>
+              <p:nvPr/>
+            </p:nvSpPr>
+            <p:spPr>
+              <a:xfrm>
+                <a:off x="6728014" y="3368095"/>
+                <a:ext cx="169085" cy="276999"/>
+              </a:xfrm>
+              <a:prstGeom prst="rect">
+                <a:avLst/>
+              </a:prstGeom>
+              <a:blipFill>
+                <a:blip r:embed="rId6"/>
+                <a:stretch>
+                  <a:fillRect l="-22222" r="-18519"/>
+                </a:stretch>
+              </a:blipFill>
+            </p:spPr>
+            <p:txBody>
+              <a:bodyPr/>
+              <a:lstStyle/>
+              <a:p>
+                <a:r>
+                  <a:rPr lang="en-US">
+                    <a:noFill/>
+                  </a:rPr>
+                  <a:t> </a:t>
+                </a:r>
+              </a:p>
+            </p:txBody>
+          </p:sp>
+        </mc:Fallback>
+      </mc:AlternateContent>
+      <p:cxnSp>
+        <p:nvCxnSpPr>
+          <p:cNvPr id="16" name="Straight Arrow Connector 15">
+            <a:extLst>
+              <a:ext uri="{FF2B5EF4-FFF2-40B4-BE49-F238E27FC236}">
+                <a16:creationId xmlns:a16="http://schemas.microsoft.com/office/drawing/2014/main" id="{8CD9984C-7E9B-417C-99E0-420A22F61246}"/>
+              </a:ext>
+            </a:extLst>
+          </p:cNvPr>
+          <p:cNvCxnSpPr/>
+          <p:nvPr/>
+        </p:nvCxnSpPr>
+        <p:spPr>
+          <a:xfrm>
+            <a:off x="3443679" y="2628901"/>
+            <a:ext cx="1405158" cy="0"/>
+          </a:xfrm>
+          <a:prstGeom prst="straightConnector1">
+            <a:avLst/>
+          </a:prstGeom>
+          <a:ln>
+            <a:tailEnd type="triangle"/>
+          </a:ln>
+        </p:spPr>
+        <p:style>
+          <a:lnRef idx="1">
+            <a:schemeClr val="accent1"/>
+          </a:lnRef>
+          <a:fillRef idx="0">
+            <a:schemeClr val="accent1"/>
+          </a:fillRef>
+          <a:effectRef idx="0">
+            <a:schemeClr val="accent1"/>
+          </a:effectRef>
+          <a:fontRef idx="minor">
+            <a:schemeClr val="tx1"/>
+          </a:fontRef>
+        </p:style>
+      </p:cxnSp>
+      <p:cxnSp>
+        <p:nvCxnSpPr>
+          <p:cNvPr id="17" name="Straight Arrow Connector 16">
+            <a:extLst>
+              <a:ext uri="{FF2B5EF4-FFF2-40B4-BE49-F238E27FC236}">
+                <a16:creationId xmlns:a16="http://schemas.microsoft.com/office/drawing/2014/main" id="{88BD0DB5-9DBB-4E34-B5CA-3CF0B0C45CB6}"/>
+              </a:ext>
+            </a:extLst>
+          </p:cNvPr>
+          <p:cNvCxnSpPr/>
+          <p:nvPr/>
+        </p:nvCxnSpPr>
+        <p:spPr>
+          <a:xfrm>
+            <a:off x="3443679" y="4501044"/>
+            <a:ext cx="1405158" cy="0"/>
+          </a:xfrm>
+          <a:prstGeom prst="straightConnector1">
+            <a:avLst/>
+          </a:prstGeom>
+          <a:ln>
+            <a:tailEnd type="triangle"/>
+          </a:ln>
+        </p:spPr>
+        <p:style>
+          <a:lnRef idx="1">
+            <a:schemeClr val="accent1"/>
+          </a:lnRef>
+          <a:fillRef idx="0">
+            <a:schemeClr val="accent1"/>
+          </a:fillRef>
+          <a:effectRef idx="0">
+            <a:schemeClr val="accent1"/>
+          </a:effectRef>
+          <a:fontRef idx="minor">
+            <a:schemeClr val="tx1"/>
+          </a:fontRef>
+        </p:style>
+      </p:cxnSp>
+      <p:cxnSp>
+        <p:nvCxnSpPr>
+          <p:cNvPr id="18" name="Connector: Elbow 17">
+            <a:extLst>
+              <a:ext uri="{FF2B5EF4-FFF2-40B4-BE49-F238E27FC236}">
+                <a16:creationId xmlns:a16="http://schemas.microsoft.com/office/drawing/2014/main" id="{D8B82951-745F-491F-924C-CAB10B9F8038}"/>
+              </a:ext>
+            </a:extLst>
+          </p:cNvPr>
+          <p:cNvCxnSpPr>
+            <a:stCxn id="6" idx="0"/>
+          </p:cNvCxnSpPr>
+          <p:nvPr/>
+        </p:nvCxnSpPr>
+        <p:spPr>
+          <a:xfrm>
+            <a:off x="5735271" y="2628902"/>
+            <a:ext cx="708171" cy="491720"/>
+          </a:xfrm>
+          <a:prstGeom prst="bentConnector3">
+            <a:avLst/>
+          </a:prstGeom>
+          <a:ln>
+            <a:tailEnd type="triangle"/>
+          </a:ln>
+        </p:spPr>
+        <p:style>
+          <a:lnRef idx="1">
+            <a:schemeClr val="accent1"/>
+          </a:lnRef>
+          <a:fillRef idx="0">
+            <a:schemeClr val="accent1"/>
+          </a:fillRef>
+          <a:effectRef idx="0">
+            <a:schemeClr val="accent1"/>
+          </a:effectRef>
+          <a:fontRef idx="minor">
+            <a:schemeClr val="tx1"/>
+          </a:fontRef>
+        </p:style>
+      </p:cxnSp>
+      <p:cxnSp>
+        <p:nvCxnSpPr>
+          <p:cNvPr id="19" name="Connector: Elbow 18">
+            <a:extLst>
+              <a:ext uri="{FF2B5EF4-FFF2-40B4-BE49-F238E27FC236}">
+                <a16:creationId xmlns:a16="http://schemas.microsoft.com/office/drawing/2014/main" id="{E2CBD283-40D8-4F5E-95F9-77707C03EDB3}"/>
+              </a:ext>
+            </a:extLst>
+          </p:cNvPr>
+          <p:cNvCxnSpPr>
+            <a:stCxn id="7" idx="0"/>
+            <a:endCxn id="8" idx="2"/>
+          </p:cNvCxnSpPr>
+          <p:nvPr/>
+        </p:nvCxnSpPr>
+        <p:spPr>
+          <a:xfrm flipV="1">
+            <a:off x="5735271" y="3506597"/>
+            <a:ext cx="708171" cy="994448"/>
+          </a:xfrm>
+          <a:prstGeom prst="bentConnector5">
+            <a:avLst>
+              <a:gd name="adj1" fmla="val 32280"/>
+              <a:gd name="adj2" fmla="val 50000"/>
+              <a:gd name="adj3" fmla="val 67720"/>
+            </a:avLst>
+          </a:prstGeom>
+          <a:ln>
+            <a:tailEnd type="triangle"/>
+          </a:ln>
+        </p:spPr>
+        <p:style>
+          <a:lnRef idx="1">
+            <a:schemeClr val="accent1"/>
+          </a:lnRef>
+          <a:fillRef idx="0">
+            <a:schemeClr val="accent1"/>
+          </a:fillRef>
+          <a:effectRef idx="0">
+            <a:schemeClr val="accent1"/>
+          </a:effectRef>
+          <a:fontRef idx="minor">
+            <a:schemeClr val="tx1"/>
+          </a:fontRef>
+        </p:style>
+      </p:cxnSp>
+      <p:cxnSp>
+        <p:nvCxnSpPr>
+          <p:cNvPr id="20" name="Straight Arrow Connector 19">
+            <a:extLst>
+              <a:ext uri="{FF2B5EF4-FFF2-40B4-BE49-F238E27FC236}">
+                <a16:creationId xmlns:a16="http://schemas.microsoft.com/office/drawing/2014/main" id="{047852A0-FD53-4B54-A3CC-4B954D18B04A}"/>
+              </a:ext>
+            </a:extLst>
+          </p:cNvPr>
+          <p:cNvCxnSpPr>
+            <a:stCxn id="8" idx="0"/>
+          </p:cNvCxnSpPr>
+          <p:nvPr/>
+        </p:nvCxnSpPr>
+        <p:spPr>
+          <a:xfrm flipV="1">
+            <a:off x="7181673" y="3506594"/>
+            <a:ext cx="1643545" cy="3"/>
+          </a:xfrm>
+          <a:prstGeom prst="straightConnector1">
+            <a:avLst/>
+          </a:prstGeom>
+          <a:ln>
+            <a:tailEnd type="triangle"/>
+          </a:ln>
+        </p:spPr>
+        <p:style>
+          <a:lnRef idx="1">
+            <a:schemeClr val="accent1"/>
+          </a:lnRef>
+          <a:fillRef idx="0">
+            <a:schemeClr val="accent1"/>
+          </a:fillRef>
+          <a:effectRef idx="0">
+            <a:schemeClr val="accent1"/>
+          </a:effectRef>
+          <a:fontRef idx="minor">
+            <a:schemeClr val="tx1"/>
+          </a:fontRef>
+        </p:style>
+      </p:cxnSp>
+      <p:sp>
+        <p:nvSpPr>
+          <p:cNvPr id="21" name="TextBox 20">
+            <a:extLst>
+              <a:ext uri="{FF2B5EF4-FFF2-40B4-BE49-F238E27FC236}">
+                <a16:creationId xmlns:a16="http://schemas.microsoft.com/office/drawing/2014/main" id="{146531BA-87E4-4D30-BECD-A9560FC7C1A4}"/>
+              </a:ext>
+            </a:extLst>
+          </p:cNvPr>
+          <p:cNvSpPr txBox="1"/>
+          <p:nvPr/>
+        </p:nvSpPr>
+        <p:spPr>
+          <a:xfrm>
+            <a:off x="420776" y="704458"/>
+            <a:ext cx="1219443" cy="369332"/>
+          </a:xfrm>
+          <a:prstGeom prst="rect">
+            <a:avLst/>
+          </a:prstGeom>
+          <a:noFill/>
+        </p:spPr>
+        <p:txBody>
+          <a:bodyPr wrap="square" rtlCol="0">
+            <a:spAutoFit/>
+          </a:bodyPr>
+          <a:lstStyle/>
+          <a:p>
+            <a:r>
+              <a:rPr lang="en-US" dirty="0"/>
+              <a:t>Input Data</a:t>
+            </a:r>
+          </a:p>
+        </p:txBody>
+      </p:sp>
+      <p:sp>
+        <p:nvSpPr>
+          <p:cNvPr id="22" name="TextBox 21">
+            <a:extLst>
+              <a:ext uri="{FF2B5EF4-FFF2-40B4-BE49-F238E27FC236}">
+                <a16:creationId xmlns:a16="http://schemas.microsoft.com/office/drawing/2014/main" id="{9D25667C-48BE-4E85-B7CF-B20B992EE515}"/>
+              </a:ext>
+            </a:extLst>
+          </p:cNvPr>
+          <p:cNvSpPr txBox="1"/>
+          <p:nvPr/>
+        </p:nvSpPr>
+        <p:spPr>
+          <a:xfrm>
+            <a:off x="2620984" y="733822"/>
+            <a:ext cx="1025201" cy="369332"/>
+          </a:xfrm>
+          <a:prstGeom prst="rect">
+            <a:avLst/>
+          </a:prstGeom>
+          <a:noFill/>
+        </p:spPr>
+        <p:txBody>
+          <a:bodyPr wrap="square" rtlCol="0">
+            <a:spAutoFit/>
+          </a:bodyPr>
+          <a:lstStyle/>
+          <a:p>
+            <a:r>
+              <a:rPr lang="en-US" dirty="0"/>
+              <a:t>Encoder</a:t>
+            </a:r>
+          </a:p>
+        </p:txBody>
+      </p:sp>
+      <p:sp>
+        <p:nvSpPr>
+          <p:cNvPr id="23" name="TextBox 22">
+            <a:extLst>
+              <a:ext uri="{FF2B5EF4-FFF2-40B4-BE49-F238E27FC236}">
+                <a16:creationId xmlns:a16="http://schemas.microsoft.com/office/drawing/2014/main" id="{6D162BF0-57B9-4747-998E-4CBB3B1102A5}"/>
+              </a:ext>
+            </a:extLst>
+          </p:cNvPr>
+          <p:cNvSpPr txBox="1"/>
+          <p:nvPr/>
+        </p:nvSpPr>
+        <p:spPr>
+          <a:xfrm>
+            <a:off x="10535379" y="762747"/>
+            <a:ext cx="1025201" cy="369332"/>
+          </a:xfrm>
+          <a:prstGeom prst="rect">
+            <a:avLst/>
+          </a:prstGeom>
+          <a:noFill/>
+        </p:spPr>
+        <p:txBody>
+          <a:bodyPr wrap="square" rtlCol="0">
+            <a:spAutoFit/>
+          </a:bodyPr>
+          <a:lstStyle/>
+          <a:p>
+            <a:r>
+              <a:rPr lang="en-US" dirty="0"/>
+              <a:t>Output</a:t>
+            </a:r>
+          </a:p>
+        </p:txBody>
+      </p:sp>
+      <p:sp>
+        <p:nvSpPr>
+          <p:cNvPr id="24" name="TextBox 23">
+            <a:extLst>
+              <a:ext uri="{FF2B5EF4-FFF2-40B4-BE49-F238E27FC236}">
+                <a16:creationId xmlns:a16="http://schemas.microsoft.com/office/drawing/2014/main" id="{20233CA5-29B9-4A51-A500-240052BD7E45}"/>
+              </a:ext>
+            </a:extLst>
+          </p:cNvPr>
+          <p:cNvSpPr txBox="1"/>
+          <p:nvPr/>
+        </p:nvSpPr>
+        <p:spPr>
+          <a:xfrm>
+            <a:off x="8998589" y="762747"/>
+            <a:ext cx="1025201" cy="369332"/>
+          </a:xfrm>
+          <a:prstGeom prst="rect">
+            <a:avLst/>
+          </a:prstGeom>
+          <a:noFill/>
+        </p:spPr>
+        <p:txBody>
+          <a:bodyPr wrap="square" rtlCol="0">
+            <a:spAutoFit/>
+          </a:bodyPr>
+          <a:lstStyle/>
+          <a:p>
+            <a:r>
+              <a:rPr lang="en-US" dirty="0"/>
+              <a:t>Decoder</a:t>
+            </a:r>
+          </a:p>
+        </p:txBody>
+      </p:sp>
+      <p:sp>
+        <p:nvSpPr>
+          <p:cNvPr id="25" name="TextBox 24">
+            <a:extLst>
+              <a:ext uri="{FF2B5EF4-FFF2-40B4-BE49-F238E27FC236}">
+                <a16:creationId xmlns:a16="http://schemas.microsoft.com/office/drawing/2014/main" id="{FE622183-5366-46BD-8EC6-45702BE5A43A}"/>
+              </a:ext>
+            </a:extLst>
+          </p:cNvPr>
+          <p:cNvSpPr txBox="1"/>
+          <p:nvPr/>
+        </p:nvSpPr>
+        <p:spPr>
+          <a:xfrm>
+            <a:off x="4861655" y="762747"/>
+            <a:ext cx="1368846" cy="369332"/>
+          </a:xfrm>
+          <a:prstGeom prst="rect">
+            <a:avLst/>
+          </a:prstGeom>
+          <a:noFill/>
+        </p:spPr>
+        <p:txBody>
+          <a:bodyPr wrap="square" rtlCol="0">
+            <a:spAutoFit/>
+          </a:bodyPr>
+          <a:lstStyle/>
+          <a:p>
+            <a:r>
+              <a:rPr lang="en-US" dirty="0"/>
+              <a:t>Latent Space</a:t>
+            </a:r>
+          </a:p>
+        </p:txBody>
+      </p:sp>
+      <p:sp>
+        <p:nvSpPr>
+          <p:cNvPr id="26" name="Flowchart: Connector 25">
+            <a:extLst>
+              <a:ext uri="{FF2B5EF4-FFF2-40B4-BE49-F238E27FC236}">
+                <a16:creationId xmlns:a16="http://schemas.microsoft.com/office/drawing/2014/main" id="{C088CF3A-1554-4F23-B3FD-DAD4297A15D8}"/>
+              </a:ext>
+            </a:extLst>
+          </p:cNvPr>
+          <p:cNvSpPr/>
+          <p:nvPr/>
+        </p:nvSpPr>
+        <p:spPr>
+          <a:xfrm>
+            <a:off x="756754" y="3966941"/>
+            <a:ext cx="671120" cy="679508"/>
+          </a:xfrm>
+          <a:prstGeom prst="flowChartConnector">
+            <a:avLst/>
+          </a:prstGeom>
+          <a:solidFill>
+            <a:schemeClr val="accent1">
+              <a:lumMod val="60000"/>
+              <a:lumOff val="40000"/>
+            </a:schemeClr>
+          </a:solidFill>
+        </p:spPr>
+        <p:style>
+          <a:lnRef idx="2">
+            <a:schemeClr val="accent1">
+              <a:shade val="50000"/>
+            </a:schemeClr>
+          </a:lnRef>
+          <a:fillRef idx="1">
+            <a:schemeClr val="accent1"/>
+          </a:fillRef>
+          <a:effectRef idx="0">
+            <a:schemeClr val="accent1"/>
+          </a:effectRef>
+          <a:fontRef idx="minor">
+            <a:schemeClr val="lt1"/>
+          </a:fontRef>
+        </p:style>
+        <p:txBody>
+          <a:bodyPr rtlCol="0" anchor="ctr"/>
+          <a:lstStyle/>
+          <a:p>
+            <a:pPr algn="ctr"/>
+            <a:endParaRPr lang="en-US"/>
+          </a:p>
+        </p:txBody>
+      </p:sp>
+      <p:sp>
+        <p:nvSpPr>
+          <p:cNvPr id="28" name="Flowchart: Connector 27">
+            <a:extLst>
+              <a:ext uri="{FF2B5EF4-FFF2-40B4-BE49-F238E27FC236}">
+                <a16:creationId xmlns:a16="http://schemas.microsoft.com/office/drawing/2014/main" id="{0E58214E-E924-4992-B3ED-EE0A19413FDB}"/>
+              </a:ext>
+            </a:extLst>
+          </p:cNvPr>
+          <p:cNvSpPr/>
+          <p:nvPr/>
+        </p:nvSpPr>
+        <p:spPr>
+          <a:xfrm>
+            <a:off x="6476996" y="1489049"/>
+            <a:ext cx="671120" cy="679508"/>
+          </a:xfrm>
+          <a:prstGeom prst="flowChartConnector">
+            <a:avLst/>
+          </a:prstGeom>
+          <a:solidFill>
+            <a:schemeClr val="accent1">
+              <a:lumMod val="60000"/>
+              <a:lumOff val="40000"/>
+            </a:schemeClr>
+          </a:solidFill>
+        </p:spPr>
+        <p:style>
+          <a:lnRef idx="2">
+            <a:schemeClr val="accent1">
+              <a:shade val="50000"/>
+            </a:schemeClr>
+          </a:lnRef>
+          <a:fillRef idx="1">
+            <a:schemeClr val="accent1"/>
+          </a:fillRef>
+          <a:effectRef idx="0">
+            <a:schemeClr val="accent1"/>
+          </a:effectRef>
+          <a:fontRef idx="minor">
+            <a:schemeClr val="lt1"/>
+          </a:fontRef>
+        </p:style>
+        <p:txBody>
+          <a:bodyPr rtlCol="0" anchor="ctr"/>
+          <a:lstStyle/>
+          <a:p>
+            <a:pPr algn="ctr"/>
+            <a:endParaRPr lang="en-US"/>
+          </a:p>
+        </p:txBody>
+      </p:sp>
+      <mc:AlternateContent xmlns:mc="http://schemas.openxmlformats.org/markup-compatibility/2006">
+        <mc:Choice xmlns:a14="http://schemas.microsoft.com/office/drawing/2010/main" Requires="a14">
+          <p:sp>
+            <p:nvSpPr>
+              <p:cNvPr id="29" name="TextBox 28">
+                <a:extLst>
+                  <a:ext uri="{FF2B5EF4-FFF2-40B4-BE49-F238E27FC236}">
+                    <a16:creationId xmlns:a16="http://schemas.microsoft.com/office/drawing/2014/main" id="{9B59DB68-CC21-4EB9-8AD3-BBD41D04C776}"/>
+                  </a:ext>
+                </a:extLst>
+              </p:cNvPr>
+              <p:cNvSpPr txBox="1"/>
+              <p:nvPr/>
+            </p:nvSpPr>
+            <p:spPr>
+              <a:xfrm>
+                <a:off x="1004676" y="4168195"/>
+                <a:ext cx="200889" cy="276999"/>
+              </a:xfrm>
+              <a:prstGeom prst="rect">
+                <a:avLst/>
+              </a:prstGeom>
+              <a:noFill/>
+            </p:spPr>
+            <p:txBody>
+              <a:bodyPr wrap="none" lIns="0" tIns="0" rIns="0" bIns="0" rtlCol="0">
+                <a:spAutoFit/>
+              </a:bodyPr>
+              <a:lstStyle/>
+              <a:p>
+                <a14:m>
+                  <m:oMathPara xmlns:m="http://schemas.openxmlformats.org/officeDocument/2006/math">
+                    <m:oMathParaPr>
+                      <m:jc m:val="centerGroup"/>
+                    </m:oMathParaPr>
+                    <m:oMath xmlns:m="http://schemas.openxmlformats.org/officeDocument/2006/math">
+                      <m:r>
+                        <a:rPr lang="en-US" i="1" smtClean="0">
+                          <a:latin typeface="Cambria Math" panose="02040503050406030204" pitchFamily="18" charset="0"/>
+                        </a:rPr>
+                        <m:t>𝐶</m:t>
+                      </m:r>
+                    </m:oMath>
+                  </m:oMathPara>
+                </a14:m>
+                <a:endParaRPr lang="en-US" dirty="0"/>
+              </a:p>
+            </p:txBody>
+          </p:sp>
+        </mc:Choice>
+        <mc:Fallback>
+          <p:sp>
+            <p:nvSpPr>
+              <p:cNvPr id="29" name="TextBox 28">
+                <a:extLst>
+                  <a:ext uri="{FF2B5EF4-FFF2-40B4-BE49-F238E27FC236}">
+                    <a16:creationId xmlns:a16="http://schemas.microsoft.com/office/drawing/2014/main" id="{9B59DB68-CC21-4EB9-8AD3-BBD41D04C776}"/>
+                  </a:ext>
+                </a:extLst>
+              </p:cNvPr>
+              <p:cNvSpPr txBox="1">
+                <a:spLocks noRot="1" noChangeAspect="1" noMove="1" noResize="1" noEditPoints="1" noAdjustHandles="1" noChangeArrowheads="1" noChangeShapeType="1" noTextEdit="1"/>
+              </p:cNvSpPr>
+              <p:nvPr/>
+            </p:nvSpPr>
+            <p:spPr>
+              <a:xfrm>
+                <a:off x="1004676" y="4168195"/>
+                <a:ext cx="200889" cy="276999"/>
+              </a:xfrm>
+              <a:prstGeom prst="rect">
+                <a:avLst/>
+              </a:prstGeom>
+              <a:blipFill>
+                <a:blip r:embed="rId7"/>
+                <a:stretch>
+                  <a:fillRect l="-30303" r="-21212" b="-6667"/>
+                </a:stretch>
+              </a:blipFill>
+            </p:spPr>
+            <p:txBody>
+              <a:bodyPr/>
+              <a:lstStyle/>
+              <a:p>
+                <a:r>
+                  <a:rPr lang="en-US">
+                    <a:noFill/>
+                  </a:rPr>
+                  <a:t> </a:t>
+                </a:r>
+              </a:p>
+            </p:txBody>
+          </p:sp>
+        </mc:Fallback>
+      </mc:AlternateContent>
+      <mc:AlternateContent xmlns:mc="http://schemas.openxmlformats.org/markup-compatibility/2006">
+        <mc:Choice xmlns:a14="http://schemas.microsoft.com/office/drawing/2010/main" Requires="a14">
+          <p:sp>
+            <p:nvSpPr>
+              <p:cNvPr id="30" name="TextBox 29">
+                <a:extLst>
+                  <a:ext uri="{FF2B5EF4-FFF2-40B4-BE49-F238E27FC236}">
+                    <a16:creationId xmlns:a16="http://schemas.microsoft.com/office/drawing/2014/main" id="{3EB5E4AC-53C7-4178-9238-8513635F4BF5}"/>
+                  </a:ext>
+                </a:extLst>
+              </p:cNvPr>
+              <p:cNvSpPr txBox="1"/>
+              <p:nvPr/>
+            </p:nvSpPr>
+            <p:spPr>
+              <a:xfrm>
+                <a:off x="6712111" y="1690303"/>
+                <a:ext cx="200889" cy="276999"/>
+              </a:xfrm>
+              <a:prstGeom prst="rect">
+                <a:avLst/>
+              </a:prstGeom>
+              <a:noFill/>
+            </p:spPr>
+            <p:txBody>
+              <a:bodyPr wrap="none" lIns="0" tIns="0" rIns="0" bIns="0" rtlCol="0">
+                <a:spAutoFit/>
+              </a:bodyPr>
+              <a:lstStyle/>
+              <a:p>
+                <a14:m>
+                  <m:oMathPara xmlns:m="http://schemas.openxmlformats.org/officeDocument/2006/math">
+                    <m:oMathParaPr>
+                      <m:jc m:val="centerGroup"/>
+                    </m:oMathParaPr>
+                    <m:oMath xmlns:m="http://schemas.openxmlformats.org/officeDocument/2006/math">
+                      <m:r>
+                        <a:rPr lang="en-US" i="1" smtClean="0">
+                          <a:latin typeface="Cambria Math" panose="02040503050406030204" pitchFamily="18" charset="0"/>
+                        </a:rPr>
+                        <m:t>𝐶</m:t>
+                      </m:r>
+                    </m:oMath>
+                  </m:oMathPara>
+                </a14:m>
+                <a:endParaRPr lang="en-US" dirty="0"/>
+              </a:p>
+            </p:txBody>
+          </p:sp>
+        </mc:Choice>
+        <mc:Fallback>
+          <p:sp>
+            <p:nvSpPr>
+              <p:cNvPr id="30" name="TextBox 29">
+                <a:extLst>
+                  <a:ext uri="{FF2B5EF4-FFF2-40B4-BE49-F238E27FC236}">
+                    <a16:creationId xmlns:a16="http://schemas.microsoft.com/office/drawing/2014/main" id="{3EB5E4AC-53C7-4178-9238-8513635F4BF5}"/>
+                  </a:ext>
+                </a:extLst>
+              </p:cNvPr>
+              <p:cNvSpPr txBox="1">
+                <a:spLocks noRot="1" noChangeAspect="1" noMove="1" noResize="1" noEditPoints="1" noAdjustHandles="1" noChangeArrowheads="1" noChangeShapeType="1" noTextEdit="1"/>
+              </p:cNvSpPr>
+              <p:nvPr/>
+            </p:nvSpPr>
+            <p:spPr>
+              <a:xfrm>
+                <a:off x="6712111" y="1690303"/>
+                <a:ext cx="200889" cy="276999"/>
+              </a:xfrm>
+              <a:prstGeom prst="rect">
+                <a:avLst/>
+              </a:prstGeom>
+              <a:blipFill>
+                <a:blip r:embed="rId8"/>
+                <a:stretch>
+                  <a:fillRect l="-27273" r="-24242" b="-6522"/>
+                </a:stretch>
+              </a:blipFill>
+            </p:spPr>
+            <p:txBody>
+              <a:bodyPr/>
+              <a:lstStyle/>
+              <a:p>
+                <a:r>
+                  <a:rPr lang="en-US">
+                    <a:noFill/>
+                  </a:rPr>
+                  <a:t> </a:t>
+                </a:r>
+              </a:p>
+            </p:txBody>
+          </p:sp>
+        </mc:Fallback>
+      </mc:AlternateContent>
+      <p:cxnSp>
+        <p:nvCxnSpPr>
+          <p:cNvPr id="32" name="Straight Arrow Connector 31">
+            <a:extLst>
+              <a:ext uri="{FF2B5EF4-FFF2-40B4-BE49-F238E27FC236}">
+                <a16:creationId xmlns:a16="http://schemas.microsoft.com/office/drawing/2014/main" id="{6ADF84E8-D4D1-4987-907A-A684568D8364}"/>
+              </a:ext>
+            </a:extLst>
+          </p:cNvPr>
+          <p:cNvCxnSpPr>
+            <a:stCxn id="9" idx="6"/>
+          </p:cNvCxnSpPr>
+          <p:nvPr/>
+        </p:nvCxnSpPr>
+        <p:spPr>
+          <a:xfrm flipV="1">
+            <a:off x="1427874" y="2289146"/>
+            <a:ext cx="1122379" cy="1"/>
+          </a:xfrm>
+          <a:prstGeom prst="straightConnector1">
+            <a:avLst/>
+          </a:prstGeom>
+          <a:ln>
+            <a:tailEnd type="triangle"/>
+          </a:ln>
+        </p:spPr>
+        <p:style>
+          <a:lnRef idx="1">
+            <a:schemeClr val="accent1"/>
+          </a:lnRef>
+          <a:fillRef idx="0">
+            <a:schemeClr val="accent1"/>
+          </a:fillRef>
+          <a:effectRef idx="0">
+            <a:schemeClr val="accent1"/>
+          </a:effectRef>
+          <a:fontRef idx="minor">
+            <a:schemeClr val="tx1"/>
+          </a:fontRef>
+        </p:style>
+      </p:cxnSp>
+      <p:cxnSp>
+        <p:nvCxnSpPr>
+          <p:cNvPr id="33" name="Straight Arrow Connector 32">
+            <a:extLst>
+              <a:ext uri="{FF2B5EF4-FFF2-40B4-BE49-F238E27FC236}">
+                <a16:creationId xmlns:a16="http://schemas.microsoft.com/office/drawing/2014/main" id="{057917E8-206C-463F-955D-AB8BAE81798D}"/>
+              </a:ext>
+            </a:extLst>
+          </p:cNvPr>
+          <p:cNvCxnSpPr/>
+          <p:nvPr/>
+        </p:nvCxnSpPr>
+        <p:spPr>
+          <a:xfrm flipV="1">
+            <a:off x="1406026" y="4309836"/>
+            <a:ext cx="1122379" cy="1"/>
+          </a:xfrm>
+          <a:prstGeom prst="straightConnector1">
+            <a:avLst/>
+          </a:prstGeom>
+          <a:ln>
+            <a:tailEnd type="triangle"/>
+          </a:ln>
+        </p:spPr>
+        <p:style>
+          <a:lnRef idx="1">
+            <a:schemeClr val="accent1"/>
+          </a:lnRef>
+          <a:fillRef idx="0">
+            <a:schemeClr val="accent1"/>
+          </a:fillRef>
+          <a:effectRef idx="0">
+            <a:schemeClr val="accent1"/>
+          </a:effectRef>
+          <a:fontRef idx="minor">
+            <a:schemeClr val="tx1"/>
+          </a:fontRef>
+        </p:style>
+      </p:cxnSp>
+      <p:cxnSp>
+        <p:nvCxnSpPr>
+          <p:cNvPr id="34" name="Straight Arrow Connector 33">
+            <a:extLst>
+              <a:ext uri="{FF2B5EF4-FFF2-40B4-BE49-F238E27FC236}">
+                <a16:creationId xmlns:a16="http://schemas.microsoft.com/office/drawing/2014/main" id="{FD0BA44B-42A8-4E0F-88A6-E35A059852A0}"/>
+              </a:ext>
+            </a:extLst>
+          </p:cNvPr>
+          <p:cNvCxnSpPr>
+            <a:cxnSpLocks/>
+          </p:cNvCxnSpPr>
+          <p:nvPr/>
+        </p:nvCxnSpPr>
+        <p:spPr>
+          <a:xfrm flipV="1">
+            <a:off x="7148115" y="1828803"/>
+            <a:ext cx="1677103" cy="1"/>
+          </a:xfrm>
+          <a:prstGeom prst="straightConnector1">
+            <a:avLst/>
+          </a:prstGeom>
+          <a:ln>
+            <a:tailEnd type="triangle"/>
+          </a:ln>
+        </p:spPr>
+        <p:style>
+          <a:lnRef idx="1">
+            <a:schemeClr val="accent1"/>
+          </a:lnRef>
+          <a:fillRef idx="0">
+            <a:schemeClr val="accent1"/>
+          </a:fillRef>
+          <a:effectRef idx="0">
+            <a:schemeClr val="accent1"/>
+          </a:effectRef>
+          <a:fontRef idx="minor">
+            <a:schemeClr val="tx1"/>
+          </a:fontRef>
+        </p:style>
+      </p:cxnSp>
+      <p:cxnSp>
+        <p:nvCxnSpPr>
+          <p:cNvPr id="36" name="Straight Arrow Connector 35">
+            <a:extLst>
+              <a:ext uri="{FF2B5EF4-FFF2-40B4-BE49-F238E27FC236}">
+                <a16:creationId xmlns:a16="http://schemas.microsoft.com/office/drawing/2014/main" id="{C7E14A92-1AC9-4AF1-966D-8982977E7329}"/>
+              </a:ext>
+            </a:extLst>
+          </p:cNvPr>
+          <p:cNvCxnSpPr>
+            <a:cxnSpLocks/>
+          </p:cNvCxnSpPr>
+          <p:nvPr/>
+        </p:nvCxnSpPr>
+        <p:spPr>
+          <a:xfrm>
+            <a:off x="9736820" y="3252829"/>
+            <a:ext cx="798559" cy="0"/>
+          </a:xfrm>
+          <a:prstGeom prst="straightConnector1">
+            <a:avLst/>
+          </a:prstGeom>
+          <a:ln>
+            <a:tailEnd type="triangle"/>
+          </a:ln>
+        </p:spPr>
+        <p:style>
+          <a:lnRef idx="1">
+            <a:schemeClr val="accent1"/>
+          </a:lnRef>
+          <a:fillRef idx="0">
+            <a:schemeClr val="accent1"/>
+          </a:fillRef>
+          <a:effectRef idx="0">
+            <a:schemeClr val="accent1"/>
+          </a:effectRef>
+          <a:fontRef idx="minor">
+            <a:schemeClr val="tx1"/>
+          </a:fontRef>
+        </p:style>
+      </p:cxnSp>
+    </p:spTree>
+    <p:extLst>
+      <p:ext uri="{BB962C8B-B14F-4D97-AF65-F5344CB8AC3E}">
+        <p14:creationId xmlns:p14="http://schemas.microsoft.com/office/powerpoint/2010/main" val="3114916143"/>
       </p:ext>
     </p:extLst>
   </p:cSld>

</xml_diff>

<commit_message>
Chapter 2 first draft
- Cleaned up chapter 2 such that it was in a presentable form for Chris to review.
- Still need to add some references in the later half of chapter 2.
</commit_message>
<xml_diff>
--- a/figures/Neural_network_diagrams.pptx
+++ b/figures/Neural_network_diagrams.pptx
@@ -10,6 +10,7 @@
     <p:sldId id="258" r:id="rId4"/>
     <p:sldId id="259" r:id="rId5"/>
     <p:sldId id="260" r:id="rId6"/>
+    <p:sldId id="261" r:id="rId7"/>
   </p:sldIdLst>
   <p:sldSz cx="12192000" cy="6858000"/>
   <p:notesSz cx="6858000" cy="9144000"/>
@@ -263,7 +264,7 @@
           <a:p>
             <a:fld id="{EA8E6676-3294-4EB9-9610-18275A1F2370}" type="datetimeFigureOut">
               <a:rPr lang="en-US" smtClean="0"/>
-              <a:t>2/15/2021</a:t>
+              <a:t>2/17/2021</a:t>
             </a:fld>
             <a:endParaRPr lang="en-US"/>
           </a:p>
@@ -461,7 +462,7 @@
           <a:p>
             <a:fld id="{EA8E6676-3294-4EB9-9610-18275A1F2370}" type="datetimeFigureOut">
               <a:rPr lang="en-US" smtClean="0"/>
-              <a:t>2/15/2021</a:t>
+              <a:t>2/17/2021</a:t>
             </a:fld>
             <a:endParaRPr lang="en-US"/>
           </a:p>
@@ -669,7 +670,7 @@
           <a:p>
             <a:fld id="{EA8E6676-3294-4EB9-9610-18275A1F2370}" type="datetimeFigureOut">
               <a:rPr lang="en-US" smtClean="0"/>
-              <a:t>2/15/2021</a:t>
+              <a:t>2/17/2021</a:t>
             </a:fld>
             <a:endParaRPr lang="en-US"/>
           </a:p>
@@ -867,7 +868,7 @@
           <a:p>
             <a:fld id="{EA8E6676-3294-4EB9-9610-18275A1F2370}" type="datetimeFigureOut">
               <a:rPr lang="en-US" smtClean="0"/>
-              <a:t>2/15/2021</a:t>
+              <a:t>2/17/2021</a:t>
             </a:fld>
             <a:endParaRPr lang="en-US"/>
           </a:p>
@@ -1142,7 +1143,7 @@
           <a:p>
             <a:fld id="{EA8E6676-3294-4EB9-9610-18275A1F2370}" type="datetimeFigureOut">
               <a:rPr lang="en-US" smtClean="0"/>
-              <a:t>2/15/2021</a:t>
+              <a:t>2/17/2021</a:t>
             </a:fld>
             <a:endParaRPr lang="en-US"/>
           </a:p>
@@ -1407,7 +1408,7 @@
           <a:p>
             <a:fld id="{EA8E6676-3294-4EB9-9610-18275A1F2370}" type="datetimeFigureOut">
               <a:rPr lang="en-US" smtClean="0"/>
-              <a:t>2/15/2021</a:t>
+              <a:t>2/17/2021</a:t>
             </a:fld>
             <a:endParaRPr lang="en-US"/>
           </a:p>
@@ -1819,7 +1820,7 @@
           <a:p>
             <a:fld id="{EA8E6676-3294-4EB9-9610-18275A1F2370}" type="datetimeFigureOut">
               <a:rPr lang="en-US" smtClean="0"/>
-              <a:t>2/15/2021</a:t>
+              <a:t>2/17/2021</a:t>
             </a:fld>
             <a:endParaRPr lang="en-US"/>
           </a:p>
@@ -1960,7 +1961,7 @@
           <a:p>
             <a:fld id="{EA8E6676-3294-4EB9-9610-18275A1F2370}" type="datetimeFigureOut">
               <a:rPr lang="en-US" smtClean="0"/>
-              <a:t>2/15/2021</a:t>
+              <a:t>2/17/2021</a:t>
             </a:fld>
             <a:endParaRPr lang="en-US"/>
           </a:p>
@@ -2073,7 +2074,7 @@
           <a:p>
             <a:fld id="{EA8E6676-3294-4EB9-9610-18275A1F2370}" type="datetimeFigureOut">
               <a:rPr lang="en-US" smtClean="0"/>
-              <a:t>2/15/2021</a:t>
+              <a:t>2/17/2021</a:t>
             </a:fld>
             <a:endParaRPr lang="en-US"/>
           </a:p>
@@ -2384,7 +2385,7 @@
           <a:p>
             <a:fld id="{EA8E6676-3294-4EB9-9610-18275A1F2370}" type="datetimeFigureOut">
               <a:rPr lang="en-US" smtClean="0"/>
-              <a:t>2/15/2021</a:t>
+              <a:t>2/17/2021</a:t>
             </a:fld>
             <a:endParaRPr lang="en-US"/>
           </a:p>
@@ -2672,7 +2673,7 @@
           <a:p>
             <a:fld id="{EA8E6676-3294-4EB9-9610-18275A1F2370}" type="datetimeFigureOut">
               <a:rPr lang="en-US" smtClean="0"/>
-              <a:t>2/15/2021</a:t>
+              <a:t>2/17/2021</a:t>
             </a:fld>
             <a:endParaRPr lang="en-US"/>
           </a:p>
@@ -2913,7 +2914,7 @@
           <a:p>
             <a:fld id="{EA8E6676-3294-4EB9-9610-18275A1F2370}" type="datetimeFigureOut">
               <a:rPr lang="en-US" smtClean="0"/>
-              <a:t>2/15/2021</a:t>
+              <a:t>2/17/2021</a:t>
             </a:fld>
             <a:endParaRPr lang="en-US"/>
           </a:p>
@@ -16752,8 +16753,8 @@
           </a:p>
         </p:txBody>
       </p:sp>
-      <mc:AlternateContent xmlns:mc="http://schemas.openxmlformats.org/markup-compatibility/2006">
-        <mc:Choice xmlns:a14="http://schemas.microsoft.com/office/drawing/2010/main" Requires="a14">
+      <mc:AlternateContent xmlns:mc="http://schemas.openxmlformats.org/markup-compatibility/2006" xmlns:a14="http://schemas.microsoft.com/office/drawing/2010/main">
+        <mc:Choice Requires="a14">
           <p:sp>
             <p:nvSpPr>
               <p:cNvPr id="9" name="TextBox 8">
@@ -16782,6 +16783,7 @@
               </a:bodyPr>
               <a:lstStyle/>
               <a:p>
+                <a:pPr/>
                 <a14:m>
                   <m:oMathPara xmlns:m="http://schemas.openxmlformats.org/officeDocument/2006/math">
                     <m:oMathParaPr>
@@ -16802,7 +16804,7 @@
             </p:txBody>
           </p:sp>
         </mc:Choice>
-        <mc:Fallback>
+        <mc:Fallback xmlns="">
           <p:sp>
             <p:nvSpPr>
               <p:cNvPr id="9" name="TextBox 8">
@@ -16847,8 +16849,8 @@
           </p:sp>
         </mc:Fallback>
       </mc:AlternateContent>
-      <mc:AlternateContent xmlns:mc="http://schemas.openxmlformats.org/markup-compatibility/2006">
-        <mc:Choice xmlns:a14="http://schemas.microsoft.com/office/drawing/2010/main" Requires="a14">
+      <mc:AlternateContent xmlns:mc="http://schemas.openxmlformats.org/markup-compatibility/2006" xmlns:a14="http://schemas.microsoft.com/office/drawing/2010/main">
+        <mc:Choice Requires="a14">
           <p:sp>
             <p:nvSpPr>
               <p:cNvPr id="10" name="TextBox 9">
@@ -16877,6 +16879,7 @@
               </a:bodyPr>
               <a:lstStyle/>
               <a:p>
+                <a:pPr/>
                 <a14:m>
                   <m:oMathPara xmlns:m="http://schemas.openxmlformats.org/officeDocument/2006/math">
                     <m:oMathParaPr>
@@ -16897,7 +16900,7 @@
             </p:txBody>
           </p:sp>
         </mc:Choice>
-        <mc:Fallback>
+        <mc:Fallback xmlns="">
           <p:sp>
             <p:nvSpPr>
               <p:cNvPr id="10" name="TextBox 9">
@@ -16942,8 +16945,8 @@
           </p:sp>
         </mc:Fallback>
       </mc:AlternateContent>
-      <mc:AlternateContent xmlns:mc="http://schemas.openxmlformats.org/markup-compatibility/2006">
-        <mc:Choice xmlns:a14="http://schemas.microsoft.com/office/drawing/2010/main" Requires="a14">
+      <mc:AlternateContent xmlns:mc="http://schemas.openxmlformats.org/markup-compatibility/2006" xmlns:a14="http://schemas.microsoft.com/office/drawing/2010/main">
+        <mc:Choice Requires="a14">
           <p:sp>
             <p:nvSpPr>
               <p:cNvPr id="11" name="TextBox 10">
@@ -16972,6 +16975,7 @@
               </a:bodyPr>
               <a:lstStyle/>
               <a:p>
+                <a:pPr/>
                 <a14:m>
                   <m:oMathPara xmlns:m="http://schemas.openxmlformats.org/officeDocument/2006/math">
                     <m:oMathParaPr>
@@ -16992,7 +16996,7 @@
             </p:txBody>
           </p:sp>
         </mc:Choice>
-        <mc:Fallback>
+        <mc:Fallback xmlns="">
           <p:sp>
             <p:nvSpPr>
               <p:cNvPr id="11" name="TextBox 10">
@@ -17037,8 +17041,8 @@
           </p:sp>
         </mc:Fallback>
       </mc:AlternateContent>
-      <mc:AlternateContent xmlns:mc="http://schemas.openxmlformats.org/markup-compatibility/2006">
-        <mc:Choice xmlns:a14="http://schemas.microsoft.com/office/drawing/2010/main" Requires="a14">
+      <mc:AlternateContent xmlns:mc="http://schemas.openxmlformats.org/markup-compatibility/2006" xmlns:a14="http://schemas.microsoft.com/office/drawing/2010/main">
+        <mc:Choice Requires="a14">
           <p:sp>
             <p:nvSpPr>
               <p:cNvPr id="12" name="TextBox 11">
@@ -17067,6 +17071,7 @@
               </a:bodyPr>
               <a:lstStyle/>
               <a:p>
+                <a:pPr/>
                 <a14:m>
                   <m:oMathPara xmlns:m="http://schemas.openxmlformats.org/officeDocument/2006/math">
                     <m:oMathParaPr>
@@ -17087,7 +17092,7 @@
             </p:txBody>
           </p:sp>
         </mc:Choice>
-        <mc:Fallback>
+        <mc:Fallback xmlns="">
           <p:sp>
             <p:nvSpPr>
               <p:cNvPr id="12" name="TextBox 11">
@@ -17132,8 +17137,8 @@
           </p:sp>
         </mc:Fallback>
       </mc:AlternateContent>
-      <mc:AlternateContent xmlns:mc="http://schemas.openxmlformats.org/markup-compatibility/2006">
-        <mc:Choice xmlns:a14="http://schemas.microsoft.com/office/drawing/2010/main" Requires="a14">
+      <mc:AlternateContent xmlns:mc="http://schemas.openxmlformats.org/markup-compatibility/2006" xmlns:a14="http://schemas.microsoft.com/office/drawing/2010/main">
+        <mc:Choice Requires="a14">
           <p:sp>
             <p:nvSpPr>
               <p:cNvPr id="13" name="TextBox 12">
@@ -17162,6 +17167,7 @@
               </a:bodyPr>
               <a:lstStyle/>
               <a:p>
+                <a:pPr/>
                 <a14:m>
                   <m:oMathPara xmlns:m="http://schemas.openxmlformats.org/officeDocument/2006/math">
                     <m:oMathParaPr>
@@ -17182,7 +17188,7 @@
             </p:txBody>
           </p:sp>
         </mc:Choice>
-        <mc:Fallback>
+        <mc:Fallback xmlns="">
           <p:sp>
             <p:nvSpPr>
               <p:cNvPr id="13" name="TextBox 12">
@@ -18084,8 +18090,8 @@
           </a:p>
         </p:txBody>
       </p:sp>
-      <mc:AlternateContent xmlns:mc="http://schemas.openxmlformats.org/markup-compatibility/2006">
-        <mc:Choice xmlns:a14="http://schemas.microsoft.com/office/drawing/2010/main" Requires="a14">
+      <mc:AlternateContent xmlns:mc="http://schemas.openxmlformats.org/markup-compatibility/2006" xmlns:a14="http://schemas.microsoft.com/office/drawing/2010/main">
+        <mc:Choice Requires="a14">
           <p:sp>
             <p:nvSpPr>
               <p:cNvPr id="11" name="TextBox 10">
@@ -18114,6 +18120,7 @@
               </a:bodyPr>
               <a:lstStyle/>
               <a:p>
+                <a:pPr/>
                 <a14:m>
                   <m:oMathPara xmlns:m="http://schemas.openxmlformats.org/officeDocument/2006/math">
                     <m:oMathParaPr>
@@ -18134,7 +18141,7 @@
             </p:txBody>
           </p:sp>
         </mc:Choice>
-        <mc:Fallback>
+        <mc:Fallback xmlns="">
           <p:sp>
             <p:nvSpPr>
               <p:cNvPr id="11" name="TextBox 10">
@@ -18179,8 +18186,8 @@
           </p:sp>
         </mc:Fallback>
       </mc:AlternateContent>
-      <mc:AlternateContent xmlns:mc="http://schemas.openxmlformats.org/markup-compatibility/2006">
-        <mc:Choice xmlns:a14="http://schemas.microsoft.com/office/drawing/2010/main" Requires="a14">
+      <mc:AlternateContent xmlns:mc="http://schemas.openxmlformats.org/markup-compatibility/2006" xmlns:a14="http://schemas.microsoft.com/office/drawing/2010/main">
+        <mc:Choice Requires="a14">
           <p:sp>
             <p:nvSpPr>
               <p:cNvPr id="12" name="TextBox 11">
@@ -18209,6 +18216,7 @@
               </a:bodyPr>
               <a:lstStyle/>
               <a:p>
+                <a:pPr/>
                 <a14:m>
                   <m:oMathPara xmlns:m="http://schemas.openxmlformats.org/officeDocument/2006/math">
                     <m:oMathParaPr>
@@ -18229,7 +18237,7 @@
             </p:txBody>
           </p:sp>
         </mc:Choice>
-        <mc:Fallback>
+        <mc:Fallback xmlns="">
           <p:sp>
             <p:nvSpPr>
               <p:cNvPr id="12" name="TextBox 11">
@@ -18274,8 +18282,8 @@
           </p:sp>
         </mc:Fallback>
       </mc:AlternateContent>
-      <mc:AlternateContent xmlns:mc="http://schemas.openxmlformats.org/markup-compatibility/2006">
-        <mc:Choice xmlns:a14="http://schemas.microsoft.com/office/drawing/2010/main" Requires="a14">
+      <mc:AlternateContent xmlns:mc="http://schemas.openxmlformats.org/markup-compatibility/2006" xmlns:a14="http://schemas.microsoft.com/office/drawing/2010/main">
+        <mc:Choice Requires="a14">
           <p:sp>
             <p:nvSpPr>
               <p:cNvPr id="13" name="TextBox 12">
@@ -18304,6 +18312,7 @@
               </a:bodyPr>
               <a:lstStyle/>
               <a:p>
+                <a:pPr/>
                 <a14:m>
                   <m:oMathPara xmlns:m="http://schemas.openxmlformats.org/officeDocument/2006/math">
                     <m:oMathParaPr>
@@ -18324,7 +18333,7 @@
             </p:txBody>
           </p:sp>
         </mc:Choice>
-        <mc:Fallback>
+        <mc:Fallback xmlns="">
           <p:sp>
             <p:nvSpPr>
               <p:cNvPr id="13" name="TextBox 12">
@@ -18369,8 +18378,8 @@
           </p:sp>
         </mc:Fallback>
       </mc:AlternateContent>
-      <mc:AlternateContent xmlns:mc="http://schemas.openxmlformats.org/markup-compatibility/2006">
-        <mc:Choice xmlns:a14="http://schemas.microsoft.com/office/drawing/2010/main" Requires="a14">
+      <mc:AlternateContent xmlns:mc="http://schemas.openxmlformats.org/markup-compatibility/2006" xmlns:a14="http://schemas.microsoft.com/office/drawing/2010/main">
+        <mc:Choice Requires="a14">
           <p:sp>
             <p:nvSpPr>
               <p:cNvPr id="14" name="TextBox 13">
@@ -18399,6 +18408,7 @@
               </a:bodyPr>
               <a:lstStyle/>
               <a:p>
+                <a:pPr/>
                 <a14:m>
                   <m:oMathPara xmlns:m="http://schemas.openxmlformats.org/officeDocument/2006/math">
                     <m:oMathParaPr>
@@ -18419,7 +18429,7 @@
             </p:txBody>
           </p:sp>
         </mc:Choice>
-        <mc:Fallback>
+        <mc:Fallback xmlns="">
           <p:sp>
             <p:nvSpPr>
               <p:cNvPr id="14" name="TextBox 13">
@@ -18464,8 +18474,8 @@
           </p:sp>
         </mc:Fallback>
       </mc:AlternateContent>
-      <mc:AlternateContent xmlns:mc="http://schemas.openxmlformats.org/markup-compatibility/2006">
-        <mc:Choice xmlns:a14="http://schemas.microsoft.com/office/drawing/2010/main" Requires="a14">
+      <mc:AlternateContent xmlns:mc="http://schemas.openxmlformats.org/markup-compatibility/2006" xmlns:a14="http://schemas.microsoft.com/office/drawing/2010/main">
+        <mc:Choice Requires="a14">
           <p:sp>
             <p:nvSpPr>
               <p:cNvPr id="15" name="TextBox 14">
@@ -18494,6 +18504,7 @@
               </a:bodyPr>
               <a:lstStyle/>
               <a:p>
+                <a:pPr/>
                 <a14:m>
                   <m:oMathPara xmlns:m="http://schemas.openxmlformats.org/officeDocument/2006/math">
                     <m:oMathParaPr>
@@ -18514,7 +18525,7 @@
             </p:txBody>
           </p:sp>
         </mc:Choice>
-        <mc:Fallback>
+        <mc:Fallback xmlns="">
           <p:sp>
             <p:nvSpPr>
               <p:cNvPr id="15" name="TextBox 14">
@@ -19044,8 +19055,8 @@
           </a:p>
         </p:txBody>
       </p:sp>
-      <mc:AlternateContent xmlns:mc="http://schemas.openxmlformats.org/markup-compatibility/2006">
-        <mc:Choice xmlns:a14="http://schemas.microsoft.com/office/drawing/2010/main" Requires="a14">
+      <mc:AlternateContent xmlns:mc="http://schemas.openxmlformats.org/markup-compatibility/2006" xmlns:a14="http://schemas.microsoft.com/office/drawing/2010/main">
+        <mc:Choice Requires="a14">
           <p:sp>
             <p:nvSpPr>
               <p:cNvPr id="29" name="TextBox 28">
@@ -19074,6 +19085,7 @@
               </a:bodyPr>
               <a:lstStyle/>
               <a:p>
+                <a:pPr/>
                 <a14:m>
                   <m:oMathPara xmlns:m="http://schemas.openxmlformats.org/officeDocument/2006/math">
                     <m:oMathParaPr>
@@ -19094,7 +19106,7 @@
             </p:txBody>
           </p:sp>
         </mc:Choice>
-        <mc:Fallback>
+        <mc:Fallback xmlns="">
           <p:sp>
             <p:nvSpPr>
               <p:cNvPr id="29" name="TextBox 28">
@@ -19139,8 +19151,8 @@
           </p:sp>
         </mc:Fallback>
       </mc:AlternateContent>
-      <mc:AlternateContent xmlns:mc="http://schemas.openxmlformats.org/markup-compatibility/2006">
-        <mc:Choice xmlns:a14="http://schemas.microsoft.com/office/drawing/2010/main" Requires="a14">
+      <mc:AlternateContent xmlns:mc="http://schemas.openxmlformats.org/markup-compatibility/2006" xmlns:a14="http://schemas.microsoft.com/office/drawing/2010/main">
+        <mc:Choice Requires="a14">
           <p:sp>
             <p:nvSpPr>
               <p:cNvPr id="30" name="TextBox 29">
@@ -19169,6 +19181,7 @@
               </a:bodyPr>
               <a:lstStyle/>
               <a:p>
+                <a:pPr/>
                 <a14:m>
                   <m:oMathPara xmlns:m="http://schemas.openxmlformats.org/officeDocument/2006/math">
                     <m:oMathParaPr>
@@ -19189,7 +19202,7 @@
             </p:txBody>
           </p:sp>
         </mc:Choice>
-        <mc:Fallback>
+        <mc:Fallback xmlns="">
           <p:sp>
             <p:nvSpPr>
               <p:cNvPr id="30" name="TextBox 29">
@@ -19400,6 +19413,1962 @@
     <p:extLst>
       <p:ext uri="{BB962C8B-B14F-4D97-AF65-F5344CB8AC3E}">
         <p14:creationId xmlns:p14="http://schemas.microsoft.com/office/powerpoint/2010/main" val="3114916143"/>
+      </p:ext>
+    </p:extLst>
+  </p:cSld>
+  <p:clrMapOvr>
+    <a:masterClrMapping/>
+  </p:clrMapOvr>
+</p:sld>
+</file>
+
+<file path=ppt/slides/slide6.xml><?xml version="1.0" encoding="utf-8"?>
+<p:sld xmlns:a="http://schemas.openxmlformats.org/drawingml/2006/main" xmlns:r="http://schemas.openxmlformats.org/officeDocument/2006/relationships" xmlns:p="http://schemas.openxmlformats.org/presentationml/2006/main">
+  <p:cSld>
+    <p:spTree>
+      <p:nvGrpSpPr>
+        <p:cNvPr id="1" name=""/>
+        <p:cNvGrpSpPr/>
+        <p:nvPr/>
+      </p:nvGrpSpPr>
+      <p:grpSpPr>
+        <a:xfrm>
+          <a:off x="0" y="0"/>
+          <a:ext cx="0" cy="0"/>
+          <a:chOff x="0" y="0"/>
+          <a:chExt cx="0" cy="0"/>
+        </a:xfrm>
+      </p:grpSpPr>
+      <p:sp>
+        <p:nvSpPr>
+          <p:cNvPr id="8" name="Rectangle 7">
+            <a:extLst>
+              <a:ext uri="{FF2B5EF4-FFF2-40B4-BE49-F238E27FC236}">
+                <a16:creationId xmlns:a16="http://schemas.microsoft.com/office/drawing/2014/main" id="{DF01A3E6-9E20-4EBB-BE5A-F2F2A325F32B}"/>
+              </a:ext>
+            </a:extLst>
+          </p:cNvPr>
+          <p:cNvSpPr/>
+          <p:nvPr/>
+        </p:nvSpPr>
+        <p:spPr>
+          <a:xfrm>
+            <a:off x="1937856" y="2910980"/>
+            <a:ext cx="755009" cy="645953"/>
+          </a:xfrm>
+          <a:prstGeom prst="rect">
+            <a:avLst/>
+          </a:prstGeom>
+          <a:solidFill>
+            <a:srgbClr val="7030A0"/>
+          </a:solidFill>
+        </p:spPr>
+        <p:style>
+          <a:lnRef idx="2">
+            <a:schemeClr val="accent1">
+              <a:shade val="50000"/>
+            </a:schemeClr>
+          </a:lnRef>
+          <a:fillRef idx="1">
+            <a:schemeClr val="accent1"/>
+          </a:fillRef>
+          <a:effectRef idx="0">
+            <a:schemeClr val="accent1"/>
+          </a:effectRef>
+          <a:fontRef idx="minor">
+            <a:schemeClr val="lt1"/>
+          </a:fontRef>
+        </p:style>
+        <p:txBody>
+          <a:bodyPr rtlCol="0" anchor="ctr"/>
+          <a:lstStyle/>
+          <a:p>
+            <a:pPr algn="ctr"/>
+            <a:endParaRPr lang="en-US"/>
+          </a:p>
+        </p:txBody>
+      </p:sp>
+      <p:sp>
+        <p:nvSpPr>
+          <p:cNvPr id="9" name="Rectangle 8">
+            <a:extLst>
+              <a:ext uri="{FF2B5EF4-FFF2-40B4-BE49-F238E27FC236}">
+                <a16:creationId xmlns:a16="http://schemas.microsoft.com/office/drawing/2014/main" id="{ED2B4D9A-91F0-4268-905B-A3F01748C8EA}"/>
+              </a:ext>
+            </a:extLst>
+          </p:cNvPr>
+          <p:cNvSpPr/>
+          <p:nvPr/>
+        </p:nvSpPr>
+        <p:spPr>
+          <a:xfrm>
+            <a:off x="2692865" y="2910980"/>
+            <a:ext cx="755009" cy="645953"/>
+          </a:xfrm>
+          <a:prstGeom prst="rect">
+            <a:avLst/>
+          </a:prstGeom>
+          <a:solidFill>
+            <a:schemeClr val="accent1">
+              <a:lumMod val="60000"/>
+              <a:lumOff val="40000"/>
+            </a:schemeClr>
+          </a:solidFill>
+        </p:spPr>
+        <p:style>
+          <a:lnRef idx="2">
+            <a:schemeClr val="accent1">
+              <a:shade val="50000"/>
+            </a:schemeClr>
+          </a:lnRef>
+          <a:fillRef idx="1">
+            <a:schemeClr val="accent1"/>
+          </a:fillRef>
+          <a:effectRef idx="0">
+            <a:schemeClr val="accent1"/>
+          </a:effectRef>
+          <a:fontRef idx="minor">
+            <a:schemeClr val="lt1"/>
+          </a:fontRef>
+        </p:style>
+        <p:txBody>
+          <a:bodyPr rtlCol="0" anchor="ctr"/>
+          <a:lstStyle/>
+          <a:p>
+            <a:pPr algn="ctr"/>
+            <a:endParaRPr lang="en-US"/>
+          </a:p>
+        </p:txBody>
+      </p:sp>
+      <p:sp>
+        <p:nvSpPr>
+          <p:cNvPr id="12" name="Rectangle 11">
+            <a:extLst>
+              <a:ext uri="{FF2B5EF4-FFF2-40B4-BE49-F238E27FC236}">
+                <a16:creationId xmlns:a16="http://schemas.microsoft.com/office/drawing/2014/main" id="{6138E2F8-4CD1-4647-8E0D-3A5CD0D77640}"/>
+              </a:ext>
+            </a:extLst>
+          </p:cNvPr>
+          <p:cNvSpPr/>
+          <p:nvPr/>
+        </p:nvSpPr>
+        <p:spPr>
+          <a:xfrm>
+            <a:off x="2692864" y="3556933"/>
+            <a:ext cx="755009" cy="645953"/>
+          </a:xfrm>
+          <a:prstGeom prst="rect">
+            <a:avLst/>
+          </a:prstGeom>
+          <a:solidFill>
+            <a:schemeClr val="accent1">
+              <a:lumMod val="60000"/>
+              <a:lumOff val="40000"/>
+            </a:schemeClr>
+          </a:solidFill>
+        </p:spPr>
+        <p:style>
+          <a:lnRef idx="2">
+            <a:schemeClr val="accent1">
+              <a:shade val="50000"/>
+            </a:schemeClr>
+          </a:lnRef>
+          <a:fillRef idx="1">
+            <a:schemeClr val="accent1"/>
+          </a:fillRef>
+          <a:effectRef idx="0">
+            <a:schemeClr val="accent1"/>
+          </a:effectRef>
+          <a:fontRef idx="minor">
+            <a:schemeClr val="lt1"/>
+          </a:fontRef>
+        </p:style>
+        <p:txBody>
+          <a:bodyPr rtlCol="0" anchor="ctr"/>
+          <a:lstStyle/>
+          <a:p>
+            <a:pPr algn="ctr"/>
+            <a:endParaRPr lang="en-US"/>
+          </a:p>
+        </p:txBody>
+      </p:sp>
+      <p:cxnSp>
+        <p:nvCxnSpPr>
+          <p:cNvPr id="47" name="Straight Connector 46">
+            <a:extLst>
+              <a:ext uri="{FF2B5EF4-FFF2-40B4-BE49-F238E27FC236}">
+                <a16:creationId xmlns:a16="http://schemas.microsoft.com/office/drawing/2014/main" id="{1F3B1A33-DE6E-4E8F-A3B3-AC2933B22947}"/>
+              </a:ext>
+            </a:extLst>
+          </p:cNvPr>
+          <p:cNvCxnSpPr/>
+          <p:nvPr/>
+        </p:nvCxnSpPr>
+        <p:spPr>
+          <a:xfrm flipH="1" flipV="1">
+            <a:off x="2692864" y="3542243"/>
+            <a:ext cx="3615656" cy="337663"/>
+          </a:xfrm>
+          <a:prstGeom prst="line">
+            <a:avLst/>
+          </a:prstGeom>
+        </p:spPr>
+        <p:style>
+          <a:lnRef idx="1">
+            <a:schemeClr val="dk1"/>
+          </a:lnRef>
+          <a:fillRef idx="0">
+            <a:schemeClr val="dk1"/>
+          </a:fillRef>
+          <a:effectRef idx="0">
+            <a:schemeClr val="dk1"/>
+          </a:effectRef>
+          <a:fontRef idx="minor">
+            <a:schemeClr val="tx1"/>
+          </a:fontRef>
+        </p:style>
+      </p:cxnSp>
+      <p:sp>
+        <p:nvSpPr>
+          <p:cNvPr id="4" name="Rectangle 3">
+            <a:extLst>
+              <a:ext uri="{FF2B5EF4-FFF2-40B4-BE49-F238E27FC236}">
+                <a16:creationId xmlns:a16="http://schemas.microsoft.com/office/drawing/2014/main" id="{8BFF913C-DFC4-4CFD-90EA-2E1A264151C3}"/>
+              </a:ext>
+            </a:extLst>
+          </p:cNvPr>
+          <p:cNvSpPr/>
+          <p:nvPr/>
+        </p:nvSpPr>
+        <p:spPr>
+          <a:xfrm>
+            <a:off x="1178651" y="2265023"/>
+            <a:ext cx="755009" cy="645953"/>
+          </a:xfrm>
+          <a:prstGeom prst="rect">
+            <a:avLst/>
+          </a:prstGeom>
+          <a:solidFill>
+            <a:srgbClr val="7030A0"/>
+          </a:solidFill>
+        </p:spPr>
+        <p:style>
+          <a:lnRef idx="2">
+            <a:schemeClr val="accent1">
+              <a:shade val="50000"/>
+            </a:schemeClr>
+          </a:lnRef>
+          <a:fillRef idx="1">
+            <a:schemeClr val="accent1"/>
+          </a:fillRef>
+          <a:effectRef idx="0">
+            <a:schemeClr val="accent1"/>
+          </a:effectRef>
+          <a:fontRef idx="minor">
+            <a:schemeClr val="lt1"/>
+          </a:fontRef>
+        </p:style>
+        <p:txBody>
+          <a:bodyPr rtlCol="0" anchor="ctr"/>
+          <a:lstStyle/>
+          <a:p>
+            <a:pPr algn="ctr"/>
+            <a:endParaRPr lang="en-US"/>
+          </a:p>
+        </p:txBody>
+      </p:sp>
+      <p:sp>
+        <p:nvSpPr>
+          <p:cNvPr id="5" name="Rectangle 4">
+            <a:extLst>
+              <a:ext uri="{FF2B5EF4-FFF2-40B4-BE49-F238E27FC236}">
+                <a16:creationId xmlns:a16="http://schemas.microsoft.com/office/drawing/2014/main" id="{6DC3C0A7-9AE4-4685-81B6-3EBBE1660867}"/>
+              </a:ext>
+            </a:extLst>
+          </p:cNvPr>
+          <p:cNvSpPr/>
+          <p:nvPr/>
+        </p:nvSpPr>
+        <p:spPr>
+          <a:xfrm>
+            <a:off x="1937856" y="2265027"/>
+            <a:ext cx="755009" cy="645953"/>
+          </a:xfrm>
+          <a:prstGeom prst="rect">
+            <a:avLst/>
+          </a:prstGeom>
+          <a:solidFill>
+            <a:srgbClr val="7030A0"/>
+          </a:solidFill>
+        </p:spPr>
+        <p:style>
+          <a:lnRef idx="2">
+            <a:schemeClr val="accent1">
+              <a:shade val="50000"/>
+            </a:schemeClr>
+          </a:lnRef>
+          <a:fillRef idx="1">
+            <a:schemeClr val="accent1"/>
+          </a:fillRef>
+          <a:effectRef idx="0">
+            <a:schemeClr val="accent1"/>
+          </a:effectRef>
+          <a:fontRef idx="minor">
+            <a:schemeClr val="lt1"/>
+          </a:fontRef>
+        </p:style>
+        <p:txBody>
+          <a:bodyPr rtlCol="0" anchor="ctr"/>
+          <a:lstStyle/>
+          <a:p>
+            <a:pPr algn="ctr"/>
+            <a:endParaRPr lang="en-US"/>
+          </a:p>
+        </p:txBody>
+      </p:sp>
+      <p:sp>
+        <p:nvSpPr>
+          <p:cNvPr id="6" name="Rectangle 5">
+            <a:extLst>
+              <a:ext uri="{FF2B5EF4-FFF2-40B4-BE49-F238E27FC236}">
+                <a16:creationId xmlns:a16="http://schemas.microsoft.com/office/drawing/2014/main" id="{CF01AE61-6633-4556-841E-B05AB02452D8}"/>
+              </a:ext>
+            </a:extLst>
+          </p:cNvPr>
+          <p:cNvSpPr/>
+          <p:nvPr/>
+        </p:nvSpPr>
+        <p:spPr>
+          <a:xfrm>
+            <a:off x="2692865" y="2265027"/>
+            <a:ext cx="755009" cy="645953"/>
+          </a:xfrm>
+          <a:prstGeom prst="rect">
+            <a:avLst/>
+          </a:prstGeom>
+          <a:solidFill>
+            <a:schemeClr val="accent1">
+              <a:lumMod val="60000"/>
+              <a:lumOff val="40000"/>
+            </a:schemeClr>
+          </a:solidFill>
+        </p:spPr>
+        <p:style>
+          <a:lnRef idx="2">
+            <a:schemeClr val="accent1">
+              <a:shade val="50000"/>
+            </a:schemeClr>
+          </a:lnRef>
+          <a:fillRef idx="1">
+            <a:schemeClr val="accent1"/>
+          </a:fillRef>
+          <a:effectRef idx="0">
+            <a:schemeClr val="accent1"/>
+          </a:effectRef>
+          <a:fontRef idx="minor">
+            <a:schemeClr val="lt1"/>
+          </a:fontRef>
+        </p:style>
+        <p:txBody>
+          <a:bodyPr rtlCol="0" anchor="ctr"/>
+          <a:lstStyle/>
+          <a:p>
+            <a:pPr algn="ctr"/>
+            <a:endParaRPr lang="en-US"/>
+          </a:p>
+        </p:txBody>
+      </p:sp>
+      <p:sp>
+        <p:nvSpPr>
+          <p:cNvPr id="7" name="Rectangle 6">
+            <a:extLst>
+              <a:ext uri="{FF2B5EF4-FFF2-40B4-BE49-F238E27FC236}">
+                <a16:creationId xmlns:a16="http://schemas.microsoft.com/office/drawing/2014/main" id="{B9146034-1351-4B2B-B7E3-95BE6666242C}"/>
+              </a:ext>
+            </a:extLst>
+          </p:cNvPr>
+          <p:cNvSpPr/>
+          <p:nvPr/>
+        </p:nvSpPr>
+        <p:spPr>
+          <a:xfrm>
+            <a:off x="1174455" y="2917539"/>
+            <a:ext cx="755009" cy="645953"/>
+          </a:xfrm>
+          <a:prstGeom prst="rect">
+            <a:avLst/>
+          </a:prstGeom>
+          <a:solidFill>
+            <a:srgbClr val="7030A0"/>
+          </a:solidFill>
+        </p:spPr>
+        <p:style>
+          <a:lnRef idx="2">
+            <a:schemeClr val="accent1">
+              <a:shade val="50000"/>
+            </a:schemeClr>
+          </a:lnRef>
+          <a:fillRef idx="1">
+            <a:schemeClr val="accent1"/>
+          </a:fillRef>
+          <a:effectRef idx="0">
+            <a:schemeClr val="accent1"/>
+          </a:effectRef>
+          <a:fontRef idx="minor">
+            <a:schemeClr val="lt1"/>
+          </a:fontRef>
+        </p:style>
+        <p:txBody>
+          <a:bodyPr rtlCol="0" anchor="ctr"/>
+          <a:lstStyle/>
+          <a:p>
+            <a:pPr algn="ctr"/>
+            <a:endParaRPr lang="en-US"/>
+          </a:p>
+        </p:txBody>
+      </p:sp>
+      <p:sp>
+        <p:nvSpPr>
+          <p:cNvPr id="10" name="Rectangle 9">
+            <a:extLst>
+              <a:ext uri="{FF2B5EF4-FFF2-40B4-BE49-F238E27FC236}">
+                <a16:creationId xmlns:a16="http://schemas.microsoft.com/office/drawing/2014/main" id="{F8DDD251-FE22-452E-B024-993CB68FDC37}"/>
+              </a:ext>
+            </a:extLst>
+          </p:cNvPr>
+          <p:cNvSpPr/>
+          <p:nvPr/>
+        </p:nvSpPr>
+        <p:spPr>
+          <a:xfrm>
+            <a:off x="1174454" y="3556929"/>
+            <a:ext cx="755009" cy="645953"/>
+          </a:xfrm>
+          <a:prstGeom prst="rect">
+            <a:avLst/>
+          </a:prstGeom>
+          <a:solidFill>
+            <a:schemeClr val="accent1">
+              <a:lumMod val="60000"/>
+              <a:lumOff val="40000"/>
+            </a:schemeClr>
+          </a:solidFill>
+        </p:spPr>
+        <p:style>
+          <a:lnRef idx="2">
+            <a:schemeClr val="accent1">
+              <a:shade val="50000"/>
+            </a:schemeClr>
+          </a:lnRef>
+          <a:fillRef idx="1">
+            <a:schemeClr val="accent1"/>
+          </a:fillRef>
+          <a:effectRef idx="0">
+            <a:schemeClr val="accent1"/>
+          </a:effectRef>
+          <a:fontRef idx="minor">
+            <a:schemeClr val="lt1"/>
+          </a:fontRef>
+        </p:style>
+        <p:txBody>
+          <a:bodyPr rtlCol="0" anchor="ctr"/>
+          <a:lstStyle/>
+          <a:p>
+            <a:pPr algn="ctr"/>
+            <a:endParaRPr lang="en-US"/>
+          </a:p>
+        </p:txBody>
+      </p:sp>
+      <p:sp>
+        <p:nvSpPr>
+          <p:cNvPr id="11" name="Rectangle 10">
+            <a:extLst>
+              <a:ext uri="{FF2B5EF4-FFF2-40B4-BE49-F238E27FC236}">
+                <a16:creationId xmlns:a16="http://schemas.microsoft.com/office/drawing/2014/main" id="{C3C97DC1-1E92-4F65-A1EC-D87DAE813816}"/>
+              </a:ext>
+            </a:extLst>
+          </p:cNvPr>
+          <p:cNvSpPr/>
+          <p:nvPr/>
+        </p:nvSpPr>
+        <p:spPr>
+          <a:xfrm>
+            <a:off x="1937855" y="3556933"/>
+            <a:ext cx="755009" cy="645953"/>
+          </a:xfrm>
+          <a:prstGeom prst="rect">
+            <a:avLst/>
+          </a:prstGeom>
+          <a:solidFill>
+            <a:schemeClr val="accent1">
+              <a:lumMod val="60000"/>
+              <a:lumOff val="40000"/>
+            </a:schemeClr>
+          </a:solidFill>
+        </p:spPr>
+        <p:style>
+          <a:lnRef idx="2">
+            <a:schemeClr val="accent1">
+              <a:shade val="50000"/>
+            </a:schemeClr>
+          </a:lnRef>
+          <a:fillRef idx="1">
+            <a:schemeClr val="accent1"/>
+          </a:fillRef>
+          <a:effectRef idx="0">
+            <a:schemeClr val="accent1"/>
+          </a:effectRef>
+          <a:fontRef idx="minor">
+            <a:schemeClr val="lt1"/>
+          </a:fontRef>
+        </p:style>
+        <p:txBody>
+          <a:bodyPr rtlCol="0" anchor="ctr"/>
+          <a:lstStyle/>
+          <a:p>
+            <a:pPr algn="ctr"/>
+            <a:endParaRPr lang="en-US"/>
+          </a:p>
+        </p:txBody>
+      </p:sp>
+      <p:sp>
+        <p:nvSpPr>
+          <p:cNvPr id="17" name="Rectangle 16">
+            <a:extLst>
+              <a:ext uri="{FF2B5EF4-FFF2-40B4-BE49-F238E27FC236}">
+                <a16:creationId xmlns:a16="http://schemas.microsoft.com/office/drawing/2014/main" id="{57C38C53-B525-4A95-BC6F-854308672C6D}"/>
+              </a:ext>
+            </a:extLst>
+          </p:cNvPr>
+          <p:cNvSpPr/>
+          <p:nvPr/>
+        </p:nvSpPr>
+        <p:spPr>
+          <a:xfrm>
+            <a:off x="8204432" y="2588002"/>
+            <a:ext cx="755009" cy="645953"/>
+          </a:xfrm>
+          <a:prstGeom prst="rect">
+            <a:avLst/>
+          </a:prstGeom>
+          <a:solidFill>
+            <a:srgbClr val="7030A0"/>
+          </a:solidFill>
+        </p:spPr>
+        <p:style>
+          <a:lnRef idx="2">
+            <a:schemeClr val="accent1">
+              <a:shade val="50000"/>
+            </a:schemeClr>
+          </a:lnRef>
+          <a:fillRef idx="1">
+            <a:schemeClr val="accent1"/>
+          </a:fillRef>
+          <a:effectRef idx="0">
+            <a:schemeClr val="accent1"/>
+          </a:effectRef>
+          <a:fontRef idx="minor">
+            <a:schemeClr val="lt1"/>
+          </a:fontRef>
+        </p:style>
+        <p:txBody>
+          <a:bodyPr rtlCol="0" anchor="ctr"/>
+          <a:lstStyle/>
+          <a:p>
+            <a:pPr algn="ctr"/>
+            <a:endParaRPr lang="en-US"/>
+          </a:p>
+        </p:txBody>
+      </p:sp>
+      <p:sp>
+        <p:nvSpPr>
+          <p:cNvPr id="18" name="Rectangle 17">
+            <a:extLst>
+              <a:ext uri="{FF2B5EF4-FFF2-40B4-BE49-F238E27FC236}">
+                <a16:creationId xmlns:a16="http://schemas.microsoft.com/office/drawing/2014/main" id="{460E02FE-6F43-4D74-B99C-2CD7232ABBA0}"/>
+              </a:ext>
+            </a:extLst>
+          </p:cNvPr>
+          <p:cNvSpPr/>
+          <p:nvPr/>
+        </p:nvSpPr>
+        <p:spPr>
+          <a:xfrm>
+            <a:off x="8959441" y="2588002"/>
+            <a:ext cx="755009" cy="645953"/>
+          </a:xfrm>
+          <a:prstGeom prst="rect">
+            <a:avLst/>
+          </a:prstGeom>
+          <a:solidFill>
+            <a:schemeClr val="accent1">
+              <a:lumMod val="60000"/>
+              <a:lumOff val="40000"/>
+            </a:schemeClr>
+          </a:solidFill>
+        </p:spPr>
+        <p:style>
+          <a:lnRef idx="2">
+            <a:schemeClr val="accent1">
+              <a:shade val="50000"/>
+            </a:schemeClr>
+          </a:lnRef>
+          <a:fillRef idx="1">
+            <a:schemeClr val="accent1"/>
+          </a:fillRef>
+          <a:effectRef idx="0">
+            <a:schemeClr val="accent1"/>
+          </a:effectRef>
+          <a:fontRef idx="minor">
+            <a:schemeClr val="lt1"/>
+          </a:fontRef>
+        </p:style>
+        <p:txBody>
+          <a:bodyPr rtlCol="0" anchor="ctr"/>
+          <a:lstStyle/>
+          <a:p>
+            <a:pPr algn="ctr"/>
+            <a:endParaRPr lang="en-US"/>
+          </a:p>
+        </p:txBody>
+      </p:sp>
+      <p:sp>
+        <p:nvSpPr>
+          <p:cNvPr id="19" name="Rectangle 18">
+            <a:extLst>
+              <a:ext uri="{FF2B5EF4-FFF2-40B4-BE49-F238E27FC236}">
+                <a16:creationId xmlns:a16="http://schemas.microsoft.com/office/drawing/2014/main" id="{01EE1718-E47A-4605-AE2B-059F2C0A035F}"/>
+              </a:ext>
+            </a:extLst>
+          </p:cNvPr>
+          <p:cNvSpPr/>
+          <p:nvPr/>
+        </p:nvSpPr>
+        <p:spPr>
+          <a:xfrm>
+            <a:off x="8204431" y="3233954"/>
+            <a:ext cx="755009" cy="645953"/>
+          </a:xfrm>
+          <a:prstGeom prst="rect">
+            <a:avLst/>
+          </a:prstGeom>
+          <a:solidFill>
+            <a:schemeClr val="accent1">
+              <a:lumMod val="60000"/>
+              <a:lumOff val="40000"/>
+            </a:schemeClr>
+          </a:solidFill>
+        </p:spPr>
+        <p:style>
+          <a:lnRef idx="2">
+            <a:schemeClr val="accent1">
+              <a:shade val="50000"/>
+            </a:schemeClr>
+          </a:lnRef>
+          <a:fillRef idx="1">
+            <a:schemeClr val="accent1"/>
+          </a:fillRef>
+          <a:effectRef idx="0">
+            <a:schemeClr val="accent1"/>
+          </a:effectRef>
+          <a:fontRef idx="minor">
+            <a:schemeClr val="lt1"/>
+          </a:fontRef>
+        </p:style>
+        <p:txBody>
+          <a:bodyPr rtlCol="0" anchor="ctr"/>
+          <a:lstStyle/>
+          <a:p>
+            <a:pPr algn="ctr"/>
+            <a:endParaRPr lang="en-US"/>
+          </a:p>
+        </p:txBody>
+      </p:sp>
+      <p:sp>
+        <p:nvSpPr>
+          <p:cNvPr id="13" name="Rectangle 12">
+            <a:extLst>
+              <a:ext uri="{FF2B5EF4-FFF2-40B4-BE49-F238E27FC236}">
+                <a16:creationId xmlns:a16="http://schemas.microsoft.com/office/drawing/2014/main" id="{AC16A748-A697-403A-8FCF-E787A92FC7E3}"/>
+              </a:ext>
+            </a:extLst>
+          </p:cNvPr>
+          <p:cNvSpPr/>
+          <p:nvPr/>
+        </p:nvSpPr>
+        <p:spPr>
+          <a:xfrm>
+            <a:off x="4798502" y="2588001"/>
+            <a:ext cx="755009" cy="645953"/>
+          </a:xfrm>
+          <a:prstGeom prst="rect">
+            <a:avLst/>
+          </a:prstGeom>
+          <a:solidFill>
+            <a:srgbClr val="7030A0"/>
+          </a:solidFill>
+        </p:spPr>
+        <p:style>
+          <a:lnRef idx="2">
+            <a:schemeClr val="accent1">
+              <a:shade val="50000"/>
+            </a:schemeClr>
+          </a:lnRef>
+          <a:fillRef idx="1">
+            <a:schemeClr val="accent1"/>
+          </a:fillRef>
+          <a:effectRef idx="0">
+            <a:schemeClr val="accent1"/>
+          </a:effectRef>
+          <a:fontRef idx="minor">
+            <a:schemeClr val="lt1"/>
+          </a:fontRef>
+        </p:style>
+        <p:txBody>
+          <a:bodyPr rtlCol="0" anchor="ctr"/>
+          <a:lstStyle/>
+          <a:p>
+            <a:pPr algn="ctr"/>
+            <a:endParaRPr lang="en-US"/>
+          </a:p>
+        </p:txBody>
+      </p:sp>
+      <p:sp>
+        <p:nvSpPr>
+          <p:cNvPr id="14" name="Rectangle 13">
+            <a:extLst>
+              <a:ext uri="{FF2B5EF4-FFF2-40B4-BE49-F238E27FC236}">
+                <a16:creationId xmlns:a16="http://schemas.microsoft.com/office/drawing/2014/main" id="{E7C75F07-EF52-421B-999C-1E4847E71AB9}"/>
+              </a:ext>
+            </a:extLst>
+          </p:cNvPr>
+          <p:cNvSpPr/>
+          <p:nvPr/>
+        </p:nvSpPr>
+        <p:spPr>
+          <a:xfrm>
+            <a:off x="5553511" y="2588000"/>
+            <a:ext cx="755009" cy="645953"/>
+          </a:xfrm>
+          <a:prstGeom prst="rect">
+            <a:avLst/>
+          </a:prstGeom>
+          <a:solidFill>
+            <a:srgbClr val="7030A0"/>
+          </a:solidFill>
+        </p:spPr>
+        <p:style>
+          <a:lnRef idx="2">
+            <a:schemeClr val="accent1">
+              <a:shade val="50000"/>
+            </a:schemeClr>
+          </a:lnRef>
+          <a:fillRef idx="1">
+            <a:schemeClr val="accent1"/>
+          </a:fillRef>
+          <a:effectRef idx="0">
+            <a:schemeClr val="accent1"/>
+          </a:effectRef>
+          <a:fontRef idx="minor">
+            <a:schemeClr val="lt1"/>
+          </a:fontRef>
+        </p:style>
+        <p:txBody>
+          <a:bodyPr rtlCol="0" anchor="ctr"/>
+          <a:lstStyle/>
+          <a:p>
+            <a:pPr algn="ctr"/>
+            <a:endParaRPr lang="en-US"/>
+          </a:p>
+        </p:txBody>
+      </p:sp>
+      <p:sp>
+        <p:nvSpPr>
+          <p:cNvPr id="15" name="Rectangle 14">
+            <a:extLst>
+              <a:ext uri="{FF2B5EF4-FFF2-40B4-BE49-F238E27FC236}">
+                <a16:creationId xmlns:a16="http://schemas.microsoft.com/office/drawing/2014/main" id="{BCB77EA3-DA9D-4A3A-AE35-198644709A2A}"/>
+              </a:ext>
+            </a:extLst>
+          </p:cNvPr>
+          <p:cNvSpPr/>
+          <p:nvPr/>
+        </p:nvSpPr>
+        <p:spPr>
+          <a:xfrm>
+            <a:off x="4798502" y="3233953"/>
+            <a:ext cx="755009" cy="645953"/>
+          </a:xfrm>
+          <a:prstGeom prst="rect">
+            <a:avLst/>
+          </a:prstGeom>
+          <a:solidFill>
+            <a:srgbClr val="7030A0"/>
+          </a:solidFill>
+        </p:spPr>
+        <p:style>
+          <a:lnRef idx="2">
+            <a:schemeClr val="accent1">
+              <a:shade val="50000"/>
+            </a:schemeClr>
+          </a:lnRef>
+          <a:fillRef idx="1">
+            <a:schemeClr val="accent1"/>
+          </a:fillRef>
+          <a:effectRef idx="0">
+            <a:schemeClr val="accent1"/>
+          </a:effectRef>
+          <a:fontRef idx="minor">
+            <a:schemeClr val="lt1"/>
+          </a:fontRef>
+        </p:style>
+        <p:txBody>
+          <a:bodyPr rtlCol="0" anchor="ctr"/>
+          <a:lstStyle/>
+          <a:p>
+            <a:pPr algn="ctr"/>
+            <a:endParaRPr lang="en-US"/>
+          </a:p>
+        </p:txBody>
+      </p:sp>
+      <p:sp>
+        <p:nvSpPr>
+          <p:cNvPr id="16" name="Rectangle 15">
+            <a:extLst>
+              <a:ext uri="{FF2B5EF4-FFF2-40B4-BE49-F238E27FC236}">
+                <a16:creationId xmlns:a16="http://schemas.microsoft.com/office/drawing/2014/main" id="{BC77BDBE-5CF9-4C7D-8719-4BF94D71EACA}"/>
+              </a:ext>
+            </a:extLst>
+          </p:cNvPr>
+          <p:cNvSpPr/>
+          <p:nvPr/>
+        </p:nvSpPr>
+        <p:spPr>
+          <a:xfrm>
+            <a:off x="5553511" y="3233953"/>
+            <a:ext cx="755009" cy="645953"/>
+          </a:xfrm>
+          <a:prstGeom prst="rect">
+            <a:avLst/>
+          </a:prstGeom>
+          <a:solidFill>
+            <a:srgbClr val="7030A0"/>
+          </a:solidFill>
+        </p:spPr>
+        <p:style>
+          <a:lnRef idx="2">
+            <a:schemeClr val="accent1">
+              <a:shade val="50000"/>
+            </a:schemeClr>
+          </a:lnRef>
+          <a:fillRef idx="1">
+            <a:schemeClr val="accent1"/>
+          </a:fillRef>
+          <a:effectRef idx="0">
+            <a:schemeClr val="accent1"/>
+          </a:effectRef>
+          <a:fontRef idx="minor">
+            <a:schemeClr val="lt1"/>
+          </a:fontRef>
+        </p:style>
+        <p:txBody>
+          <a:bodyPr rtlCol="0" anchor="ctr"/>
+          <a:lstStyle/>
+          <a:p>
+            <a:pPr algn="ctr"/>
+            <a:endParaRPr lang="en-US" dirty="0"/>
+          </a:p>
+        </p:txBody>
+      </p:sp>
+      <p:sp>
+        <p:nvSpPr>
+          <p:cNvPr id="20" name="Rectangle 19">
+            <a:extLst>
+              <a:ext uri="{FF2B5EF4-FFF2-40B4-BE49-F238E27FC236}">
+                <a16:creationId xmlns:a16="http://schemas.microsoft.com/office/drawing/2014/main" id="{6F5A3DFB-40CE-430A-A407-27C4F6C79958}"/>
+              </a:ext>
+            </a:extLst>
+          </p:cNvPr>
+          <p:cNvSpPr/>
+          <p:nvPr/>
+        </p:nvSpPr>
+        <p:spPr>
+          <a:xfrm>
+            <a:off x="8959440" y="3233954"/>
+            <a:ext cx="755009" cy="645953"/>
+          </a:xfrm>
+          <a:prstGeom prst="rect">
+            <a:avLst/>
+          </a:prstGeom>
+          <a:solidFill>
+            <a:schemeClr val="accent1">
+              <a:lumMod val="60000"/>
+              <a:lumOff val="40000"/>
+            </a:schemeClr>
+          </a:solidFill>
+        </p:spPr>
+        <p:style>
+          <a:lnRef idx="2">
+            <a:schemeClr val="accent1">
+              <a:shade val="50000"/>
+            </a:schemeClr>
+          </a:lnRef>
+          <a:fillRef idx="1">
+            <a:schemeClr val="accent1"/>
+          </a:fillRef>
+          <a:effectRef idx="0">
+            <a:schemeClr val="accent1"/>
+          </a:effectRef>
+          <a:fontRef idx="minor">
+            <a:schemeClr val="lt1"/>
+          </a:fontRef>
+        </p:style>
+        <p:txBody>
+          <a:bodyPr rtlCol="0" anchor="ctr"/>
+          <a:lstStyle/>
+          <a:p>
+            <a:pPr algn="ctr"/>
+            <a:endParaRPr lang="en-US"/>
+          </a:p>
+        </p:txBody>
+      </p:sp>
+      <p:sp>
+        <p:nvSpPr>
+          <p:cNvPr id="21" name="TextBox 20">
+            <a:extLst>
+              <a:ext uri="{FF2B5EF4-FFF2-40B4-BE49-F238E27FC236}">
+                <a16:creationId xmlns:a16="http://schemas.microsoft.com/office/drawing/2014/main" id="{2B6648D4-AD9C-4AE0-B3CC-48133399DBD2}"/>
+              </a:ext>
+            </a:extLst>
+          </p:cNvPr>
+          <p:cNvSpPr txBox="1"/>
+          <p:nvPr/>
+        </p:nvSpPr>
+        <p:spPr>
+          <a:xfrm>
+            <a:off x="1386975" y="2435003"/>
+            <a:ext cx="394282" cy="369332"/>
+          </a:xfrm>
+          <a:prstGeom prst="rect">
+            <a:avLst/>
+          </a:prstGeom>
+          <a:noFill/>
+        </p:spPr>
+        <p:txBody>
+          <a:bodyPr wrap="square" rtlCol="0">
+            <a:spAutoFit/>
+          </a:bodyPr>
+          <a:lstStyle/>
+          <a:p>
+            <a:r>
+              <a:rPr lang="en-US" dirty="0"/>
+              <a:t>6</a:t>
+            </a:r>
+          </a:p>
+        </p:txBody>
+      </p:sp>
+      <p:sp>
+        <p:nvSpPr>
+          <p:cNvPr id="22" name="TextBox 21">
+            <a:extLst>
+              <a:ext uri="{FF2B5EF4-FFF2-40B4-BE49-F238E27FC236}">
+                <a16:creationId xmlns:a16="http://schemas.microsoft.com/office/drawing/2014/main" id="{76A07381-1E74-4F08-A61C-1711D5F0A172}"/>
+              </a:ext>
+            </a:extLst>
+          </p:cNvPr>
+          <p:cNvSpPr txBox="1"/>
+          <p:nvPr/>
+        </p:nvSpPr>
+        <p:spPr>
+          <a:xfrm>
+            <a:off x="2146176" y="2449589"/>
+            <a:ext cx="394282" cy="369332"/>
+          </a:xfrm>
+          <a:prstGeom prst="rect">
+            <a:avLst/>
+          </a:prstGeom>
+          <a:noFill/>
+        </p:spPr>
+        <p:txBody>
+          <a:bodyPr wrap="square" rtlCol="0">
+            <a:spAutoFit/>
+          </a:bodyPr>
+          <a:lstStyle/>
+          <a:p>
+            <a:r>
+              <a:rPr lang="en-US" dirty="0"/>
+              <a:t>5</a:t>
+            </a:r>
+          </a:p>
+        </p:txBody>
+      </p:sp>
+      <p:sp>
+        <p:nvSpPr>
+          <p:cNvPr id="23" name="TextBox 22">
+            <a:extLst>
+              <a:ext uri="{FF2B5EF4-FFF2-40B4-BE49-F238E27FC236}">
+                <a16:creationId xmlns:a16="http://schemas.microsoft.com/office/drawing/2014/main" id="{48D1C156-1392-46A6-896F-EDD5B021B3B5}"/>
+              </a:ext>
+            </a:extLst>
+          </p:cNvPr>
+          <p:cNvSpPr txBox="1"/>
+          <p:nvPr/>
+        </p:nvSpPr>
+        <p:spPr>
+          <a:xfrm>
+            <a:off x="2919360" y="2449589"/>
+            <a:ext cx="394282" cy="369332"/>
+          </a:xfrm>
+          <a:prstGeom prst="rect">
+            <a:avLst/>
+          </a:prstGeom>
+          <a:noFill/>
+        </p:spPr>
+        <p:txBody>
+          <a:bodyPr wrap="square" rtlCol="0">
+            <a:spAutoFit/>
+          </a:bodyPr>
+          <a:lstStyle/>
+          <a:p>
+            <a:r>
+              <a:rPr lang="en-US" dirty="0"/>
+              <a:t>3</a:t>
+            </a:r>
+          </a:p>
+        </p:txBody>
+      </p:sp>
+      <p:sp>
+        <p:nvSpPr>
+          <p:cNvPr id="24" name="TextBox 23">
+            <a:extLst>
+              <a:ext uri="{FF2B5EF4-FFF2-40B4-BE49-F238E27FC236}">
+                <a16:creationId xmlns:a16="http://schemas.microsoft.com/office/drawing/2014/main" id="{AEA75B6B-363A-45FB-9503-CC3EDD58B762}"/>
+              </a:ext>
+            </a:extLst>
+          </p:cNvPr>
+          <p:cNvSpPr txBox="1"/>
+          <p:nvPr/>
+        </p:nvSpPr>
+        <p:spPr>
+          <a:xfrm>
+            <a:off x="1386975" y="3080956"/>
+            <a:ext cx="394282" cy="369332"/>
+          </a:xfrm>
+          <a:prstGeom prst="rect">
+            <a:avLst/>
+          </a:prstGeom>
+          <a:noFill/>
+        </p:spPr>
+        <p:txBody>
+          <a:bodyPr wrap="square" rtlCol="0">
+            <a:spAutoFit/>
+          </a:bodyPr>
+          <a:lstStyle/>
+          <a:p>
+            <a:r>
+              <a:rPr lang="en-US" dirty="0"/>
+              <a:t>0</a:t>
+            </a:r>
+          </a:p>
+        </p:txBody>
+      </p:sp>
+      <p:sp>
+        <p:nvSpPr>
+          <p:cNvPr id="25" name="TextBox 24">
+            <a:extLst>
+              <a:ext uri="{FF2B5EF4-FFF2-40B4-BE49-F238E27FC236}">
+                <a16:creationId xmlns:a16="http://schemas.microsoft.com/office/drawing/2014/main" id="{DD39576B-47D1-4B8B-86FC-0F06D78BA5AD}"/>
+              </a:ext>
+            </a:extLst>
+          </p:cNvPr>
+          <p:cNvSpPr txBox="1"/>
+          <p:nvPr/>
+        </p:nvSpPr>
+        <p:spPr>
+          <a:xfrm>
+            <a:off x="2141984" y="3079026"/>
+            <a:ext cx="394282" cy="369332"/>
+          </a:xfrm>
+          <a:prstGeom prst="rect">
+            <a:avLst/>
+          </a:prstGeom>
+          <a:noFill/>
+        </p:spPr>
+        <p:txBody>
+          <a:bodyPr wrap="square" rtlCol="0">
+            <a:spAutoFit/>
+          </a:bodyPr>
+          <a:lstStyle/>
+          <a:p>
+            <a:r>
+              <a:rPr lang="en-US" dirty="0"/>
+              <a:t>1</a:t>
+            </a:r>
+          </a:p>
+        </p:txBody>
+      </p:sp>
+      <p:sp>
+        <p:nvSpPr>
+          <p:cNvPr id="26" name="TextBox 25">
+            <a:extLst>
+              <a:ext uri="{FF2B5EF4-FFF2-40B4-BE49-F238E27FC236}">
+                <a16:creationId xmlns:a16="http://schemas.microsoft.com/office/drawing/2014/main" id="{5FEC17BB-0F78-4E81-9BF0-CD4075EF1EEA}"/>
+              </a:ext>
+            </a:extLst>
+          </p:cNvPr>
+          <p:cNvSpPr txBox="1"/>
+          <p:nvPr/>
+        </p:nvSpPr>
+        <p:spPr>
+          <a:xfrm>
+            <a:off x="2892798" y="3095542"/>
+            <a:ext cx="394282" cy="369332"/>
+          </a:xfrm>
+          <a:prstGeom prst="rect">
+            <a:avLst/>
+          </a:prstGeom>
+          <a:noFill/>
+        </p:spPr>
+        <p:txBody>
+          <a:bodyPr wrap="square" rtlCol="0">
+            <a:spAutoFit/>
+          </a:bodyPr>
+          <a:lstStyle/>
+          <a:p>
+            <a:r>
+              <a:rPr lang="en-US" dirty="0"/>
+              <a:t>1</a:t>
+            </a:r>
+          </a:p>
+        </p:txBody>
+      </p:sp>
+      <p:sp>
+        <p:nvSpPr>
+          <p:cNvPr id="27" name="TextBox 26">
+            <a:extLst>
+              <a:ext uri="{FF2B5EF4-FFF2-40B4-BE49-F238E27FC236}">
+                <a16:creationId xmlns:a16="http://schemas.microsoft.com/office/drawing/2014/main" id="{20C0FE9A-02DC-479F-BCEA-2E0DF858DFA5}"/>
+              </a:ext>
+            </a:extLst>
+          </p:cNvPr>
+          <p:cNvSpPr txBox="1"/>
+          <p:nvPr/>
+        </p:nvSpPr>
+        <p:spPr>
+          <a:xfrm>
+            <a:off x="1386975" y="3726909"/>
+            <a:ext cx="394282" cy="369332"/>
+          </a:xfrm>
+          <a:prstGeom prst="rect">
+            <a:avLst/>
+          </a:prstGeom>
+          <a:noFill/>
+        </p:spPr>
+        <p:txBody>
+          <a:bodyPr wrap="square" rtlCol="0">
+            <a:spAutoFit/>
+          </a:bodyPr>
+          <a:lstStyle/>
+          <a:p>
+            <a:r>
+              <a:rPr lang="en-US" dirty="0"/>
+              <a:t>4</a:t>
+            </a:r>
+          </a:p>
+        </p:txBody>
+      </p:sp>
+      <p:sp>
+        <p:nvSpPr>
+          <p:cNvPr id="28" name="TextBox 27">
+            <a:extLst>
+              <a:ext uri="{FF2B5EF4-FFF2-40B4-BE49-F238E27FC236}">
+                <a16:creationId xmlns:a16="http://schemas.microsoft.com/office/drawing/2014/main" id="{D69B32D7-A6D0-40B1-9818-7FCAD4ACB9C9}"/>
+              </a:ext>
+            </a:extLst>
+          </p:cNvPr>
+          <p:cNvSpPr txBox="1"/>
+          <p:nvPr/>
+        </p:nvSpPr>
+        <p:spPr>
+          <a:xfrm>
+            <a:off x="2150368" y="3710402"/>
+            <a:ext cx="394282" cy="369332"/>
+          </a:xfrm>
+          <a:prstGeom prst="rect">
+            <a:avLst/>
+          </a:prstGeom>
+          <a:noFill/>
+        </p:spPr>
+        <p:txBody>
+          <a:bodyPr wrap="square" rtlCol="0">
+            <a:spAutoFit/>
+          </a:bodyPr>
+          <a:lstStyle/>
+          <a:p>
+            <a:r>
+              <a:rPr lang="en-US" dirty="0"/>
+              <a:t>5</a:t>
+            </a:r>
+          </a:p>
+        </p:txBody>
+      </p:sp>
+      <p:sp>
+        <p:nvSpPr>
+          <p:cNvPr id="29" name="TextBox 28">
+            <a:extLst>
+              <a:ext uri="{FF2B5EF4-FFF2-40B4-BE49-F238E27FC236}">
+                <a16:creationId xmlns:a16="http://schemas.microsoft.com/office/drawing/2014/main" id="{AEFB2CE9-ABED-44AB-9865-E32FBEC0BA5B}"/>
+              </a:ext>
+            </a:extLst>
+          </p:cNvPr>
+          <p:cNvSpPr txBox="1"/>
+          <p:nvPr/>
+        </p:nvSpPr>
+        <p:spPr>
+          <a:xfrm>
+            <a:off x="2901182" y="3710402"/>
+            <a:ext cx="394282" cy="369332"/>
+          </a:xfrm>
+          <a:prstGeom prst="rect">
+            <a:avLst/>
+          </a:prstGeom>
+          <a:noFill/>
+        </p:spPr>
+        <p:txBody>
+          <a:bodyPr wrap="square" rtlCol="0">
+            <a:spAutoFit/>
+          </a:bodyPr>
+          <a:lstStyle/>
+          <a:p>
+            <a:r>
+              <a:rPr lang="en-US" dirty="0"/>
+              <a:t>6</a:t>
+            </a:r>
+          </a:p>
+        </p:txBody>
+      </p:sp>
+      <p:sp>
+        <p:nvSpPr>
+          <p:cNvPr id="34" name="TextBox 33">
+            <a:extLst>
+              <a:ext uri="{FF2B5EF4-FFF2-40B4-BE49-F238E27FC236}">
+                <a16:creationId xmlns:a16="http://schemas.microsoft.com/office/drawing/2014/main" id="{C1222D92-EB1B-4836-A6B5-84CEC7AC2426}"/>
+              </a:ext>
+            </a:extLst>
+          </p:cNvPr>
+          <p:cNvSpPr txBox="1"/>
+          <p:nvPr/>
+        </p:nvSpPr>
+        <p:spPr>
+          <a:xfrm>
+            <a:off x="8377448" y="2709694"/>
+            <a:ext cx="519421" cy="369332"/>
+          </a:xfrm>
+          <a:prstGeom prst="rect">
+            <a:avLst/>
+          </a:prstGeom>
+          <a:noFill/>
+        </p:spPr>
+        <p:txBody>
+          <a:bodyPr wrap="square" rtlCol="0">
+            <a:spAutoFit/>
+          </a:bodyPr>
+          <a:lstStyle/>
+          <a:p>
+            <a:r>
+              <a:rPr lang="en-US" dirty="0"/>
+              <a:t>77</a:t>
+            </a:r>
+          </a:p>
+        </p:txBody>
+      </p:sp>
+      <p:sp>
+        <p:nvSpPr>
+          <p:cNvPr id="35" name="TextBox 34">
+            <a:extLst>
+              <a:ext uri="{FF2B5EF4-FFF2-40B4-BE49-F238E27FC236}">
+                <a16:creationId xmlns:a16="http://schemas.microsoft.com/office/drawing/2014/main" id="{01DC7BFB-410E-450D-B46F-2292C476339E}"/>
+              </a:ext>
+            </a:extLst>
+          </p:cNvPr>
+          <p:cNvSpPr txBox="1"/>
+          <p:nvPr/>
+        </p:nvSpPr>
+        <p:spPr>
+          <a:xfrm>
+            <a:off x="9139804" y="2726310"/>
+            <a:ext cx="512074" cy="369332"/>
+          </a:xfrm>
+          <a:prstGeom prst="rect">
+            <a:avLst/>
+          </a:prstGeom>
+          <a:noFill/>
+        </p:spPr>
+        <p:txBody>
+          <a:bodyPr wrap="square" rtlCol="0">
+            <a:spAutoFit/>
+          </a:bodyPr>
+          <a:lstStyle/>
+          <a:p>
+            <a:r>
+              <a:rPr lang="en-US" dirty="0"/>
+              <a:t>64</a:t>
+            </a:r>
+          </a:p>
+        </p:txBody>
+      </p:sp>
+      <p:sp>
+        <p:nvSpPr>
+          <p:cNvPr id="36" name="TextBox 35">
+            <a:extLst>
+              <a:ext uri="{FF2B5EF4-FFF2-40B4-BE49-F238E27FC236}">
+                <a16:creationId xmlns:a16="http://schemas.microsoft.com/office/drawing/2014/main" id="{EBD84D07-D2DB-470F-B880-F1AADE2B9311}"/>
+              </a:ext>
+            </a:extLst>
+          </p:cNvPr>
+          <p:cNvSpPr txBox="1"/>
+          <p:nvPr/>
+        </p:nvSpPr>
+        <p:spPr>
+          <a:xfrm>
+            <a:off x="9148191" y="3341070"/>
+            <a:ext cx="503686" cy="369332"/>
+          </a:xfrm>
+          <a:prstGeom prst="rect">
+            <a:avLst/>
+          </a:prstGeom>
+          <a:noFill/>
+        </p:spPr>
+        <p:txBody>
+          <a:bodyPr wrap="square" rtlCol="0">
+            <a:spAutoFit/>
+          </a:bodyPr>
+          <a:lstStyle/>
+          <a:p>
+            <a:r>
+              <a:rPr lang="en-US" dirty="0"/>
+              <a:t>95</a:t>
+            </a:r>
+          </a:p>
+        </p:txBody>
+      </p:sp>
+      <p:sp>
+        <p:nvSpPr>
+          <p:cNvPr id="37" name="TextBox 36">
+            <a:extLst>
+              <a:ext uri="{FF2B5EF4-FFF2-40B4-BE49-F238E27FC236}">
+                <a16:creationId xmlns:a16="http://schemas.microsoft.com/office/drawing/2014/main" id="{08FEF298-EB8C-4016-9A8E-74C9259797C6}"/>
+              </a:ext>
+            </a:extLst>
+          </p:cNvPr>
+          <p:cNvSpPr txBox="1"/>
+          <p:nvPr/>
+        </p:nvSpPr>
+        <p:spPr>
+          <a:xfrm>
+            <a:off x="8440017" y="3360644"/>
+            <a:ext cx="456851" cy="369332"/>
+          </a:xfrm>
+          <a:prstGeom prst="rect">
+            <a:avLst/>
+          </a:prstGeom>
+          <a:noFill/>
+        </p:spPr>
+        <p:txBody>
+          <a:bodyPr wrap="square" rtlCol="0">
+            <a:spAutoFit/>
+          </a:bodyPr>
+          <a:lstStyle/>
+          <a:p>
+            <a:r>
+              <a:rPr lang="en-US" dirty="0"/>
+              <a:t>75</a:t>
+            </a:r>
+          </a:p>
+        </p:txBody>
+      </p:sp>
+      <p:cxnSp>
+        <p:nvCxnSpPr>
+          <p:cNvPr id="39" name="Straight Connector 38">
+            <a:extLst>
+              <a:ext uri="{FF2B5EF4-FFF2-40B4-BE49-F238E27FC236}">
+                <a16:creationId xmlns:a16="http://schemas.microsoft.com/office/drawing/2014/main" id="{73B61FEE-7F3F-42C5-8A5E-3E0CE2EBCBDC}"/>
+              </a:ext>
+            </a:extLst>
+          </p:cNvPr>
+          <p:cNvCxnSpPr/>
+          <p:nvPr/>
+        </p:nvCxnSpPr>
+        <p:spPr>
+          <a:xfrm flipH="1" flipV="1">
+            <a:off x="1178651" y="2265023"/>
+            <a:ext cx="3619851" cy="322976"/>
+          </a:xfrm>
+          <a:prstGeom prst="line">
+            <a:avLst/>
+          </a:prstGeom>
+        </p:spPr>
+        <p:style>
+          <a:lnRef idx="1">
+            <a:schemeClr val="dk1"/>
+          </a:lnRef>
+          <a:fillRef idx="0">
+            <a:schemeClr val="dk1"/>
+          </a:fillRef>
+          <a:effectRef idx="0">
+            <a:schemeClr val="dk1"/>
+          </a:effectRef>
+          <a:fontRef idx="minor">
+            <a:schemeClr val="tx1"/>
+          </a:fontRef>
+        </p:style>
+      </p:cxnSp>
+      <p:cxnSp>
+        <p:nvCxnSpPr>
+          <p:cNvPr id="43" name="Straight Connector 42">
+            <a:extLst>
+              <a:ext uri="{FF2B5EF4-FFF2-40B4-BE49-F238E27FC236}">
+                <a16:creationId xmlns:a16="http://schemas.microsoft.com/office/drawing/2014/main" id="{B31C0268-4F43-4756-8F8A-A1140364B840}"/>
+              </a:ext>
+            </a:extLst>
+          </p:cNvPr>
+          <p:cNvCxnSpPr/>
+          <p:nvPr/>
+        </p:nvCxnSpPr>
+        <p:spPr>
+          <a:xfrm flipH="1" flipV="1">
+            <a:off x="1178651" y="3556929"/>
+            <a:ext cx="3619851" cy="322977"/>
+          </a:xfrm>
+          <a:prstGeom prst="line">
+            <a:avLst/>
+          </a:prstGeom>
+        </p:spPr>
+        <p:style>
+          <a:lnRef idx="1">
+            <a:schemeClr val="dk1"/>
+          </a:lnRef>
+          <a:fillRef idx="0">
+            <a:schemeClr val="dk1"/>
+          </a:fillRef>
+          <a:effectRef idx="0">
+            <a:schemeClr val="dk1"/>
+          </a:effectRef>
+          <a:fontRef idx="minor">
+            <a:schemeClr val="tx1"/>
+          </a:fontRef>
+        </p:style>
+      </p:cxnSp>
+      <p:cxnSp>
+        <p:nvCxnSpPr>
+          <p:cNvPr id="45" name="Straight Connector 44">
+            <a:extLst>
+              <a:ext uri="{FF2B5EF4-FFF2-40B4-BE49-F238E27FC236}">
+                <a16:creationId xmlns:a16="http://schemas.microsoft.com/office/drawing/2014/main" id="{179C4569-F33D-440E-A95F-FAE39F015413}"/>
+              </a:ext>
+            </a:extLst>
+          </p:cNvPr>
+          <p:cNvCxnSpPr/>
+          <p:nvPr/>
+        </p:nvCxnSpPr>
+        <p:spPr>
+          <a:xfrm flipH="1" flipV="1">
+            <a:off x="2692864" y="2265023"/>
+            <a:ext cx="3615656" cy="322976"/>
+          </a:xfrm>
+          <a:prstGeom prst="line">
+            <a:avLst/>
+          </a:prstGeom>
+        </p:spPr>
+        <p:style>
+          <a:lnRef idx="1">
+            <a:schemeClr val="dk1"/>
+          </a:lnRef>
+          <a:fillRef idx="0">
+            <a:schemeClr val="dk1"/>
+          </a:fillRef>
+          <a:effectRef idx="0">
+            <a:schemeClr val="dk1"/>
+          </a:effectRef>
+          <a:fontRef idx="minor">
+            <a:schemeClr val="tx1"/>
+          </a:fontRef>
+        </p:style>
+      </p:cxnSp>
+      <p:cxnSp>
+        <p:nvCxnSpPr>
+          <p:cNvPr id="51" name="Straight Arrow Connector 50">
+            <a:extLst>
+              <a:ext uri="{FF2B5EF4-FFF2-40B4-BE49-F238E27FC236}">
+                <a16:creationId xmlns:a16="http://schemas.microsoft.com/office/drawing/2014/main" id="{05CD0849-B12D-4C5B-819B-B980CEC0FDA9}"/>
+              </a:ext>
+            </a:extLst>
+          </p:cNvPr>
+          <p:cNvCxnSpPr>
+            <a:stCxn id="14" idx="3"/>
+          </p:cNvCxnSpPr>
+          <p:nvPr/>
+        </p:nvCxnSpPr>
+        <p:spPr>
+          <a:xfrm flipV="1">
+            <a:off x="6308520" y="2910976"/>
+            <a:ext cx="1761689" cy="1"/>
+          </a:xfrm>
+          <a:prstGeom prst="straightConnector1">
+            <a:avLst/>
+          </a:prstGeom>
+          <a:ln>
+            <a:solidFill>
+              <a:schemeClr val="tx1"/>
+            </a:solidFill>
+            <a:tailEnd type="triangle"/>
+          </a:ln>
+        </p:spPr>
+        <p:style>
+          <a:lnRef idx="1">
+            <a:schemeClr val="accent1"/>
+          </a:lnRef>
+          <a:fillRef idx="0">
+            <a:schemeClr val="accent1"/>
+          </a:fillRef>
+          <a:effectRef idx="0">
+            <a:schemeClr val="accent1"/>
+          </a:effectRef>
+          <a:fontRef idx="minor">
+            <a:schemeClr val="tx1"/>
+          </a:fontRef>
+        </p:style>
+      </p:cxnSp>
+      <p:sp>
+        <p:nvSpPr>
+          <p:cNvPr id="52" name="TextBox 51">
+            <a:extLst>
+              <a:ext uri="{FF2B5EF4-FFF2-40B4-BE49-F238E27FC236}">
+                <a16:creationId xmlns:a16="http://schemas.microsoft.com/office/drawing/2014/main" id="{E9F24779-4069-42FA-AD45-256784BAF9D3}"/>
+              </a:ext>
+            </a:extLst>
+          </p:cNvPr>
+          <p:cNvSpPr txBox="1"/>
+          <p:nvPr/>
+        </p:nvSpPr>
+        <p:spPr>
+          <a:xfrm>
+            <a:off x="1821795" y="947956"/>
+            <a:ext cx="1071003" cy="369332"/>
+          </a:xfrm>
+          <a:prstGeom prst="rect">
+            <a:avLst/>
+          </a:prstGeom>
+          <a:noFill/>
+        </p:spPr>
+        <p:txBody>
+          <a:bodyPr wrap="square" rtlCol="0">
+            <a:spAutoFit/>
+          </a:bodyPr>
+          <a:lstStyle/>
+          <a:p>
+            <a:r>
+              <a:rPr lang="en-US" dirty="0"/>
+              <a:t>Input</a:t>
+            </a:r>
+          </a:p>
+        </p:txBody>
+      </p:sp>
+      <p:sp>
+        <p:nvSpPr>
+          <p:cNvPr id="53" name="TextBox 52">
+            <a:extLst>
+              <a:ext uri="{FF2B5EF4-FFF2-40B4-BE49-F238E27FC236}">
+                <a16:creationId xmlns:a16="http://schemas.microsoft.com/office/drawing/2014/main" id="{5DFA2F88-FB99-498D-AFD1-D2FA1BE1C5B4}"/>
+              </a:ext>
+            </a:extLst>
+          </p:cNvPr>
+          <p:cNvSpPr txBox="1"/>
+          <p:nvPr/>
+        </p:nvSpPr>
+        <p:spPr>
+          <a:xfrm>
+            <a:off x="5176006" y="924669"/>
+            <a:ext cx="1071003" cy="369332"/>
+          </a:xfrm>
+          <a:prstGeom prst="rect">
+            <a:avLst/>
+          </a:prstGeom>
+          <a:noFill/>
+        </p:spPr>
+        <p:txBody>
+          <a:bodyPr wrap="square" rtlCol="0">
+            <a:spAutoFit/>
+          </a:bodyPr>
+          <a:lstStyle/>
+          <a:p>
+            <a:r>
+              <a:rPr lang="en-US" dirty="0"/>
+              <a:t>Filter</a:t>
+            </a:r>
+          </a:p>
+        </p:txBody>
+      </p:sp>
+      <p:sp>
+        <p:nvSpPr>
+          <p:cNvPr id="54" name="TextBox 53">
+            <a:extLst>
+              <a:ext uri="{FF2B5EF4-FFF2-40B4-BE49-F238E27FC236}">
+                <a16:creationId xmlns:a16="http://schemas.microsoft.com/office/drawing/2014/main" id="{3CE1D833-C7EF-4FEB-B6E9-4BE9041BA488}"/>
+              </a:ext>
+            </a:extLst>
+          </p:cNvPr>
+          <p:cNvSpPr txBox="1"/>
+          <p:nvPr/>
+        </p:nvSpPr>
+        <p:spPr>
+          <a:xfrm>
+            <a:off x="8377446" y="947956"/>
+            <a:ext cx="1392572" cy="369332"/>
+          </a:xfrm>
+          <a:prstGeom prst="rect">
+            <a:avLst/>
+          </a:prstGeom>
+          <a:noFill/>
+        </p:spPr>
+        <p:txBody>
+          <a:bodyPr wrap="square" rtlCol="0">
+            <a:spAutoFit/>
+          </a:bodyPr>
+          <a:lstStyle/>
+          <a:p>
+            <a:r>
+              <a:rPr lang="en-US" dirty="0"/>
+              <a:t>Feature map</a:t>
+            </a:r>
+          </a:p>
+        </p:txBody>
+      </p:sp>
+      <mc:AlternateContent xmlns:mc="http://schemas.openxmlformats.org/markup-compatibility/2006">
+        <mc:Choice xmlns:a14="http://schemas.microsoft.com/office/drawing/2010/main" Requires="a14">
+          <p:sp>
+            <p:nvSpPr>
+              <p:cNvPr id="55" name="TextBox 54">
+                <a:extLst>
+                  <a:ext uri="{FF2B5EF4-FFF2-40B4-BE49-F238E27FC236}">
+                    <a16:creationId xmlns:a16="http://schemas.microsoft.com/office/drawing/2014/main" id="{6333686E-F6E1-40F1-BFF7-0155AAF4DE97}"/>
+                  </a:ext>
+                </a:extLst>
+              </p:cNvPr>
+              <p:cNvSpPr txBox="1"/>
+              <p:nvPr/>
+            </p:nvSpPr>
+            <p:spPr>
+              <a:xfrm>
+                <a:off x="2273414" y="5087922"/>
+                <a:ext cx="4089389" cy="276999"/>
+              </a:xfrm>
+              <a:prstGeom prst="rect">
+                <a:avLst/>
+              </a:prstGeom>
+              <a:noFill/>
+            </p:spPr>
+            <p:txBody>
+              <a:bodyPr wrap="none" lIns="0" tIns="0" rIns="0" bIns="0" rtlCol="0">
+                <a:spAutoFit/>
+              </a:bodyPr>
+              <a:lstStyle/>
+              <a:p>
+                <a14:m>
+                  <m:oMathPara xmlns:m="http://schemas.openxmlformats.org/officeDocument/2006/math">
+                    <m:oMathParaPr>
+                      <m:jc m:val="centerGroup"/>
+                    </m:oMathParaPr>
+                    <m:oMath xmlns:m="http://schemas.openxmlformats.org/officeDocument/2006/math">
+                      <m:d>
+                        <m:dPr>
+                          <m:ctrlPr>
+                            <a:rPr lang="en-US" b="0" i="1" smtClean="0">
+                              <a:latin typeface="Cambria Math" panose="02040503050406030204" pitchFamily="18" charset="0"/>
+                            </a:rPr>
+                          </m:ctrlPr>
+                        </m:dPr>
+                        <m:e>
+                          <m:r>
+                            <a:rPr lang="en-US" b="0" i="1" smtClean="0">
+                              <a:latin typeface="Cambria Math" panose="02040503050406030204" pitchFamily="18" charset="0"/>
+                            </a:rPr>
+                            <m:t>6∗5</m:t>
+                          </m:r>
+                        </m:e>
+                      </m:d>
+                      <m:r>
+                        <a:rPr lang="en-US" b="0" i="1" smtClean="0">
+                          <a:latin typeface="Cambria Math" panose="02040503050406030204" pitchFamily="18" charset="0"/>
+                        </a:rPr>
+                        <m:t>+</m:t>
+                      </m:r>
+                      <m:d>
+                        <m:dPr>
+                          <m:ctrlPr>
+                            <a:rPr lang="en-US" b="0" i="1" smtClean="0">
+                              <a:latin typeface="Cambria Math" panose="02040503050406030204" pitchFamily="18" charset="0"/>
+                            </a:rPr>
+                          </m:ctrlPr>
+                        </m:dPr>
+                        <m:e>
+                          <m:r>
+                            <a:rPr lang="en-US" b="0" i="1" smtClean="0">
+                              <a:latin typeface="Cambria Math" panose="02040503050406030204" pitchFamily="18" charset="0"/>
+                            </a:rPr>
+                            <m:t>8∗5</m:t>
+                          </m:r>
+                        </m:e>
+                      </m:d>
+                      <m:r>
+                        <a:rPr lang="en-US" b="0" i="1" smtClean="0">
+                          <a:latin typeface="Cambria Math" panose="02040503050406030204" pitchFamily="18" charset="0"/>
+                        </a:rPr>
+                        <m:t>+</m:t>
+                      </m:r>
+                      <m:d>
+                        <m:dPr>
+                          <m:ctrlPr>
+                            <a:rPr lang="en-US" b="0" i="1" smtClean="0">
+                              <a:latin typeface="Cambria Math" panose="02040503050406030204" pitchFamily="18" charset="0"/>
+                            </a:rPr>
+                          </m:ctrlPr>
+                        </m:dPr>
+                        <m:e>
+                          <m:r>
+                            <a:rPr lang="en-US" b="0" i="1" smtClean="0">
+                              <a:latin typeface="Cambria Math" panose="02040503050406030204" pitchFamily="18" charset="0"/>
+                            </a:rPr>
+                            <m:t>0∗8</m:t>
+                          </m:r>
+                        </m:e>
+                      </m:d>
+                      <m:r>
+                        <a:rPr lang="en-US" b="0" i="1" smtClean="0">
+                          <a:latin typeface="Cambria Math" panose="02040503050406030204" pitchFamily="18" charset="0"/>
+                        </a:rPr>
+                        <m:t>+</m:t>
+                      </m:r>
+                      <m:d>
+                        <m:dPr>
+                          <m:ctrlPr>
+                            <a:rPr lang="en-US" b="0" i="1" smtClean="0">
+                              <a:latin typeface="Cambria Math" panose="02040503050406030204" pitchFamily="18" charset="0"/>
+                            </a:rPr>
+                          </m:ctrlPr>
+                        </m:dPr>
+                        <m:e>
+                          <m:r>
+                            <a:rPr lang="en-US" b="0" i="1" smtClean="0">
+                              <a:latin typeface="Cambria Math" panose="02040503050406030204" pitchFamily="18" charset="0"/>
+                            </a:rPr>
+                            <m:t>7∗1</m:t>
+                          </m:r>
+                        </m:e>
+                      </m:d>
+                      <m:r>
+                        <a:rPr lang="en-US" b="0" i="1" smtClean="0">
+                          <a:latin typeface="Cambria Math" panose="02040503050406030204" pitchFamily="18" charset="0"/>
+                        </a:rPr>
+                        <m:t>=77</m:t>
+                      </m:r>
+                    </m:oMath>
+                  </m:oMathPara>
+                </a14:m>
+                <a:endParaRPr lang="en-US" dirty="0"/>
+              </a:p>
+            </p:txBody>
+          </p:sp>
+        </mc:Choice>
+        <mc:Fallback>
+          <p:sp>
+            <p:nvSpPr>
+              <p:cNvPr id="55" name="TextBox 54">
+                <a:extLst>
+                  <a:ext uri="{FF2B5EF4-FFF2-40B4-BE49-F238E27FC236}">
+                    <a16:creationId xmlns:a16="http://schemas.microsoft.com/office/drawing/2014/main" id="{6333686E-F6E1-40F1-BFF7-0155AAF4DE97}"/>
+                  </a:ext>
+                </a:extLst>
+              </p:cNvPr>
+              <p:cNvSpPr txBox="1">
+                <a:spLocks noRot="1" noChangeAspect="1" noMove="1" noResize="1" noEditPoints="1" noAdjustHandles="1" noChangeArrowheads="1" noChangeShapeType="1" noTextEdit="1"/>
+              </p:cNvSpPr>
+              <p:nvPr/>
+            </p:nvSpPr>
+            <p:spPr>
+              <a:xfrm>
+                <a:off x="2273414" y="5087922"/>
+                <a:ext cx="4089389" cy="276999"/>
+              </a:xfrm>
+              <a:prstGeom prst="rect">
+                <a:avLst/>
+              </a:prstGeom>
+              <a:blipFill>
+                <a:blip r:embed="rId2"/>
+                <a:stretch>
+                  <a:fillRect r="-745" b="-8889"/>
+                </a:stretch>
+              </a:blipFill>
+            </p:spPr>
+            <p:txBody>
+              <a:bodyPr/>
+              <a:lstStyle/>
+              <a:p>
+                <a:r>
+                  <a:rPr lang="en-US">
+                    <a:noFill/>
+                  </a:rPr>
+                  <a:t> </a:t>
+                </a:r>
+              </a:p>
+            </p:txBody>
+          </p:sp>
+        </mc:Fallback>
+      </mc:AlternateContent>
+      <p:sp>
+        <p:nvSpPr>
+          <p:cNvPr id="30" name="TextBox 29">
+            <a:extLst>
+              <a:ext uri="{FF2B5EF4-FFF2-40B4-BE49-F238E27FC236}">
+                <a16:creationId xmlns:a16="http://schemas.microsoft.com/office/drawing/2014/main" id="{026BB332-B85D-4E90-977E-AB76FF1C75FA}"/>
+              </a:ext>
+            </a:extLst>
+          </p:cNvPr>
+          <p:cNvSpPr txBox="1"/>
+          <p:nvPr/>
+        </p:nvSpPr>
+        <p:spPr>
+          <a:xfrm>
+            <a:off x="5024997" y="2776324"/>
+            <a:ext cx="394282" cy="369332"/>
+          </a:xfrm>
+          <a:prstGeom prst="rect">
+            <a:avLst/>
+          </a:prstGeom>
+          <a:noFill/>
+        </p:spPr>
+        <p:txBody>
+          <a:bodyPr wrap="square" rtlCol="0">
+            <a:spAutoFit/>
+          </a:bodyPr>
+          <a:lstStyle/>
+          <a:p>
+            <a:r>
+              <a:rPr lang="en-US" dirty="0"/>
+              <a:t>5</a:t>
+            </a:r>
+          </a:p>
+        </p:txBody>
+      </p:sp>
+      <p:sp>
+        <p:nvSpPr>
+          <p:cNvPr id="31" name="TextBox 30">
+            <a:extLst>
+              <a:ext uri="{FF2B5EF4-FFF2-40B4-BE49-F238E27FC236}">
+                <a16:creationId xmlns:a16="http://schemas.microsoft.com/office/drawing/2014/main" id="{DD23EAD7-FB23-41A1-8BB4-F85C30CB4DE2}"/>
+              </a:ext>
+            </a:extLst>
+          </p:cNvPr>
+          <p:cNvSpPr txBox="1"/>
+          <p:nvPr/>
+        </p:nvSpPr>
+        <p:spPr>
+          <a:xfrm>
+            <a:off x="5775811" y="2776104"/>
+            <a:ext cx="394282" cy="369332"/>
+          </a:xfrm>
+          <a:prstGeom prst="rect">
+            <a:avLst/>
+          </a:prstGeom>
+          <a:noFill/>
+        </p:spPr>
+        <p:txBody>
+          <a:bodyPr wrap="square" rtlCol="0">
+            <a:spAutoFit/>
+          </a:bodyPr>
+          <a:lstStyle/>
+          <a:p>
+            <a:r>
+              <a:rPr lang="en-US" dirty="0"/>
+              <a:t>8</a:t>
+            </a:r>
+          </a:p>
+        </p:txBody>
+      </p:sp>
+      <p:sp>
+        <p:nvSpPr>
+          <p:cNvPr id="32" name="TextBox 31">
+            <a:extLst>
+              <a:ext uri="{FF2B5EF4-FFF2-40B4-BE49-F238E27FC236}">
+                <a16:creationId xmlns:a16="http://schemas.microsoft.com/office/drawing/2014/main" id="{26B740AF-C10E-422B-9F06-1C9306B00DC0}"/>
+              </a:ext>
+            </a:extLst>
+          </p:cNvPr>
+          <p:cNvSpPr txBox="1"/>
+          <p:nvPr/>
+        </p:nvSpPr>
+        <p:spPr>
+          <a:xfrm>
+            <a:off x="5024997" y="3341070"/>
+            <a:ext cx="394282" cy="369332"/>
+          </a:xfrm>
+          <a:prstGeom prst="rect">
+            <a:avLst/>
+          </a:prstGeom>
+          <a:noFill/>
+        </p:spPr>
+        <p:txBody>
+          <a:bodyPr wrap="square" rtlCol="0">
+            <a:spAutoFit/>
+          </a:bodyPr>
+          <a:lstStyle/>
+          <a:p>
+            <a:r>
+              <a:rPr lang="en-US" dirty="0"/>
+              <a:t>8</a:t>
+            </a:r>
+          </a:p>
+        </p:txBody>
+      </p:sp>
+      <p:sp>
+        <p:nvSpPr>
+          <p:cNvPr id="33" name="TextBox 32">
+            <a:extLst>
+              <a:ext uri="{FF2B5EF4-FFF2-40B4-BE49-F238E27FC236}">
+                <a16:creationId xmlns:a16="http://schemas.microsoft.com/office/drawing/2014/main" id="{686E5544-E7B3-4FE9-B531-BDE520EBEF21}"/>
+              </a:ext>
+            </a:extLst>
+          </p:cNvPr>
+          <p:cNvSpPr txBox="1"/>
+          <p:nvPr/>
+        </p:nvSpPr>
+        <p:spPr>
+          <a:xfrm>
+            <a:off x="5749243" y="3357577"/>
+            <a:ext cx="394282" cy="369332"/>
+          </a:xfrm>
+          <a:prstGeom prst="rect">
+            <a:avLst/>
+          </a:prstGeom>
+          <a:noFill/>
+        </p:spPr>
+        <p:txBody>
+          <a:bodyPr wrap="square" rtlCol="0">
+            <a:spAutoFit/>
+          </a:bodyPr>
+          <a:lstStyle/>
+          <a:p>
+            <a:r>
+              <a:rPr lang="en-US" dirty="0"/>
+              <a:t>7</a:t>
+            </a:r>
+          </a:p>
+        </p:txBody>
+      </p:sp>
+    </p:spTree>
+    <p:extLst>
+      <p:ext uri="{BB962C8B-B14F-4D97-AF65-F5344CB8AC3E}">
+        <p14:creationId xmlns:p14="http://schemas.microsoft.com/office/powerpoint/2010/main" val="1339571808"/>
       </p:ext>
     </p:extLst>
   </p:cSld>

</xml_diff>

<commit_message>
figures updated ml from siong comments
</commit_message>
<xml_diff>
--- a/figures/Neural_network_diagrams.pptx
+++ b/figures/Neural_network_diagrams.pptx
@@ -264,7 +264,7 @@
           <a:p>
             <a:fld id="{EA8E6676-3294-4EB9-9610-18275A1F2370}" type="datetimeFigureOut">
               <a:rPr lang="en-US" smtClean="0"/>
-              <a:t>2/17/2021</a:t>
+              <a:t>7/30/2021</a:t>
             </a:fld>
             <a:endParaRPr lang="en-US"/>
           </a:p>
@@ -462,7 +462,7 @@
           <a:p>
             <a:fld id="{EA8E6676-3294-4EB9-9610-18275A1F2370}" type="datetimeFigureOut">
               <a:rPr lang="en-US" smtClean="0"/>
-              <a:t>2/17/2021</a:t>
+              <a:t>7/30/2021</a:t>
             </a:fld>
             <a:endParaRPr lang="en-US"/>
           </a:p>
@@ -670,7 +670,7 @@
           <a:p>
             <a:fld id="{EA8E6676-3294-4EB9-9610-18275A1F2370}" type="datetimeFigureOut">
               <a:rPr lang="en-US" smtClean="0"/>
-              <a:t>2/17/2021</a:t>
+              <a:t>7/30/2021</a:t>
             </a:fld>
             <a:endParaRPr lang="en-US"/>
           </a:p>
@@ -868,7 +868,7 @@
           <a:p>
             <a:fld id="{EA8E6676-3294-4EB9-9610-18275A1F2370}" type="datetimeFigureOut">
               <a:rPr lang="en-US" smtClean="0"/>
-              <a:t>2/17/2021</a:t>
+              <a:t>7/30/2021</a:t>
             </a:fld>
             <a:endParaRPr lang="en-US"/>
           </a:p>
@@ -1143,7 +1143,7 @@
           <a:p>
             <a:fld id="{EA8E6676-3294-4EB9-9610-18275A1F2370}" type="datetimeFigureOut">
               <a:rPr lang="en-US" smtClean="0"/>
-              <a:t>2/17/2021</a:t>
+              <a:t>7/30/2021</a:t>
             </a:fld>
             <a:endParaRPr lang="en-US"/>
           </a:p>
@@ -1408,7 +1408,7 @@
           <a:p>
             <a:fld id="{EA8E6676-3294-4EB9-9610-18275A1F2370}" type="datetimeFigureOut">
               <a:rPr lang="en-US" smtClean="0"/>
-              <a:t>2/17/2021</a:t>
+              <a:t>7/30/2021</a:t>
             </a:fld>
             <a:endParaRPr lang="en-US"/>
           </a:p>
@@ -1820,7 +1820,7 @@
           <a:p>
             <a:fld id="{EA8E6676-3294-4EB9-9610-18275A1F2370}" type="datetimeFigureOut">
               <a:rPr lang="en-US" smtClean="0"/>
-              <a:t>2/17/2021</a:t>
+              <a:t>7/30/2021</a:t>
             </a:fld>
             <a:endParaRPr lang="en-US"/>
           </a:p>
@@ -1961,7 +1961,7 @@
           <a:p>
             <a:fld id="{EA8E6676-3294-4EB9-9610-18275A1F2370}" type="datetimeFigureOut">
               <a:rPr lang="en-US" smtClean="0"/>
-              <a:t>2/17/2021</a:t>
+              <a:t>7/30/2021</a:t>
             </a:fld>
             <a:endParaRPr lang="en-US"/>
           </a:p>
@@ -2074,7 +2074,7 @@
           <a:p>
             <a:fld id="{EA8E6676-3294-4EB9-9610-18275A1F2370}" type="datetimeFigureOut">
               <a:rPr lang="en-US" smtClean="0"/>
-              <a:t>2/17/2021</a:t>
+              <a:t>7/30/2021</a:t>
             </a:fld>
             <a:endParaRPr lang="en-US"/>
           </a:p>
@@ -2385,7 +2385,7 @@
           <a:p>
             <a:fld id="{EA8E6676-3294-4EB9-9610-18275A1F2370}" type="datetimeFigureOut">
               <a:rPr lang="en-US" smtClean="0"/>
-              <a:t>2/17/2021</a:t>
+              <a:t>7/30/2021</a:t>
             </a:fld>
             <a:endParaRPr lang="en-US"/>
           </a:p>
@@ -2673,7 +2673,7 @@
           <a:p>
             <a:fld id="{EA8E6676-3294-4EB9-9610-18275A1F2370}" type="datetimeFigureOut">
               <a:rPr lang="en-US" smtClean="0"/>
-              <a:t>2/17/2021</a:t>
+              <a:t>7/30/2021</a:t>
             </a:fld>
             <a:endParaRPr lang="en-US"/>
           </a:p>
@@ -2914,7 +2914,7 @@
           <a:p>
             <a:fld id="{EA8E6676-3294-4EB9-9610-18275A1F2370}" type="datetimeFigureOut">
               <a:rPr lang="en-US" smtClean="0"/>
-              <a:t>2/17/2021</a:t>
+              <a:t>7/30/2021</a:t>
             </a:fld>
             <a:endParaRPr lang="en-US"/>
           </a:p>
@@ -3931,42 +3931,6 @@
           </a:fontRef>
         </p:style>
       </p:cxnSp>
-      <p:pic>
-        <p:nvPicPr>
-          <p:cNvPr id="28" name="Picture 27" descr="Shape&#10;&#10;Description automatically generated">
-            <a:extLst>
-              <a:ext uri="{FF2B5EF4-FFF2-40B4-BE49-F238E27FC236}">
-                <a16:creationId xmlns:a16="http://schemas.microsoft.com/office/drawing/2014/main" id="{A4C4E8B3-7D3F-4B70-95B5-CABC3B8983D6}"/>
-              </a:ext>
-            </a:extLst>
-          </p:cNvPr>
-          <p:cNvPicPr>
-            <a:picLocks noChangeAspect="1"/>
-          </p:cNvPicPr>
-          <p:nvPr/>
-        </p:nvPicPr>
-        <p:blipFill>
-          <a:blip r:embed="rId2">
-            <a:extLst>
-              <a:ext uri="{28A0092B-C50C-407E-A947-70E740481C1C}">
-                <a14:useLocalDpi xmlns:a14="http://schemas.microsoft.com/office/drawing/2010/main" val="0"/>
-              </a:ext>
-            </a:extLst>
-          </a:blip>
-          <a:stretch>
-            <a:fillRect/>
-          </a:stretch>
-        </p:blipFill>
-        <p:spPr>
-          <a:xfrm>
-            <a:off x="8151002" y="2674789"/>
-            <a:ext cx="1324361" cy="898919"/>
-          </a:xfrm>
-          <a:prstGeom prst="rect">
-            <a:avLst/>
-          </a:prstGeom>
-        </p:spPr>
-      </p:pic>
       <mc:AlternateContent xmlns:mc="http://schemas.openxmlformats.org/markup-compatibility/2006" xmlns:a14="http://schemas.microsoft.com/office/drawing/2010/main">
         <mc:Choice Requires="a14">
           <p:sp>
@@ -4749,6 +4713,42 @@
           </p:sp>
         </mc:Fallback>
       </mc:AlternateContent>
+      <p:pic>
+        <p:nvPicPr>
+          <p:cNvPr id="3" name="Picture 2" descr="A blue line on a white background&#10;&#10;Description automatically generated with medium confidence">
+            <a:extLst>
+              <a:ext uri="{FF2B5EF4-FFF2-40B4-BE49-F238E27FC236}">
+                <a16:creationId xmlns:a16="http://schemas.microsoft.com/office/drawing/2014/main" id="{F3FAA5C1-B5E0-475E-97DD-8B2F27431AD2}"/>
+              </a:ext>
+            </a:extLst>
+          </p:cNvPr>
+          <p:cNvPicPr>
+            <a:picLocks noChangeAspect="1"/>
+          </p:cNvPicPr>
+          <p:nvPr/>
+        </p:nvPicPr>
+        <p:blipFill>
+          <a:blip r:embed="rId10">
+            <a:extLst>
+              <a:ext uri="{28A0092B-C50C-407E-A947-70E740481C1C}">
+                <a14:useLocalDpi xmlns:a14="http://schemas.microsoft.com/office/drawing/2010/main" val="0"/>
+              </a:ext>
+            </a:extLst>
+          </a:blip>
+          <a:stretch>
+            <a:fillRect/>
+          </a:stretch>
+        </p:blipFill>
+        <p:spPr>
+          <a:xfrm>
+            <a:off x="8121706" y="2613091"/>
+            <a:ext cx="1346667" cy="897778"/>
+          </a:xfrm>
+          <a:prstGeom prst="rect">
+            <a:avLst/>
+          </a:prstGeom>
+        </p:spPr>
+      </p:pic>
     </p:spTree>
     <p:extLst>
       <p:ext uri="{BB962C8B-B14F-4D97-AF65-F5344CB8AC3E}">
@@ -21044,8 +21044,8 @@
           </a:p>
         </p:txBody>
       </p:sp>
-      <mc:AlternateContent xmlns:mc="http://schemas.openxmlformats.org/markup-compatibility/2006">
-        <mc:Choice xmlns:a14="http://schemas.microsoft.com/office/drawing/2010/main" Requires="a14">
+      <mc:AlternateContent xmlns:mc="http://schemas.openxmlformats.org/markup-compatibility/2006" xmlns:a14="http://schemas.microsoft.com/office/drawing/2010/main">
+        <mc:Choice Requires="a14">
           <p:sp>
             <p:nvSpPr>
               <p:cNvPr id="55" name="TextBox 54">
@@ -21074,6 +21074,7 @@
               </a:bodyPr>
               <a:lstStyle/>
               <a:p>
+                <a:pPr/>
                 <a14:m>
                   <m:oMathPara xmlns:m="http://schemas.openxmlformats.org/officeDocument/2006/math">
                     <m:oMathParaPr>
@@ -21180,7 +21181,7 @@
             </p:txBody>
           </p:sp>
         </mc:Choice>
-        <mc:Fallback>
+        <mc:Fallback xmlns="">
           <p:sp>
             <p:nvSpPr>
               <p:cNvPr id="55" name="TextBox 54">

</xml_diff>